<commit_message>
Avance doc y presentación creo ya terminada
</commit_message>
<xml_diff>
--- a/docs/ED-Proyecto-Entrega1-pres-Equipo-4.pptx
+++ b/docs/ED-Proyecto-Entrega1-pres-Equipo-4.pptx
@@ -2,18 +2,24 @@
 <file path=ppt/presentation.xml><?xml version="1.0" encoding="utf-8"?>
 <p:presentation xmlns:a="http://schemas.openxmlformats.org/drawingml/2006/main" xmlns:r="http://schemas.openxmlformats.org/officeDocument/2006/relationships" xmlns:p="http://schemas.openxmlformats.org/presentationml/2006/main" saveSubsetFonts="1">
   <p:sldMasterIdLst>
-    <p:sldMasterId id="2147483648" r:id="rId1"/>
+    <p:sldMasterId id="2147483672" r:id="rId1"/>
   </p:sldMasterIdLst>
   <p:sldIdLst>
-    <p:sldId id="256" r:id="rId2"/>
+    <p:sldId id="257" r:id="rId2"/>
+    <p:sldId id="258" r:id="rId3"/>
+    <p:sldId id="259" r:id="rId4"/>
+    <p:sldId id="260" r:id="rId5"/>
+    <p:sldId id="261" r:id="rId6"/>
+    <p:sldId id="262" r:id="rId7"/>
+    <p:sldId id="263" r:id="rId8"/>
   </p:sldIdLst>
   <p:sldSz cx="12192000" cy="6858000"/>
   <p:notesSz cx="6858000" cy="9144000"/>
   <p:defaultTextStyle>
     <a:defPPr>
-      <a:defRPr lang="es-CO"/>
+      <a:defRPr lang="en-US"/>
     </a:defPPr>
-    <a:lvl1pPr marL="0" algn="l" defTabSz="914400" rtl="0" eaLnBrk="1" latinLnBrk="0" hangingPunct="1">
+    <a:lvl1pPr marL="0" algn="l" defTabSz="457200" rtl="0" eaLnBrk="1" latinLnBrk="0" hangingPunct="1">
       <a:defRPr sz="1800" kern="1200">
         <a:solidFill>
           <a:schemeClr val="tx1"/>
@@ -23,7 +29,7 @@
         <a:cs typeface="+mn-cs"/>
       </a:defRPr>
     </a:lvl1pPr>
-    <a:lvl2pPr marL="457200" algn="l" defTabSz="914400" rtl="0" eaLnBrk="1" latinLnBrk="0" hangingPunct="1">
+    <a:lvl2pPr marL="457200" algn="l" defTabSz="457200" rtl="0" eaLnBrk="1" latinLnBrk="0" hangingPunct="1">
       <a:defRPr sz="1800" kern="1200">
         <a:solidFill>
           <a:schemeClr val="tx1"/>
@@ -33,7 +39,7 @@
         <a:cs typeface="+mn-cs"/>
       </a:defRPr>
     </a:lvl2pPr>
-    <a:lvl3pPr marL="914400" algn="l" defTabSz="914400" rtl="0" eaLnBrk="1" latinLnBrk="0" hangingPunct="1">
+    <a:lvl3pPr marL="914400" algn="l" defTabSz="457200" rtl="0" eaLnBrk="1" latinLnBrk="0" hangingPunct="1">
       <a:defRPr sz="1800" kern="1200">
         <a:solidFill>
           <a:schemeClr val="tx1"/>
@@ -43,7 +49,7 @@
         <a:cs typeface="+mn-cs"/>
       </a:defRPr>
     </a:lvl3pPr>
-    <a:lvl4pPr marL="1371600" algn="l" defTabSz="914400" rtl="0" eaLnBrk="1" latinLnBrk="0" hangingPunct="1">
+    <a:lvl4pPr marL="1371600" algn="l" defTabSz="457200" rtl="0" eaLnBrk="1" latinLnBrk="0" hangingPunct="1">
       <a:defRPr sz="1800" kern="1200">
         <a:solidFill>
           <a:schemeClr val="tx1"/>
@@ -53,7 +59,7 @@
         <a:cs typeface="+mn-cs"/>
       </a:defRPr>
     </a:lvl4pPr>
-    <a:lvl5pPr marL="1828800" algn="l" defTabSz="914400" rtl="0" eaLnBrk="1" latinLnBrk="0" hangingPunct="1">
+    <a:lvl5pPr marL="1828800" algn="l" defTabSz="457200" rtl="0" eaLnBrk="1" latinLnBrk="0" hangingPunct="1">
       <a:defRPr sz="1800" kern="1200">
         <a:solidFill>
           <a:schemeClr val="tx1"/>
@@ -63,7 +69,7 @@
         <a:cs typeface="+mn-cs"/>
       </a:defRPr>
     </a:lvl5pPr>
-    <a:lvl6pPr marL="2286000" algn="l" defTabSz="914400" rtl="0" eaLnBrk="1" latinLnBrk="0" hangingPunct="1">
+    <a:lvl6pPr marL="2286000" algn="l" defTabSz="457200" rtl="0" eaLnBrk="1" latinLnBrk="0" hangingPunct="1">
       <a:defRPr sz="1800" kern="1200">
         <a:solidFill>
           <a:schemeClr val="tx1"/>
@@ -73,7 +79,7 @@
         <a:cs typeface="+mn-cs"/>
       </a:defRPr>
     </a:lvl6pPr>
-    <a:lvl7pPr marL="2743200" algn="l" defTabSz="914400" rtl="0" eaLnBrk="1" latinLnBrk="0" hangingPunct="1">
+    <a:lvl7pPr marL="2743200" algn="l" defTabSz="457200" rtl="0" eaLnBrk="1" latinLnBrk="0" hangingPunct="1">
       <a:defRPr sz="1800" kern="1200">
         <a:solidFill>
           <a:schemeClr val="tx1"/>
@@ -83,7 +89,7 @@
         <a:cs typeface="+mn-cs"/>
       </a:defRPr>
     </a:lvl7pPr>
-    <a:lvl8pPr marL="3200400" algn="l" defTabSz="914400" rtl="0" eaLnBrk="1" latinLnBrk="0" hangingPunct="1">
+    <a:lvl8pPr marL="3200400" algn="l" defTabSz="457200" rtl="0" eaLnBrk="1" latinLnBrk="0" hangingPunct="1">
       <a:defRPr sz="1800" kern="1200">
         <a:solidFill>
           <a:schemeClr val="tx1"/>
@@ -93,7 +99,7 @@
         <a:cs typeface="+mn-cs"/>
       </a:defRPr>
     </a:lvl8pPr>
-    <a:lvl9pPr marL="3657600" algn="l" defTabSz="914400" rtl="0" eaLnBrk="1" latinLnBrk="0" hangingPunct="1">
+    <a:lvl9pPr marL="3657600" algn="l" defTabSz="457200" rtl="0" eaLnBrk="1" latinLnBrk="0" hangingPunct="1">
       <a:defRPr sz="1800" kern="1200">
         <a:solidFill>
           <a:schemeClr val="tx1"/>
@@ -104,12 +110,25 @@
       </a:defRPr>
     </a:lvl9pPr>
   </p:defaultTextStyle>
+  <p:extLst>
+    <p:ext uri="{EFAFB233-063F-42B5-8137-9DF3F51BA10A}">
+      <p15:sldGuideLst xmlns:p15="http://schemas.microsoft.com/office/powerpoint/2012/main"/>
+    </p:ext>
+  </p:extLst>
 </p:presentation>
 </file>
 
 <file path=ppt/slideLayouts/slideLayout1.xml><?xml version="1.0" encoding="utf-8"?>
 <p:sldLayout xmlns:a="http://schemas.openxmlformats.org/drawingml/2006/main" xmlns:r="http://schemas.openxmlformats.org/officeDocument/2006/relationships" xmlns:p="http://schemas.openxmlformats.org/presentationml/2006/main" type="title" preserve="1">
   <p:cSld name="Diapositiva de título">
+    <p:bg>
+      <p:bgPr>
+        <a:solidFill>
+          <a:schemeClr val="accent2"/>
+        </a:solidFill>
+        <a:effectLst/>
+      </p:bgPr>
+    </p:bg>
     <p:spTree>
       <p:nvGrpSpPr>
         <p:cNvPr id="1" name=""/>
@@ -126,70 +145,82 @@
       </p:grpSpPr>
       <p:sp>
         <p:nvSpPr>
-          <p:cNvPr id="2" name="Título 1">
-            <a:extLst>
-              <a:ext uri="{FF2B5EF4-FFF2-40B4-BE49-F238E27FC236}">
-                <a16:creationId xmlns:a16="http://schemas.microsoft.com/office/drawing/2014/main" id="{00090580-2887-4E7A-B884-D93125BF7B31}"/>
-              </a:ext>
-            </a:extLst>
-          </p:cNvPr>
+          <p:cNvPr id="2" name="Title 1"/>
           <p:cNvSpPr>
             <a:spLocks noGrp="1"/>
           </p:cNvSpPr>
           <p:nvPr>
             <p:ph type="ctrTitle"/>
+          </p:nvPr>
+        </p:nvSpPr>
+        <p:spPr bwMode="blackWhite">
+          <a:xfrm>
+            <a:off x="1600200" y="2386744"/>
+            <a:ext cx="8991600" cy="1645920"/>
+          </a:xfrm>
+          <a:solidFill>
+            <a:srgbClr val="FFFFFF"/>
+          </a:solidFill>
+          <a:ln w="38100">
+            <a:solidFill>
+              <a:srgbClr val="404040"/>
+            </a:solidFill>
+          </a:ln>
+        </p:spPr>
+        <p:txBody>
+          <a:bodyPr lIns="274320" rIns="274320" anchor="ctr" anchorCtr="1">
+            <a:normAutofit/>
+          </a:bodyPr>
+          <a:lstStyle>
+            <a:lvl1pPr algn="ctr">
+              <a:defRPr sz="3800">
+                <a:solidFill>
+                  <a:srgbClr val="262626"/>
+                </a:solidFill>
+              </a:defRPr>
+            </a:lvl1pPr>
+          </a:lstStyle>
+          <a:p>
+            <a:r>
+              <a:rPr lang="es-ES"/>
+              <a:t>Haga clic para modificar el estilo de título del patrón</a:t>
+            </a:r>
+            <a:endParaRPr lang="en-US" dirty="0"/>
+          </a:p>
+        </p:txBody>
+      </p:sp>
+      <p:sp>
+        <p:nvSpPr>
+          <p:cNvPr id="3" name="Subtitle 2"/>
+          <p:cNvSpPr>
+            <a:spLocks noGrp="1"/>
+          </p:cNvSpPr>
+          <p:nvPr>
+            <p:ph type="subTitle" idx="1"/>
           </p:nvPr>
         </p:nvSpPr>
         <p:spPr>
           <a:xfrm>
-            <a:off x="1524000" y="1122363"/>
-            <a:ext cx="9144000" cy="2387600"/>
+            <a:off x="2695194" y="4352544"/>
+            <a:ext cx="6801612" cy="1239894"/>
           </a:xfrm>
+          <a:noFill/>
         </p:spPr>
         <p:txBody>
-          <a:bodyPr anchor="b"/>
-          <a:lstStyle>
-            <a:lvl1pPr algn="ctr">
-              <a:defRPr sz="6000"/>
-            </a:lvl1pPr>
-          </a:lstStyle>
-          <a:p>
-            <a:r>
-              <a:rPr lang="es-ES"/>
-              <a:t>Haga clic para modificar el estilo de título del patrón</a:t>
-            </a:r>
-            <a:endParaRPr lang="es-CO"/>
-          </a:p>
-        </p:txBody>
-      </p:sp>
-      <p:sp>
-        <p:nvSpPr>
-          <p:cNvPr id="3" name="Subtítulo 2">
-            <a:extLst>
-              <a:ext uri="{FF2B5EF4-FFF2-40B4-BE49-F238E27FC236}">
-                <a16:creationId xmlns:a16="http://schemas.microsoft.com/office/drawing/2014/main" id="{C3F26622-8B6F-4CF2-AA93-B4D31680C8FF}"/>
-              </a:ext>
-            </a:extLst>
-          </p:cNvPr>
-          <p:cNvSpPr>
-            <a:spLocks noGrp="1"/>
-          </p:cNvSpPr>
-          <p:nvPr>
-            <p:ph type="subTitle" idx="1"/>
-          </p:nvPr>
-        </p:nvSpPr>
-        <p:spPr>
-          <a:xfrm>
-            <a:off x="1524000" y="3602038"/>
-            <a:ext cx="9144000" cy="1655762"/>
-          </a:xfrm>
-        </p:spPr>
-        <p:txBody>
-          <a:bodyPr/>
+          <a:bodyPr>
+            <a:normAutofit/>
+          </a:bodyPr>
           <a:lstStyle>
             <a:lvl1pPr marL="0" indent="0" algn="ctr">
               <a:buNone/>
-              <a:defRPr sz="2400"/>
+              <a:defRPr sz="2000">
+                <a:solidFill>
+                  <a:schemeClr val="tx1">
+                    <a:lumMod val="75000"/>
+                    <a:lumOff val="25000"/>
+                  </a:schemeClr>
+                </a:solidFill>
+              </a:defRPr>
             </a:lvl1pPr>
             <a:lvl2pPr marL="457200" indent="0" algn="ctr">
               <a:buNone/>
@@ -229,19 +260,13 @@
               <a:rPr lang="es-ES"/>
               <a:t>Haga clic para modificar el estilo de subtítulo del patrón</a:t>
             </a:r>
-            <a:endParaRPr lang="es-CO"/>
-          </a:p>
-        </p:txBody>
-      </p:sp>
-      <p:sp>
-        <p:nvSpPr>
-          <p:cNvPr id="4" name="Marcador de fecha 3">
-            <a:extLst>
-              <a:ext uri="{FF2B5EF4-FFF2-40B4-BE49-F238E27FC236}">
-                <a16:creationId xmlns:a16="http://schemas.microsoft.com/office/drawing/2014/main" id="{7502F1D9-826E-494C-90C9-1D3779EC14CF}"/>
-              </a:ext>
-            </a:extLst>
-          </p:cNvPr>
+            <a:endParaRPr lang="en-US" dirty="0"/>
+          </a:p>
+        </p:txBody>
+      </p:sp>
+      <p:sp>
+        <p:nvSpPr>
+          <p:cNvPr id="7" name="Date Placeholder 6"/>
           <p:cNvSpPr>
             <a:spLocks noGrp="1"/>
           </p:cNvSpPr>
@@ -256,7 +281,7 @@
           <a:p>
             <a:fld id="{3E530A29-EDEA-4C59-80FD-EF4091401625}" type="datetimeFigureOut">
               <a:rPr lang="es-CO" smtClean="0"/>
-              <a:t>11/04/2021</a:t>
+              <a:t>25/04/2021</a:t>
             </a:fld>
             <a:endParaRPr lang="es-CO"/>
           </a:p>
@@ -264,13 +289,7 @@
       </p:sp>
       <p:sp>
         <p:nvSpPr>
-          <p:cNvPr id="5" name="Marcador de pie de página 4">
-            <a:extLst>
-              <a:ext uri="{FF2B5EF4-FFF2-40B4-BE49-F238E27FC236}">
-                <a16:creationId xmlns:a16="http://schemas.microsoft.com/office/drawing/2014/main" id="{F43063F2-C8C6-4813-8E84-B19EA2753340}"/>
-              </a:ext>
-            </a:extLst>
-          </p:cNvPr>
+          <p:cNvPr id="8" name="Footer Placeholder 7"/>
           <p:cNvSpPr>
             <a:spLocks noGrp="1"/>
           </p:cNvSpPr>
@@ -289,13 +308,7 @@
       </p:sp>
       <p:sp>
         <p:nvSpPr>
-          <p:cNvPr id="6" name="Marcador de número de diapositiva 5">
-            <a:extLst>
-              <a:ext uri="{FF2B5EF4-FFF2-40B4-BE49-F238E27FC236}">
-                <a16:creationId xmlns:a16="http://schemas.microsoft.com/office/drawing/2014/main" id="{7A479CE1-D5C6-4A45-8B87-D7FD564EE7F0}"/>
-              </a:ext>
-            </a:extLst>
-          </p:cNvPr>
+          <p:cNvPr id="9" name="Slide Number Placeholder 8"/>
           <p:cNvSpPr>
             <a:spLocks noGrp="1"/>
           </p:cNvSpPr>
@@ -319,12 +332,12 @@
     </p:spTree>
     <p:extLst>
       <p:ext uri="{BB962C8B-B14F-4D97-AF65-F5344CB8AC3E}">
-        <p14:creationId xmlns:p14="http://schemas.microsoft.com/office/powerpoint/2010/main" val="2056512689"/>
+        <p14:creationId xmlns:p14="http://schemas.microsoft.com/office/powerpoint/2010/main" val="1132376832"/>
       </p:ext>
     </p:extLst>
   </p:cSld>
   <p:clrMapOvr>
-    <a:masterClrMapping/>
+    <a:overrideClrMapping bg1="dk1" tx1="lt1" bg2="dk2" tx2="lt2" accent1="accent1" accent2="accent2" accent3="accent3" accent4="accent4" accent5="accent5" accent6="accent6" hlink="hlink" folHlink="folHlink"/>
   </p:clrMapOvr>
 </p:sldLayout>
 </file>
@@ -348,13 +361,7 @@
       </p:grpSpPr>
       <p:sp>
         <p:nvSpPr>
-          <p:cNvPr id="2" name="Título 1">
-            <a:extLst>
-              <a:ext uri="{FF2B5EF4-FFF2-40B4-BE49-F238E27FC236}">
-                <a16:creationId xmlns:a16="http://schemas.microsoft.com/office/drawing/2014/main" id="{E24FEE35-1AD4-4A76-ADF4-EEADF518350C}"/>
-              </a:ext>
-            </a:extLst>
-          </p:cNvPr>
+          <p:cNvPr id="2" name="Title 1"/>
           <p:cNvSpPr>
             <a:spLocks noGrp="1"/>
           </p:cNvSpPr>
@@ -371,19 +378,13 @@
               <a:rPr lang="es-ES"/>
               <a:t>Haga clic para modificar el estilo de título del patrón</a:t>
             </a:r>
-            <a:endParaRPr lang="es-CO"/>
-          </a:p>
-        </p:txBody>
-      </p:sp>
-      <p:sp>
-        <p:nvSpPr>
-          <p:cNvPr id="3" name="Marcador de texto vertical 2">
-            <a:extLst>
-              <a:ext uri="{FF2B5EF4-FFF2-40B4-BE49-F238E27FC236}">
-                <a16:creationId xmlns:a16="http://schemas.microsoft.com/office/drawing/2014/main" id="{9C51C675-4028-419A-B51B-803144C8AC63}"/>
-              </a:ext>
-            </a:extLst>
-          </p:cNvPr>
+            <a:endParaRPr lang="en-US" dirty="0"/>
+          </a:p>
+        </p:txBody>
+      </p:sp>
+      <p:sp>
+        <p:nvSpPr>
+          <p:cNvPr id="3" name="Vertical Text Placeholder 2"/>
           <p:cNvSpPr>
             <a:spLocks noGrp="1"/>
           </p:cNvSpPr>
@@ -429,19 +430,13 @@
               <a:rPr lang="es-ES"/>
               <a:t>Quinto nivel</a:t>
             </a:r>
-            <a:endParaRPr lang="es-CO"/>
-          </a:p>
-        </p:txBody>
-      </p:sp>
-      <p:sp>
-        <p:nvSpPr>
-          <p:cNvPr id="4" name="Marcador de fecha 3">
-            <a:extLst>
-              <a:ext uri="{FF2B5EF4-FFF2-40B4-BE49-F238E27FC236}">
-                <a16:creationId xmlns:a16="http://schemas.microsoft.com/office/drawing/2014/main" id="{8A95BBB1-D601-4D8C-A9FB-A6E406E85E03}"/>
-              </a:ext>
-            </a:extLst>
-          </p:cNvPr>
+            <a:endParaRPr lang="en-US" dirty="0"/>
+          </a:p>
+        </p:txBody>
+      </p:sp>
+      <p:sp>
+        <p:nvSpPr>
+          <p:cNvPr id="4" name="Date Placeholder 3"/>
           <p:cNvSpPr>
             <a:spLocks noGrp="1"/>
           </p:cNvSpPr>
@@ -456,7 +451,7 @@
           <a:p>
             <a:fld id="{3E530A29-EDEA-4C59-80FD-EF4091401625}" type="datetimeFigureOut">
               <a:rPr lang="es-CO" smtClean="0"/>
-              <a:t>11/04/2021</a:t>
+              <a:t>25/04/2021</a:t>
             </a:fld>
             <a:endParaRPr lang="es-CO"/>
           </a:p>
@@ -464,13 +459,7 @@
       </p:sp>
       <p:sp>
         <p:nvSpPr>
-          <p:cNvPr id="5" name="Marcador de pie de página 4">
-            <a:extLst>
-              <a:ext uri="{FF2B5EF4-FFF2-40B4-BE49-F238E27FC236}">
-                <a16:creationId xmlns:a16="http://schemas.microsoft.com/office/drawing/2014/main" id="{BFF588AA-C537-4A43-A53B-983C5D4E477D}"/>
-              </a:ext>
-            </a:extLst>
-          </p:cNvPr>
+          <p:cNvPr id="5" name="Footer Placeholder 4"/>
           <p:cNvSpPr>
             <a:spLocks noGrp="1"/>
           </p:cNvSpPr>
@@ -489,13 +478,7 @@
       </p:sp>
       <p:sp>
         <p:nvSpPr>
-          <p:cNvPr id="6" name="Marcador de número de diapositiva 5">
-            <a:extLst>
-              <a:ext uri="{FF2B5EF4-FFF2-40B4-BE49-F238E27FC236}">
-                <a16:creationId xmlns:a16="http://schemas.microsoft.com/office/drawing/2014/main" id="{56DE0817-52CA-4ED9-97D9-23D1736237A8}"/>
-              </a:ext>
-            </a:extLst>
-          </p:cNvPr>
+          <p:cNvPr id="6" name="Slide Number Placeholder 5"/>
           <p:cNvSpPr>
             <a:spLocks noGrp="1"/>
           </p:cNvSpPr>
@@ -519,7 +502,7 @@
     </p:spTree>
     <p:extLst>
       <p:ext uri="{BB962C8B-B14F-4D97-AF65-F5344CB8AC3E}">
-        <p14:creationId xmlns:p14="http://schemas.microsoft.com/office/powerpoint/2010/main" val="726823618"/>
+        <p14:creationId xmlns:p14="http://schemas.microsoft.com/office/powerpoint/2010/main" val="3827033759"/>
       </p:ext>
     </p:extLst>
   </p:cSld>
@@ -548,13 +531,7 @@
       </p:grpSpPr>
       <p:sp>
         <p:nvSpPr>
-          <p:cNvPr id="2" name="Título vertical 1">
-            <a:extLst>
-              <a:ext uri="{FF2B5EF4-FFF2-40B4-BE49-F238E27FC236}">
-                <a16:creationId xmlns:a16="http://schemas.microsoft.com/office/drawing/2014/main" id="{C08056D1-C421-47EF-A163-A638FF07320A}"/>
-              </a:ext>
-            </a:extLst>
-          </p:cNvPr>
+          <p:cNvPr id="2" name="Vertical Title 1"/>
           <p:cNvSpPr>
             <a:spLocks noGrp="1"/>
           </p:cNvSpPr>
@@ -564,8 +541,8 @@
         </p:nvSpPr>
         <p:spPr>
           <a:xfrm>
-            <a:off x="8724900" y="365125"/>
-            <a:ext cx="2628900" cy="5811838"/>
+            <a:off x="8653112" y="937260"/>
+            <a:ext cx="1298608" cy="4983480"/>
           </a:xfrm>
         </p:spPr>
         <p:txBody>
@@ -576,19 +553,13 @@
               <a:rPr lang="es-ES"/>
               <a:t>Haga clic para modificar el estilo de título del patrón</a:t>
             </a:r>
-            <a:endParaRPr lang="es-CO"/>
-          </a:p>
-        </p:txBody>
-      </p:sp>
-      <p:sp>
-        <p:nvSpPr>
-          <p:cNvPr id="3" name="Marcador de texto vertical 2">
-            <a:extLst>
-              <a:ext uri="{FF2B5EF4-FFF2-40B4-BE49-F238E27FC236}">
-                <a16:creationId xmlns:a16="http://schemas.microsoft.com/office/drawing/2014/main" id="{7982B6FA-C797-4F5F-A005-51C9E140EC15}"/>
-              </a:ext>
-            </a:extLst>
-          </p:cNvPr>
+            <a:endParaRPr lang="en-US" dirty="0"/>
+          </a:p>
+        </p:txBody>
+      </p:sp>
+      <p:sp>
+        <p:nvSpPr>
+          <p:cNvPr id="3" name="Vertical Text Placeholder 2"/>
           <p:cNvSpPr>
             <a:spLocks noGrp="1"/>
           </p:cNvSpPr>
@@ -598,8 +569,8 @@
         </p:nvSpPr>
         <p:spPr>
           <a:xfrm>
-            <a:off x="838200" y="365125"/>
-            <a:ext cx="7734300" cy="5811838"/>
+            <a:off x="2231136" y="937260"/>
+            <a:ext cx="6198489" cy="4983480"/>
           </a:xfrm>
         </p:spPr>
         <p:txBody>
@@ -639,19 +610,13 @@
               <a:rPr lang="es-ES"/>
               <a:t>Quinto nivel</a:t>
             </a:r>
-            <a:endParaRPr lang="es-CO"/>
-          </a:p>
-        </p:txBody>
-      </p:sp>
-      <p:sp>
-        <p:nvSpPr>
-          <p:cNvPr id="4" name="Marcador de fecha 3">
-            <a:extLst>
-              <a:ext uri="{FF2B5EF4-FFF2-40B4-BE49-F238E27FC236}">
-                <a16:creationId xmlns:a16="http://schemas.microsoft.com/office/drawing/2014/main" id="{1E2AC890-A654-4F74-ADBD-39B14A8BB3E4}"/>
-              </a:ext>
-            </a:extLst>
-          </p:cNvPr>
+            <a:endParaRPr lang="en-US" dirty="0"/>
+          </a:p>
+        </p:txBody>
+      </p:sp>
+      <p:sp>
+        <p:nvSpPr>
+          <p:cNvPr id="4" name="Date Placeholder 3"/>
           <p:cNvSpPr>
             <a:spLocks noGrp="1"/>
           </p:cNvSpPr>
@@ -666,7 +631,7 @@
           <a:p>
             <a:fld id="{3E530A29-EDEA-4C59-80FD-EF4091401625}" type="datetimeFigureOut">
               <a:rPr lang="es-CO" smtClean="0"/>
-              <a:t>11/04/2021</a:t>
+              <a:t>25/04/2021</a:t>
             </a:fld>
             <a:endParaRPr lang="es-CO"/>
           </a:p>
@@ -674,13 +639,7 @@
       </p:sp>
       <p:sp>
         <p:nvSpPr>
-          <p:cNvPr id="5" name="Marcador de pie de página 4">
-            <a:extLst>
-              <a:ext uri="{FF2B5EF4-FFF2-40B4-BE49-F238E27FC236}">
-                <a16:creationId xmlns:a16="http://schemas.microsoft.com/office/drawing/2014/main" id="{B1B45337-DBC2-416E-AEFC-D2263C7AFB80}"/>
-              </a:ext>
-            </a:extLst>
-          </p:cNvPr>
+          <p:cNvPr id="5" name="Footer Placeholder 4"/>
           <p:cNvSpPr>
             <a:spLocks noGrp="1"/>
           </p:cNvSpPr>
@@ -699,13 +658,7 @@
       </p:sp>
       <p:sp>
         <p:nvSpPr>
-          <p:cNvPr id="6" name="Marcador de número de diapositiva 5">
-            <a:extLst>
-              <a:ext uri="{FF2B5EF4-FFF2-40B4-BE49-F238E27FC236}">
-                <a16:creationId xmlns:a16="http://schemas.microsoft.com/office/drawing/2014/main" id="{36A8D632-20CE-41B7-91D6-E37033254DED}"/>
-              </a:ext>
-            </a:extLst>
-          </p:cNvPr>
+          <p:cNvPr id="6" name="Slide Number Placeholder 5"/>
           <p:cNvSpPr>
             <a:spLocks noGrp="1"/>
           </p:cNvSpPr>
@@ -729,7 +682,7 @@
     </p:spTree>
     <p:extLst>
       <p:ext uri="{BB962C8B-B14F-4D97-AF65-F5344CB8AC3E}">
-        <p14:creationId xmlns:p14="http://schemas.microsoft.com/office/powerpoint/2010/main" val="3868964666"/>
+        <p14:creationId xmlns:p14="http://schemas.microsoft.com/office/powerpoint/2010/main" val="1995342752"/>
       </p:ext>
     </p:extLst>
   </p:cSld>
@@ -758,13 +711,7 @@
       </p:grpSpPr>
       <p:sp>
         <p:nvSpPr>
-          <p:cNvPr id="2" name="Título 1">
-            <a:extLst>
-              <a:ext uri="{FF2B5EF4-FFF2-40B4-BE49-F238E27FC236}">
-                <a16:creationId xmlns:a16="http://schemas.microsoft.com/office/drawing/2014/main" id="{0DBCC28D-7436-4E29-9AE2-55BF1E9C21ED}"/>
-              </a:ext>
-            </a:extLst>
-          </p:cNvPr>
+          <p:cNvPr id="2" name="Title 1"/>
           <p:cNvSpPr>
             <a:spLocks noGrp="1"/>
           </p:cNvSpPr>
@@ -781,19 +728,13 @@
               <a:rPr lang="es-ES"/>
               <a:t>Haga clic para modificar el estilo de título del patrón</a:t>
             </a:r>
-            <a:endParaRPr lang="es-CO"/>
-          </a:p>
-        </p:txBody>
-      </p:sp>
-      <p:sp>
-        <p:nvSpPr>
-          <p:cNvPr id="3" name="Marcador de contenido 2">
-            <a:extLst>
-              <a:ext uri="{FF2B5EF4-FFF2-40B4-BE49-F238E27FC236}">
-                <a16:creationId xmlns:a16="http://schemas.microsoft.com/office/drawing/2014/main" id="{5AC00F54-0A35-4229-A799-179319C18BD2}"/>
-              </a:ext>
-            </a:extLst>
-          </p:cNvPr>
+            <a:endParaRPr lang="en-US" dirty="0"/>
+          </a:p>
+        </p:txBody>
+      </p:sp>
+      <p:sp>
+        <p:nvSpPr>
+          <p:cNvPr id="3" name="Content Placeholder 2"/>
           <p:cNvSpPr>
             <a:spLocks noGrp="1"/>
           </p:cNvSpPr>
@@ -839,19 +780,13 @@
               <a:rPr lang="es-ES"/>
               <a:t>Quinto nivel</a:t>
             </a:r>
-            <a:endParaRPr lang="es-CO"/>
-          </a:p>
-        </p:txBody>
-      </p:sp>
-      <p:sp>
-        <p:nvSpPr>
-          <p:cNvPr id="4" name="Marcador de fecha 3">
-            <a:extLst>
-              <a:ext uri="{FF2B5EF4-FFF2-40B4-BE49-F238E27FC236}">
-                <a16:creationId xmlns:a16="http://schemas.microsoft.com/office/drawing/2014/main" id="{191314A2-7DC3-49CA-8C6A-5B9CF254E025}"/>
-              </a:ext>
-            </a:extLst>
-          </p:cNvPr>
+            <a:endParaRPr lang="en-US" dirty="0"/>
+          </a:p>
+        </p:txBody>
+      </p:sp>
+      <p:sp>
+        <p:nvSpPr>
+          <p:cNvPr id="7" name="Date Placeholder 6"/>
           <p:cNvSpPr>
             <a:spLocks noGrp="1"/>
           </p:cNvSpPr>
@@ -866,7 +801,7 @@
           <a:p>
             <a:fld id="{3E530A29-EDEA-4C59-80FD-EF4091401625}" type="datetimeFigureOut">
               <a:rPr lang="es-CO" smtClean="0"/>
-              <a:t>11/04/2021</a:t>
+              <a:t>25/04/2021</a:t>
             </a:fld>
             <a:endParaRPr lang="es-CO"/>
           </a:p>
@@ -874,13 +809,7 @@
       </p:sp>
       <p:sp>
         <p:nvSpPr>
-          <p:cNvPr id="5" name="Marcador de pie de página 4">
-            <a:extLst>
-              <a:ext uri="{FF2B5EF4-FFF2-40B4-BE49-F238E27FC236}">
-                <a16:creationId xmlns:a16="http://schemas.microsoft.com/office/drawing/2014/main" id="{AC24C76F-75ED-4EFC-BC6A-BA0F5AE32297}"/>
-              </a:ext>
-            </a:extLst>
-          </p:cNvPr>
+          <p:cNvPr id="8" name="Footer Placeholder 7"/>
           <p:cNvSpPr>
             <a:spLocks noGrp="1"/>
           </p:cNvSpPr>
@@ -899,13 +828,7 @@
       </p:sp>
       <p:sp>
         <p:nvSpPr>
-          <p:cNvPr id="6" name="Marcador de número de diapositiva 5">
-            <a:extLst>
-              <a:ext uri="{FF2B5EF4-FFF2-40B4-BE49-F238E27FC236}">
-                <a16:creationId xmlns:a16="http://schemas.microsoft.com/office/drawing/2014/main" id="{14B8ADA1-0593-4ECE-8035-0A446231FEC3}"/>
-              </a:ext>
-            </a:extLst>
-          </p:cNvPr>
+          <p:cNvPr id="9" name="Slide Number Placeholder 8"/>
           <p:cNvSpPr>
             <a:spLocks noGrp="1"/>
           </p:cNvSpPr>
@@ -929,7 +852,7 @@
     </p:spTree>
     <p:extLst>
       <p:ext uri="{BB962C8B-B14F-4D97-AF65-F5344CB8AC3E}">
-        <p14:creationId xmlns:p14="http://schemas.microsoft.com/office/powerpoint/2010/main" val="3557983087"/>
+        <p14:creationId xmlns:p14="http://schemas.microsoft.com/office/powerpoint/2010/main" val="871105656"/>
       </p:ext>
     </p:extLst>
   </p:cSld>
@@ -942,6 +865,14 @@
 <file path=ppt/slideLayouts/slideLayout3.xml><?xml version="1.0" encoding="utf-8"?>
 <p:sldLayout xmlns:a="http://schemas.openxmlformats.org/drawingml/2006/main" xmlns:r="http://schemas.openxmlformats.org/officeDocument/2006/relationships" xmlns:p="http://schemas.openxmlformats.org/presentationml/2006/main" type="secHead" preserve="1">
   <p:cSld name="Encabezado de sección">
+    <p:bg>
+      <p:bgPr>
+        <a:solidFill>
+          <a:schemeClr val="accent1"/>
+        </a:solidFill>
+        <a:effectLst/>
+      </p:bgPr>
+    </p:bg>
     <p:spTree>
       <p:nvGrpSpPr>
         <p:cNvPr id="1" name=""/>
@@ -958,74 +889,76 @@
       </p:grpSpPr>
       <p:sp>
         <p:nvSpPr>
-          <p:cNvPr id="2" name="Título 1">
-            <a:extLst>
-              <a:ext uri="{FF2B5EF4-FFF2-40B4-BE49-F238E27FC236}">
-                <a16:creationId xmlns:a16="http://schemas.microsoft.com/office/drawing/2014/main" id="{A3690D7B-678A-4803-B792-CF590090730E}"/>
-              </a:ext>
-            </a:extLst>
-          </p:cNvPr>
+          <p:cNvPr id="2" name="Title 1"/>
           <p:cNvSpPr>
             <a:spLocks noGrp="1"/>
           </p:cNvSpPr>
           <p:nvPr>
             <p:ph type="title"/>
+          </p:nvPr>
+        </p:nvSpPr>
+        <p:spPr bwMode="blackWhite">
+          <a:xfrm>
+            <a:off x="1600200" y="2386744"/>
+            <a:ext cx="8991600" cy="1645920"/>
+          </a:xfrm>
+          <a:solidFill>
+            <a:srgbClr val="FFFFFF"/>
+          </a:solidFill>
+          <a:ln w="38100">
+            <a:solidFill>
+              <a:srgbClr val="404040"/>
+            </a:solidFill>
+          </a:ln>
+        </p:spPr>
+        <p:txBody>
+          <a:bodyPr lIns="274320" rIns="274320" anchor="ctr" anchorCtr="1">
+            <a:normAutofit/>
+          </a:bodyPr>
+          <a:lstStyle>
+            <a:lvl1pPr>
+              <a:defRPr sz="3800">
+                <a:solidFill>
+                  <a:srgbClr val="262626"/>
+                </a:solidFill>
+              </a:defRPr>
+            </a:lvl1pPr>
+          </a:lstStyle>
+          <a:p>
+            <a:r>
+              <a:rPr lang="es-ES"/>
+              <a:t>Haga clic para modificar el estilo de título del patrón</a:t>
+            </a:r>
+            <a:endParaRPr lang="en-US" dirty="0"/>
+          </a:p>
+        </p:txBody>
+      </p:sp>
+      <p:sp>
+        <p:nvSpPr>
+          <p:cNvPr id="3" name="Text Placeholder 2"/>
+          <p:cNvSpPr>
+            <a:spLocks noGrp="1"/>
+          </p:cNvSpPr>
+          <p:nvPr>
+            <p:ph type="body" idx="1"/>
           </p:nvPr>
         </p:nvSpPr>
         <p:spPr>
           <a:xfrm>
-            <a:off x="831850" y="1709738"/>
-            <a:ext cx="10515600" cy="2852737"/>
+            <a:off x="2695194" y="4352465"/>
+            <a:ext cx="6801612" cy="1265082"/>
           </a:xfrm>
         </p:spPr>
         <p:txBody>
-          <a:bodyPr anchor="b"/>
-          <a:lstStyle>
-            <a:lvl1pPr>
-              <a:defRPr sz="6000"/>
-            </a:lvl1pPr>
-          </a:lstStyle>
-          <a:p>
-            <a:r>
-              <a:rPr lang="es-ES"/>
-              <a:t>Haga clic para modificar el estilo de título del patrón</a:t>
-            </a:r>
-            <a:endParaRPr lang="es-CO"/>
-          </a:p>
-        </p:txBody>
-      </p:sp>
-      <p:sp>
-        <p:nvSpPr>
-          <p:cNvPr id="3" name="Marcador de texto 2">
-            <a:extLst>
-              <a:ext uri="{FF2B5EF4-FFF2-40B4-BE49-F238E27FC236}">
-                <a16:creationId xmlns:a16="http://schemas.microsoft.com/office/drawing/2014/main" id="{BACCBD9D-C3EC-41D4-B511-120395749A97}"/>
-              </a:ext>
-            </a:extLst>
-          </p:cNvPr>
-          <p:cNvSpPr>
-            <a:spLocks noGrp="1"/>
-          </p:cNvSpPr>
-          <p:nvPr>
-            <p:ph type="body" idx="1"/>
-          </p:nvPr>
-        </p:nvSpPr>
-        <p:spPr>
-          <a:xfrm>
-            <a:off x="831850" y="4589463"/>
-            <a:ext cx="10515600" cy="1500187"/>
-          </a:xfrm>
-        </p:spPr>
-        <p:txBody>
-          <a:bodyPr/>
+          <a:bodyPr anchor="t" anchorCtr="1">
+            <a:normAutofit/>
+          </a:bodyPr>
           <a:lstStyle>
             <a:lvl1pPr marL="0" indent="0">
               <a:buNone/>
-              <a:defRPr sz="2400">
+              <a:defRPr sz="2000">
                 <a:solidFill>
-                  <a:schemeClr val="tx1">
-                    <a:tint val="75000"/>
-                  </a:schemeClr>
+                  <a:schemeClr val="tx1"/>
                 </a:solidFill>
               </a:defRPr>
             </a:lvl1pPr>
@@ -1121,13 +1054,7 @@
       </p:sp>
       <p:sp>
         <p:nvSpPr>
-          <p:cNvPr id="4" name="Marcador de fecha 3">
-            <a:extLst>
-              <a:ext uri="{FF2B5EF4-FFF2-40B4-BE49-F238E27FC236}">
-                <a16:creationId xmlns:a16="http://schemas.microsoft.com/office/drawing/2014/main" id="{4B07D6E7-D997-41B3-8B3C-DC788E3CD87F}"/>
-              </a:ext>
-            </a:extLst>
-          </p:cNvPr>
+          <p:cNvPr id="7" name="Date Placeholder 6"/>
           <p:cNvSpPr>
             <a:spLocks noGrp="1"/>
           </p:cNvSpPr>
@@ -1142,7 +1069,7 @@
           <a:p>
             <a:fld id="{3E530A29-EDEA-4C59-80FD-EF4091401625}" type="datetimeFigureOut">
               <a:rPr lang="es-CO" smtClean="0"/>
-              <a:t>11/04/2021</a:t>
+              <a:t>25/04/2021</a:t>
             </a:fld>
             <a:endParaRPr lang="es-CO"/>
           </a:p>
@@ -1150,13 +1077,7 @@
       </p:sp>
       <p:sp>
         <p:nvSpPr>
-          <p:cNvPr id="5" name="Marcador de pie de página 4">
-            <a:extLst>
-              <a:ext uri="{FF2B5EF4-FFF2-40B4-BE49-F238E27FC236}">
-                <a16:creationId xmlns:a16="http://schemas.microsoft.com/office/drawing/2014/main" id="{F18BFFCD-C857-469F-AD25-1A019545100D}"/>
-              </a:ext>
-            </a:extLst>
-          </p:cNvPr>
+          <p:cNvPr id="8" name="Footer Placeholder 7"/>
           <p:cNvSpPr>
             <a:spLocks noGrp="1"/>
           </p:cNvSpPr>
@@ -1175,13 +1096,7 @@
       </p:sp>
       <p:sp>
         <p:nvSpPr>
-          <p:cNvPr id="6" name="Marcador de número de diapositiva 5">
-            <a:extLst>
-              <a:ext uri="{FF2B5EF4-FFF2-40B4-BE49-F238E27FC236}">
-                <a16:creationId xmlns:a16="http://schemas.microsoft.com/office/drawing/2014/main" id="{4CE51E9B-8EAF-4064-A0B6-D43E3379F952}"/>
-              </a:ext>
-            </a:extLst>
-          </p:cNvPr>
+          <p:cNvPr id="9" name="Slide Number Placeholder 8"/>
           <p:cNvSpPr>
             <a:spLocks noGrp="1"/>
           </p:cNvSpPr>
@@ -1205,12 +1120,12 @@
     </p:spTree>
     <p:extLst>
       <p:ext uri="{BB962C8B-B14F-4D97-AF65-F5344CB8AC3E}">
-        <p14:creationId xmlns:p14="http://schemas.microsoft.com/office/powerpoint/2010/main" val="1289930763"/>
+        <p14:creationId xmlns:p14="http://schemas.microsoft.com/office/powerpoint/2010/main" val="3543489288"/>
       </p:ext>
     </p:extLst>
   </p:cSld>
   <p:clrMapOvr>
-    <a:masterClrMapping/>
+    <a:overrideClrMapping bg1="dk1" tx1="lt1" bg2="dk2" tx2="lt2" accent1="accent1" accent2="accent2" accent3="accent3" accent4="accent4" accent5="accent5" accent6="accent6" hlink="hlink" folHlink="folHlink"/>
   </p:clrMapOvr>
 </p:sldLayout>
 </file>
@@ -1234,13 +1149,7 @@
       </p:grpSpPr>
       <p:sp>
         <p:nvSpPr>
-          <p:cNvPr id="2" name="Título 1">
-            <a:extLst>
-              <a:ext uri="{FF2B5EF4-FFF2-40B4-BE49-F238E27FC236}">
-                <a16:creationId xmlns:a16="http://schemas.microsoft.com/office/drawing/2014/main" id="{77DB1E3C-CB0C-424D-9F97-BEBF19BB8B4D}"/>
-              </a:ext>
-            </a:extLst>
-          </p:cNvPr>
+          <p:cNvPr id="2" name="Title 1"/>
           <p:cNvSpPr>
             <a:spLocks noGrp="1"/>
           </p:cNvSpPr>
@@ -1257,19 +1166,13 @@
               <a:rPr lang="es-ES"/>
               <a:t>Haga clic para modificar el estilo de título del patrón</a:t>
             </a:r>
-            <a:endParaRPr lang="es-CO"/>
-          </a:p>
-        </p:txBody>
-      </p:sp>
-      <p:sp>
-        <p:nvSpPr>
-          <p:cNvPr id="3" name="Marcador de contenido 2">
-            <a:extLst>
-              <a:ext uri="{FF2B5EF4-FFF2-40B4-BE49-F238E27FC236}">
-                <a16:creationId xmlns:a16="http://schemas.microsoft.com/office/drawing/2014/main" id="{C11FDFEE-6117-47CC-AB04-02C7C810AEFB}"/>
-              </a:ext>
-            </a:extLst>
-          </p:cNvPr>
+            <a:endParaRPr lang="en-US" dirty="0"/>
+          </a:p>
+        </p:txBody>
+      </p:sp>
+      <p:sp>
+        <p:nvSpPr>
+          <p:cNvPr id="3" name="Content Placeholder 2"/>
           <p:cNvSpPr>
             <a:spLocks noGrp="1"/>
           </p:cNvSpPr>
@@ -1279,8 +1182,8 @@
         </p:nvSpPr>
         <p:spPr>
           <a:xfrm>
-            <a:off x="838200" y="1825625"/>
-            <a:ext cx="5181600" cy="4351338"/>
+            <a:off x="1581912" y="2638044"/>
+            <a:ext cx="4271771" cy="3101982"/>
           </a:xfrm>
         </p:spPr>
         <p:txBody>
@@ -1320,19 +1223,13 @@
               <a:rPr lang="es-ES"/>
               <a:t>Quinto nivel</a:t>
             </a:r>
-            <a:endParaRPr lang="es-CO"/>
-          </a:p>
-        </p:txBody>
-      </p:sp>
-      <p:sp>
-        <p:nvSpPr>
-          <p:cNvPr id="4" name="Marcador de contenido 3">
-            <a:extLst>
-              <a:ext uri="{FF2B5EF4-FFF2-40B4-BE49-F238E27FC236}">
-                <a16:creationId xmlns:a16="http://schemas.microsoft.com/office/drawing/2014/main" id="{23983F2E-DC0A-44A7-8634-2BA8074AC230}"/>
-              </a:ext>
-            </a:extLst>
-          </p:cNvPr>
+            <a:endParaRPr lang="en-US" dirty="0"/>
+          </a:p>
+        </p:txBody>
+      </p:sp>
+      <p:sp>
+        <p:nvSpPr>
+          <p:cNvPr id="4" name="Content Placeholder 3"/>
           <p:cNvSpPr>
             <a:spLocks noGrp="1"/>
           </p:cNvSpPr>
@@ -1342,8 +1239,8 @@
         </p:nvSpPr>
         <p:spPr>
           <a:xfrm>
-            <a:off x="6172200" y="1825625"/>
-            <a:ext cx="5181600" cy="4351338"/>
+            <a:off x="6338315" y="2638044"/>
+            <a:ext cx="4270247" cy="3101982"/>
           </a:xfrm>
         </p:spPr>
         <p:txBody>
@@ -1383,19 +1280,13 @@
               <a:rPr lang="es-ES"/>
               <a:t>Quinto nivel</a:t>
             </a:r>
-            <a:endParaRPr lang="es-CO"/>
-          </a:p>
-        </p:txBody>
-      </p:sp>
-      <p:sp>
-        <p:nvSpPr>
-          <p:cNvPr id="5" name="Marcador de fecha 4">
-            <a:extLst>
-              <a:ext uri="{FF2B5EF4-FFF2-40B4-BE49-F238E27FC236}">
-                <a16:creationId xmlns:a16="http://schemas.microsoft.com/office/drawing/2014/main" id="{83B89BBD-DE01-4648-9CCD-D2CB6BD2C13B}"/>
-              </a:ext>
-            </a:extLst>
-          </p:cNvPr>
+            <a:endParaRPr lang="en-US" dirty="0"/>
+          </a:p>
+        </p:txBody>
+      </p:sp>
+      <p:sp>
+        <p:nvSpPr>
+          <p:cNvPr id="8" name="Date Placeholder 7"/>
           <p:cNvSpPr>
             <a:spLocks noGrp="1"/>
           </p:cNvSpPr>
@@ -1410,7 +1301,7 @@
           <a:p>
             <a:fld id="{3E530A29-EDEA-4C59-80FD-EF4091401625}" type="datetimeFigureOut">
               <a:rPr lang="es-CO" smtClean="0"/>
-              <a:t>11/04/2021</a:t>
+              <a:t>25/04/2021</a:t>
             </a:fld>
             <a:endParaRPr lang="es-CO"/>
           </a:p>
@@ -1418,13 +1309,7 @@
       </p:sp>
       <p:sp>
         <p:nvSpPr>
-          <p:cNvPr id="6" name="Marcador de pie de página 5">
-            <a:extLst>
-              <a:ext uri="{FF2B5EF4-FFF2-40B4-BE49-F238E27FC236}">
-                <a16:creationId xmlns:a16="http://schemas.microsoft.com/office/drawing/2014/main" id="{86000D3E-51CA-4E29-ADE0-1148D1505A6D}"/>
-              </a:ext>
-            </a:extLst>
-          </p:cNvPr>
+          <p:cNvPr id="9" name="Footer Placeholder 8"/>
           <p:cNvSpPr>
             <a:spLocks noGrp="1"/>
           </p:cNvSpPr>
@@ -1443,13 +1328,7 @@
       </p:sp>
       <p:sp>
         <p:nvSpPr>
-          <p:cNvPr id="7" name="Marcador de número de diapositiva 6">
-            <a:extLst>
-              <a:ext uri="{FF2B5EF4-FFF2-40B4-BE49-F238E27FC236}">
-                <a16:creationId xmlns:a16="http://schemas.microsoft.com/office/drawing/2014/main" id="{D9ED4800-9460-4F0F-B943-FF9E1AF9C5C7}"/>
-              </a:ext>
-            </a:extLst>
-          </p:cNvPr>
+          <p:cNvPr id="10" name="Slide Number Placeholder 9"/>
           <p:cNvSpPr>
             <a:spLocks noGrp="1"/>
           </p:cNvSpPr>
@@ -1473,7 +1352,7 @@
     </p:spTree>
     <p:extLst>
       <p:ext uri="{BB962C8B-B14F-4D97-AF65-F5344CB8AC3E}">
-        <p14:creationId xmlns:p14="http://schemas.microsoft.com/office/powerpoint/2010/main" val="2217774573"/>
+        <p14:creationId xmlns:p14="http://schemas.microsoft.com/office/powerpoint/2010/main" val="2341535902"/>
       </p:ext>
     </p:extLst>
   </p:cSld>
@@ -1502,70 +1381,38 @@
       </p:grpSpPr>
       <p:sp>
         <p:nvSpPr>
-          <p:cNvPr id="2" name="Título 1">
-            <a:extLst>
-              <a:ext uri="{FF2B5EF4-FFF2-40B4-BE49-F238E27FC236}">
-                <a16:creationId xmlns:a16="http://schemas.microsoft.com/office/drawing/2014/main" id="{0CCE2B89-C236-46C0-9BDA-9D8800E950BB}"/>
-              </a:ext>
-            </a:extLst>
-          </p:cNvPr>
-          <p:cNvSpPr>
-            <a:spLocks noGrp="1"/>
-          </p:cNvSpPr>
-          <p:nvPr>
-            <p:ph type="title"/>
+          <p:cNvPr id="3" name="Text Placeholder 2"/>
+          <p:cNvSpPr>
+            <a:spLocks noGrp="1"/>
+          </p:cNvSpPr>
+          <p:nvPr>
+            <p:ph type="body" idx="1"/>
           </p:nvPr>
         </p:nvSpPr>
         <p:spPr>
           <a:xfrm>
-            <a:off x="839788" y="365125"/>
-            <a:ext cx="10515600" cy="1325563"/>
+            <a:off x="1583436" y="2313433"/>
+            <a:ext cx="4270248" cy="704087"/>
           </a:xfrm>
         </p:spPr>
         <p:txBody>
-          <a:bodyPr/>
-          <a:lstStyle/>
-          <a:p>
-            <a:r>
-              <a:rPr lang="es-ES"/>
-              <a:t>Haga clic para modificar el estilo de título del patrón</a:t>
-            </a:r>
-            <a:endParaRPr lang="es-CO"/>
-          </a:p>
-        </p:txBody>
-      </p:sp>
-      <p:sp>
-        <p:nvSpPr>
-          <p:cNvPr id="3" name="Marcador de texto 2">
-            <a:extLst>
-              <a:ext uri="{FF2B5EF4-FFF2-40B4-BE49-F238E27FC236}">
-                <a16:creationId xmlns:a16="http://schemas.microsoft.com/office/drawing/2014/main" id="{F4624B3F-758E-40D9-9EAD-888C3203346A}"/>
-              </a:ext>
-            </a:extLst>
-          </p:cNvPr>
-          <p:cNvSpPr>
-            <a:spLocks noGrp="1"/>
-          </p:cNvSpPr>
-          <p:nvPr>
-            <p:ph type="body" idx="1"/>
-          </p:nvPr>
-        </p:nvSpPr>
-        <p:spPr>
-          <a:xfrm>
-            <a:off x="839788" y="1681163"/>
-            <a:ext cx="5157787" cy="823912"/>
-          </a:xfrm>
-        </p:spPr>
-        <p:txBody>
-          <a:bodyPr anchor="b"/>
+          <a:bodyPr anchor="b" anchorCtr="1">
+            <a:normAutofit/>
+          </a:bodyPr>
           <a:lstStyle>
-            <a:lvl1pPr marL="0" indent="0">
-              <a:buNone/>
-              <a:defRPr sz="2400" b="1"/>
+            <a:lvl1pPr marL="0" indent="0" algn="ctr">
+              <a:buNone/>
+              <a:defRPr sz="1900" b="0" cap="all" spc="100" baseline="0">
+                <a:solidFill>
+                  <a:schemeClr val="accent2">
+                    <a:lumMod val="75000"/>
+                  </a:schemeClr>
+                </a:solidFill>
+              </a:defRPr>
             </a:lvl1pPr>
             <a:lvl2pPr marL="457200" indent="0">
               <a:buNone/>
-              <a:defRPr sz="2000" b="1"/>
+              <a:defRPr sz="1900" b="1"/>
             </a:lvl2pPr>
             <a:lvl3pPr marL="914400" indent="0">
               <a:buNone/>
@@ -1607,13 +1454,7 @@
       </p:sp>
       <p:sp>
         <p:nvSpPr>
-          <p:cNvPr id="4" name="Marcador de contenido 3">
-            <a:extLst>
-              <a:ext uri="{FF2B5EF4-FFF2-40B4-BE49-F238E27FC236}">
-                <a16:creationId xmlns:a16="http://schemas.microsoft.com/office/drawing/2014/main" id="{BD3684C8-F402-4EAE-A589-91EDBF9015D4}"/>
-              </a:ext>
-            </a:extLst>
-          </p:cNvPr>
+          <p:cNvPr id="4" name="Content Placeholder 3"/>
           <p:cNvSpPr>
             <a:spLocks noGrp="1"/>
           </p:cNvSpPr>
@@ -1623,8 +1464,8 @@
         </p:nvSpPr>
         <p:spPr>
           <a:xfrm>
-            <a:off x="839788" y="2505075"/>
-            <a:ext cx="5157787" cy="3684588"/>
+            <a:off x="1583436" y="3143250"/>
+            <a:ext cx="4270248" cy="2596776"/>
           </a:xfrm>
         </p:spPr>
         <p:txBody>
@@ -1664,42 +1505,105 @@
               <a:rPr lang="es-ES"/>
               <a:t>Quinto nivel</a:t>
             </a:r>
-            <a:endParaRPr lang="es-CO"/>
-          </a:p>
-        </p:txBody>
-      </p:sp>
-      <p:sp>
-        <p:nvSpPr>
-          <p:cNvPr id="5" name="Marcador de texto 4">
-            <a:extLst>
-              <a:ext uri="{FF2B5EF4-FFF2-40B4-BE49-F238E27FC236}">
-                <a16:creationId xmlns:a16="http://schemas.microsoft.com/office/drawing/2014/main" id="{6C860130-C674-4E4E-BB13-3010E163AD52}"/>
-              </a:ext>
-            </a:extLst>
-          </p:cNvPr>
-          <p:cNvSpPr>
-            <a:spLocks noGrp="1"/>
-          </p:cNvSpPr>
-          <p:nvPr>
-            <p:ph type="body" sz="quarter" idx="3"/>
+            <a:endParaRPr lang="en-US" dirty="0"/>
+          </a:p>
+        </p:txBody>
+      </p:sp>
+      <p:sp>
+        <p:nvSpPr>
+          <p:cNvPr id="6" name="Content Placeholder 5"/>
+          <p:cNvSpPr>
+            <a:spLocks noGrp="1"/>
+          </p:cNvSpPr>
+          <p:nvPr>
+            <p:ph sz="quarter" idx="4"/>
           </p:nvPr>
         </p:nvSpPr>
         <p:spPr>
           <a:xfrm>
-            <a:off x="6172200" y="1681163"/>
-            <a:ext cx="5183188" cy="823912"/>
+            <a:off x="6338316" y="3143250"/>
+            <a:ext cx="4253484" cy="2596776"/>
           </a:xfrm>
         </p:spPr>
         <p:txBody>
-          <a:bodyPr anchor="b"/>
+          <a:bodyPr/>
           <a:lstStyle>
-            <a:lvl1pPr marL="0" indent="0">
-              <a:buNone/>
-              <a:defRPr sz="2400" b="1"/>
+            <a:lvl5pPr>
+              <a:defRPr/>
+            </a:lvl5pPr>
+          </a:lstStyle>
+          <a:p>
+            <a:pPr lvl="0"/>
+            <a:r>
+              <a:rPr lang="es-ES"/>
+              <a:t>Haga clic para modificar los estilos de texto del patrón</a:t>
+            </a:r>
+          </a:p>
+          <a:p>
+            <a:pPr lvl="1"/>
+            <a:r>
+              <a:rPr lang="es-ES"/>
+              <a:t>Segundo nivel</a:t>
+            </a:r>
+          </a:p>
+          <a:p>
+            <a:pPr lvl="2"/>
+            <a:r>
+              <a:rPr lang="es-ES"/>
+              <a:t>Tercer nivel</a:t>
+            </a:r>
+          </a:p>
+          <a:p>
+            <a:pPr lvl="3"/>
+            <a:r>
+              <a:rPr lang="es-ES"/>
+              <a:t>Cuarto nivel</a:t>
+            </a:r>
+          </a:p>
+          <a:p>
+            <a:pPr lvl="4"/>
+            <a:r>
+              <a:rPr lang="es-ES"/>
+              <a:t>Quinto nivel</a:t>
+            </a:r>
+            <a:endParaRPr lang="en-US" dirty="0"/>
+          </a:p>
+        </p:txBody>
+      </p:sp>
+      <p:sp>
+        <p:nvSpPr>
+          <p:cNvPr id="11" name="Text Placeholder 4"/>
+          <p:cNvSpPr>
+            <a:spLocks noGrp="1"/>
+          </p:cNvSpPr>
+          <p:nvPr>
+            <p:ph type="body" sz="quarter" idx="13"/>
+          </p:nvPr>
+        </p:nvSpPr>
+        <p:spPr>
+          <a:xfrm>
+            <a:off x="6338316" y="2313433"/>
+            <a:ext cx="4270248" cy="704087"/>
+          </a:xfrm>
+        </p:spPr>
+        <p:txBody>
+          <a:bodyPr anchor="b" anchorCtr="1">
+            <a:normAutofit/>
+          </a:bodyPr>
+          <a:lstStyle>
+            <a:lvl1pPr marL="0" indent="0" algn="ctr">
+              <a:buNone/>
+              <a:defRPr sz="1900" b="0" cap="all" spc="100" baseline="0">
+                <a:solidFill>
+                  <a:schemeClr val="accent2">
+                    <a:lumMod val="75000"/>
+                  </a:schemeClr>
+                </a:solidFill>
+              </a:defRPr>
             </a:lvl1pPr>
             <a:lvl2pPr marL="457200" indent="0">
               <a:buNone/>
-              <a:defRPr sz="2000" b="1"/>
+              <a:defRPr sz="1900" b="1"/>
             </a:lvl2pPr>
             <a:lvl3pPr marL="914400" indent="0">
               <a:buNone/>
@@ -1741,76 +1645,7 @@
       </p:sp>
       <p:sp>
         <p:nvSpPr>
-          <p:cNvPr id="6" name="Marcador de contenido 5">
-            <a:extLst>
-              <a:ext uri="{FF2B5EF4-FFF2-40B4-BE49-F238E27FC236}">
-                <a16:creationId xmlns:a16="http://schemas.microsoft.com/office/drawing/2014/main" id="{2E1BA670-E5EA-4378-9E00-C32457AD984B}"/>
-              </a:ext>
-            </a:extLst>
-          </p:cNvPr>
-          <p:cNvSpPr>
-            <a:spLocks noGrp="1"/>
-          </p:cNvSpPr>
-          <p:nvPr>
-            <p:ph sz="quarter" idx="4"/>
-          </p:nvPr>
-        </p:nvSpPr>
-        <p:spPr>
-          <a:xfrm>
-            <a:off x="6172200" y="2505075"/>
-            <a:ext cx="5183188" cy="3684588"/>
-          </a:xfrm>
-        </p:spPr>
-        <p:txBody>
-          <a:bodyPr/>
-          <a:lstStyle/>
-          <a:p>
-            <a:pPr lvl="0"/>
-            <a:r>
-              <a:rPr lang="es-ES"/>
-              <a:t>Haga clic para modificar los estilos de texto del patrón</a:t>
-            </a:r>
-          </a:p>
-          <a:p>
-            <a:pPr lvl="1"/>
-            <a:r>
-              <a:rPr lang="es-ES"/>
-              <a:t>Segundo nivel</a:t>
-            </a:r>
-          </a:p>
-          <a:p>
-            <a:pPr lvl="2"/>
-            <a:r>
-              <a:rPr lang="es-ES"/>
-              <a:t>Tercer nivel</a:t>
-            </a:r>
-          </a:p>
-          <a:p>
-            <a:pPr lvl="3"/>
-            <a:r>
-              <a:rPr lang="es-ES"/>
-              <a:t>Cuarto nivel</a:t>
-            </a:r>
-          </a:p>
-          <a:p>
-            <a:pPr lvl="4"/>
-            <a:r>
-              <a:rPr lang="es-ES"/>
-              <a:t>Quinto nivel</a:t>
-            </a:r>
-            <a:endParaRPr lang="es-CO"/>
-          </a:p>
-        </p:txBody>
-      </p:sp>
-      <p:sp>
-        <p:nvSpPr>
-          <p:cNvPr id="7" name="Marcador de fecha 6">
-            <a:extLst>
-              <a:ext uri="{FF2B5EF4-FFF2-40B4-BE49-F238E27FC236}">
-                <a16:creationId xmlns:a16="http://schemas.microsoft.com/office/drawing/2014/main" id="{75CA5CFB-D66E-4299-AB6A-80FB1E7DB9C2}"/>
-              </a:ext>
-            </a:extLst>
-          </p:cNvPr>
+          <p:cNvPr id="7" name="Date Placeholder 6"/>
           <p:cNvSpPr>
             <a:spLocks noGrp="1"/>
           </p:cNvSpPr>
@@ -1825,7 +1660,7 @@
           <a:p>
             <a:fld id="{3E530A29-EDEA-4C59-80FD-EF4091401625}" type="datetimeFigureOut">
               <a:rPr lang="es-CO" smtClean="0"/>
-              <a:t>11/04/2021</a:t>
+              <a:t>25/04/2021</a:t>
             </a:fld>
             <a:endParaRPr lang="es-CO"/>
           </a:p>
@@ -1833,13 +1668,7 @@
       </p:sp>
       <p:sp>
         <p:nvSpPr>
-          <p:cNvPr id="8" name="Marcador de pie de página 7">
-            <a:extLst>
-              <a:ext uri="{FF2B5EF4-FFF2-40B4-BE49-F238E27FC236}">
-                <a16:creationId xmlns:a16="http://schemas.microsoft.com/office/drawing/2014/main" id="{E5C50400-9BB7-4844-BDB0-62BF19F944B3}"/>
-              </a:ext>
-            </a:extLst>
-          </p:cNvPr>
+          <p:cNvPr id="8" name="Footer Placeholder 7"/>
           <p:cNvSpPr>
             <a:spLocks noGrp="1"/>
           </p:cNvSpPr>
@@ -1858,13 +1687,7 @@
       </p:sp>
       <p:sp>
         <p:nvSpPr>
-          <p:cNvPr id="9" name="Marcador de número de diapositiva 8">
-            <a:extLst>
-              <a:ext uri="{FF2B5EF4-FFF2-40B4-BE49-F238E27FC236}">
-                <a16:creationId xmlns:a16="http://schemas.microsoft.com/office/drawing/2014/main" id="{11EF84CF-F00E-4B1F-B935-907DB78B1004}"/>
-              </a:ext>
-            </a:extLst>
-          </p:cNvPr>
+          <p:cNvPr id="9" name="Slide Number Placeholder 8"/>
           <p:cNvSpPr>
             <a:spLocks noGrp="1"/>
           </p:cNvSpPr>
@@ -1885,10 +1708,33 @@
           </a:p>
         </p:txBody>
       </p:sp>
+      <p:sp>
+        <p:nvSpPr>
+          <p:cNvPr id="10" name="Title 9"/>
+          <p:cNvSpPr>
+            <a:spLocks noGrp="1"/>
+          </p:cNvSpPr>
+          <p:nvPr>
+            <p:ph type="title"/>
+          </p:nvPr>
+        </p:nvSpPr>
+        <p:spPr/>
+        <p:txBody>
+          <a:bodyPr/>
+          <a:lstStyle/>
+          <a:p>
+            <a:r>
+              <a:rPr lang="es-ES"/>
+              <a:t>Haga clic para modificar el estilo de título del patrón</a:t>
+            </a:r>
+            <a:endParaRPr lang="en-US" dirty="0"/>
+          </a:p>
+        </p:txBody>
+      </p:sp>
     </p:spTree>
     <p:extLst>
       <p:ext uri="{BB962C8B-B14F-4D97-AF65-F5344CB8AC3E}">
-        <p14:creationId xmlns:p14="http://schemas.microsoft.com/office/powerpoint/2010/main" val="109820137"/>
+        <p14:creationId xmlns:p14="http://schemas.microsoft.com/office/powerpoint/2010/main" val="2377011867"/>
       </p:ext>
     </p:extLst>
   </p:cSld>
@@ -1917,13 +1763,7 @@
       </p:grpSpPr>
       <p:sp>
         <p:nvSpPr>
-          <p:cNvPr id="2" name="Título 1">
-            <a:extLst>
-              <a:ext uri="{FF2B5EF4-FFF2-40B4-BE49-F238E27FC236}">
-                <a16:creationId xmlns:a16="http://schemas.microsoft.com/office/drawing/2014/main" id="{1A1B366C-AAE3-4C35-BD92-33B1E52153F9}"/>
-              </a:ext>
-            </a:extLst>
-          </p:cNvPr>
+          <p:cNvPr id="2" name="Title 1"/>
           <p:cNvSpPr>
             <a:spLocks noGrp="1"/>
           </p:cNvSpPr>
@@ -1940,19 +1780,13 @@
               <a:rPr lang="es-ES"/>
               <a:t>Haga clic para modificar el estilo de título del patrón</a:t>
             </a:r>
-            <a:endParaRPr lang="es-CO"/>
-          </a:p>
-        </p:txBody>
-      </p:sp>
-      <p:sp>
-        <p:nvSpPr>
-          <p:cNvPr id="3" name="Marcador de fecha 2">
-            <a:extLst>
-              <a:ext uri="{FF2B5EF4-FFF2-40B4-BE49-F238E27FC236}">
-                <a16:creationId xmlns:a16="http://schemas.microsoft.com/office/drawing/2014/main" id="{6DCA4530-4D97-4D6F-9FD3-75A68424959F}"/>
-              </a:ext>
-            </a:extLst>
-          </p:cNvPr>
+            <a:endParaRPr lang="en-US" dirty="0"/>
+          </a:p>
+        </p:txBody>
+      </p:sp>
+      <p:sp>
+        <p:nvSpPr>
+          <p:cNvPr id="3" name="Date Placeholder 2"/>
           <p:cNvSpPr>
             <a:spLocks noGrp="1"/>
           </p:cNvSpPr>
@@ -1967,7 +1801,7 @@
           <a:p>
             <a:fld id="{3E530A29-EDEA-4C59-80FD-EF4091401625}" type="datetimeFigureOut">
               <a:rPr lang="es-CO" smtClean="0"/>
-              <a:t>11/04/2021</a:t>
+              <a:t>25/04/2021</a:t>
             </a:fld>
             <a:endParaRPr lang="es-CO"/>
           </a:p>
@@ -1975,13 +1809,7 @@
       </p:sp>
       <p:sp>
         <p:nvSpPr>
-          <p:cNvPr id="4" name="Marcador de pie de página 3">
-            <a:extLst>
-              <a:ext uri="{FF2B5EF4-FFF2-40B4-BE49-F238E27FC236}">
-                <a16:creationId xmlns:a16="http://schemas.microsoft.com/office/drawing/2014/main" id="{F2462130-2D53-41F3-8507-0A7B9F78D820}"/>
-              </a:ext>
-            </a:extLst>
-          </p:cNvPr>
+          <p:cNvPr id="4" name="Footer Placeholder 3"/>
           <p:cNvSpPr>
             <a:spLocks noGrp="1"/>
           </p:cNvSpPr>
@@ -2000,13 +1828,7 @@
       </p:sp>
       <p:sp>
         <p:nvSpPr>
-          <p:cNvPr id="5" name="Marcador de número de diapositiva 4">
-            <a:extLst>
-              <a:ext uri="{FF2B5EF4-FFF2-40B4-BE49-F238E27FC236}">
-                <a16:creationId xmlns:a16="http://schemas.microsoft.com/office/drawing/2014/main" id="{304D792E-4C59-4D45-BC4F-C07F430A7352}"/>
-              </a:ext>
-            </a:extLst>
-          </p:cNvPr>
+          <p:cNvPr id="5" name="Slide Number Placeholder 4"/>
           <p:cNvSpPr>
             <a:spLocks noGrp="1"/>
           </p:cNvSpPr>
@@ -2030,7 +1852,7 @@
     </p:spTree>
     <p:extLst>
       <p:ext uri="{BB962C8B-B14F-4D97-AF65-F5344CB8AC3E}">
-        <p14:creationId xmlns:p14="http://schemas.microsoft.com/office/powerpoint/2010/main" val="1118386218"/>
+        <p14:creationId xmlns:p14="http://schemas.microsoft.com/office/powerpoint/2010/main" val="3592075035"/>
       </p:ext>
     </p:extLst>
   </p:cSld>
@@ -2059,13 +1881,7 @@
       </p:grpSpPr>
       <p:sp>
         <p:nvSpPr>
-          <p:cNvPr id="2" name="Marcador de fecha 1">
-            <a:extLst>
-              <a:ext uri="{FF2B5EF4-FFF2-40B4-BE49-F238E27FC236}">
-                <a16:creationId xmlns:a16="http://schemas.microsoft.com/office/drawing/2014/main" id="{8931526C-9D84-4EDF-B056-0DA362E944CD}"/>
-              </a:ext>
-            </a:extLst>
-          </p:cNvPr>
+          <p:cNvPr id="2" name="Date Placeholder 1"/>
           <p:cNvSpPr>
             <a:spLocks noGrp="1"/>
           </p:cNvSpPr>
@@ -2080,7 +1896,7 @@
           <a:p>
             <a:fld id="{3E530A29-EDEA-4C59-80FD-EF4091401625}" type="datetimeFigureOut">
               <a:rPr lang="es-CO" smtClean="0"/>
-              <a:t>11/04/2021</a:t>
+              <a:t>25/04/2021</a:t>
             </a:fld>
             <a:endParaRPr lang="es-CO"/>
           </a:p>
@@ -2088,13 +1904,7 @@
       </p:sp>
       <p:sp>
         <p:nvSpPr>
-          <p:cNvPr id="3" name="Marcador de pie de página 2">
-            <a:extLst>
-              <a:ext uri="{FF2B5EF4-FFF2-40B4-BE49-F238E27FC236}">
-                <a16:creationId xmlns:a16="http://schemas.microsoft.com/office/drawing/2014/main" id="{6688FC63-1F77-4050-8D77-2DD5D3DE0713}"/>
-              </a:ext>
-            </a:extLst>
-          </p:cNvPr>
+          <p:cNvPr id="3" name="Footer Placeholder 2"/>
           <p:cNvSpPr>
             <a:spLocks noGrp="1"/>
           </p:cNvSpPr>
@@ -2113,13 +1923,7 @@
       </p:sp>
       <p:sp>
         <p:nvSpPr>
-          <p:cNvPr id="4" name="Marcador de número de diapositiva 3">
-            <a:extLst>
-              <a:ext uri="{FF2B5EF4-FFF2-40B4-BE49-F238E27FC236}">
-                <a16:creationId xmlns:a16="http://schemas.microsoft.com/office/drawing/2014/main" id="{305D8750-36AE-4664-9262-B7D4240B558F}"/>
-              </a:ext>
-            </a:extLst>
-          </p:cNvPr>
+          <p:cNvPr id="4" name="Slide Number Placeholder 3"/>
           <p:cNvSpPr>
             <a:spLocks noGrp="1"/>
           </p:cNvSpPr>
@@ -2143,7 +1947,7 @@
     </p:spTree>
     <p:extLst>
       <p:ext uri="{BB962C8B-B14F-4D97-AF65-F5344CB8AC3E}">
-        <p14:creationId xmlns:p14="http://schemas.microsoft.com/office/powerpoint/2010/main" val="1796092422"/>
+        <p14:creationId xmlns:p14="http://schemas.microsoft.com/office/powerpoint/2010/main" val="2664849178"/>
       </p:ext>
     </p:extLst>
   </p:cSld>
@@ -2172,161 +1976,223 @@
       </p:grpSpPr>
       <p:sp>
         <p:nvSpPr>
-          <p:cNvPr id="2" name="Título 1">
-            <a:extLst>
-              <a:ext uri="{FF2B5EF4-FFF2-40B4-BE49-F238E27FC236}">
-                <a16:creationId xmlns:a16="http://schemas.microsoft.com/office/drawing/2014/main" id="{CF0322BD-F13A-4109-A8A2-57A3123C94B2}"/>
-              </a:ext>
-            </a:extLst>
-          </p:cNvPr>
-          <p:cNvSpPr>
-            <a:spLocks noGrp="1"/>
-          </p:cNvSpPr>
-          <p:nvPr>
-            <p:ph type="title"/>
-          </p:nvPr>
+          <p:cNvPr id="26" name="Rectangle 25"/>
+          <p:cNvSpPr/>
+          <p:nvPr/>
         </p:nvSpPr>
         <p:spPr>
           <a:xfrm>
-            <a:off x="839788" y="457200"/>
-            <a:ext cx="3932237" cy="1600200"/>
+            <a:off x="0" y="0"/>
+            <a:ext cx="6096000" cy="6858000"/>
+          </a:xfrm>
+          <a:prstGeom prst="rect">
+            <a:avLst/>
+          </a:prstGeom>
+          <a:solidFill>
+            <a:schemeClr val="accent2"/>
+          </a:solidFill>
+          <a:ln>
+            <a:noFill/>
+          </a:ln>
+        </p:spPr>
+        <p:style>
+          <a:lnRef idx="2">
+            <a:schemeClr val="accent1">
+              <a:shade val="50000"/>
+            </a:schemeClr>
+          </a:lnRef>
+          <a:fillRef idx="1">
+            <a:schemeClr val="accent1"/>
+          </a:fillRef>
+          <a:effectRef idx="0">
+            <a:schemeClr val="accent1"/>
+          </a:effectRef>
+          <a:fontRef idx="minor">
+            <a:schemeClr val="lt1"/>
+          </a:fontRef>
+        </p:style>
+      </p:sp>
+      <p:sp>
+        <p:nvSpPr>
+          <p:cNvPr id="2" name="Title 1"/>
+          <p:cNvSpPr>
+            <a:spLocks noGrp="1"/>
+          </p:cNvSpPr>
+          <p:nvPr>
+            <p:ph type="title"/>
+          </p:nvPr>
+        </p:nvSpPr>
+        <p:spPr bwMode="blackWhite">
+          <a:xfrm>
+            <a:off x="804672" y="2243828"/>
+            <a:ext cx="4486656" cy="1141497"/>
+          </a:xfrm>
+          <a:solidFill>
+            <a:srgbClr val="FFFFFF"/>
+          </a:solidFill>
+          <a:ln>
+            <a:solidFill>
+              <a:srgbClr val="404040"/>
+            </a:solidFill>
+          </a:ln>
+        </p:spPr>
+        <p:txBody>
+          <a:bodyPr anchor="ctr" anchorCtr="1">
+            <a:normAutofit/>
+          </a:bodyPr>
+          <a:lstStyle>
+            <a:lvl1pPr>
+              <a:defRPr sz="2200">
+                <a:solidFill>
+                  <a:srgbClr val="262626"/>
+                </a:solidFill>
+              </a:defRPr>
+            </a:lvl1pPr>
+          </a:lstStyle>
+          <a:p>
+            <a:r>
+              <a:rPr lang="es-ES"/>
+              <a:t>Haga clic para modificar el estilo de título del patrón</a:t>
+            </a:r>
+            <a:endParaRPr lang="en-US" dirty="0"/>
+          </a:p>
+        </p:txBody>
+      </p:sp>
+      <p:sp>
+        <p:nvSpPr>
+          <p:cNvPr id="3" name="Content Placeholder 2"/>
+          <p:cNvSpPr>
+            <a:spLocks noGrp="1"/>
+          </p:cNvSpPr>
+          <p:nvPr>
+            <p:ph idx="1"/>
+          </p:nvPr>
+        </p:nvSpPr>
+        <p:spPr>
+          <a:xfrm>
+            <a:off x="6736080" y="804672"/>
+            <a:ext cx="4815840" cy="5248656"/>
           </a:xfrm>
         </p:spPr>
         <p:txBody>
-          <a:bodyPr anchor="b"/>
+          <a:bodyPr>
+            <a:normAutofit/>
+          </a:bodyPr>
           <a:lstStyle>
             <a:lvl1pPr>
-              <a:defRPr sz="3200"/>
+              <a:defRPr sz="1900">
+                <a:solidFill>
+                  <a:schemeClr val="tx1"/>
+                </a:solidFill>
+              </a:defRPr>
             </a:lvl1pPr>
+            <a:lvl2pPr>
+              <a:defRPr sz="1600">
+                <a:solidFill>
+                  <a:schemeClr val="tx1"/>
+                </a:solidFill>
+              </a:defRPr>
+            </a:lvl2pPr>
+            <a:lvl3pPr>
+              <a:defRPr sz="1600">
+                <a:solidFill>
+                  <a:schemeClr val="tx1"/>
+                </a:solidFill>
+              </a:defRPr>
+            </a:lvl3pPr>
+            <a:lvl4pPr>
+              <a:defRPr sz="1600">
+                <a:solidFill>
+                  <a:schemeClr val="tx1"/>
+                </a:solidFill>
+              </a:defRPr>
+            </a:lvl4pPr>
+            <a:lvl5pPr>
+              <a:defRPr sz="1600">
+                <a:solidFill>
+                  <a:schemeClr val="tx1"/>
+                </a:solidFill>
+              </a:defRPr>
+            </a:lvl5pPr>
+            <a:lvl6pPr>
+              <a:defRPr sz="1600"/>
+            </a:lvl6pPr>
+            <a:lvl7pPr>
+              <a:defRPr sz="1600"/>
+            </a:lvl7pPr>
+            <a:lvl8pPr>
+              <a:defRPr sz="1600"/>
+            </a:lvl8pPr>
+            <a:lvl9pPr>
+              <a:defRPr sz="1600"/>
+            </a:lvl9pPr>
           </a:lstStyle>
           <a:p>
-            <a:r>
-              <a:rPr lang="es-ES"/>
-              <a:t>Haga clic para modificar el estilo de título del patrón</a:t>
-            </a:r>
-            <a:endParaRPr lang="es-CO"/>
-          </a:p>
-        </p:txBody>
-      </p:sp>
-      <p:sp>
-        <p:nvSpPr>
-          <p:cNvPr id="3" name="Marcador de contenido 2">
-            <a:extLst>
-              <a:ext uri="{FF2B5EF4-FFF2-40B4-BE49-F238E27FC236}">
-                <a16:creationId xmlns:a16="http://schemas.microsoft.com/office/drawing/2014/main" id="{0A720094-CD94-47CC-81B4-E9EEE9F46BFC}"/>
-              </a:ext>
-            </a:extLst>
-          </p:cNvPr>
-          <p:cNvSpPr>
-            <a:spLocks noGrp="1"/>
-          </p:cNvSpPr>
-          <p:nvPr>
-            <p:ph idx="1"/>
+            <a:pPr lvl="0"/>
+            <a:r>
+              <a:rPr lang="es-ES"/>
+              <a:t>Haga clic para modificar los estilos de texto del patrón</a:t>
+            </a:r>
+          </a:p>
+          <a:p>
+            <a:pPr lvl="1"/>
+            <a:r>
+              <a:rPr lang="es-ES"/>
+              <a:t>Segundo nivel</a:t>
+            </a:r>
+          </a:p>
+          <a:p>
+            <a:pPr lvl="2"/>
+            <a:r>
+              <a:rPr lang="es-ES"/>
+              <a:t>Tercer nivel</a:t>
+            </a:r>
+          </a:p>
+          <a:p>
+            <a:pPr lvl="3"/>
+            <a:r>
+              <a:rPr lang="es-ES"/>
+              <a:t>Cuarto nivel</a:t>
+            </a:r>
+          </a:p>
+          <a:p>
+            <a:pPr lvl="4"/>
+            <a:r>
+              <a:rPr lang="es-ES"/>
+              <a:t>Quinto nivel</a:t>
+            </a:r>
+            <a:endParaRPr lang="en-US" dirty="0"/>
+          </a:p>
+        </p:txBody>
+      </p:sp>
+      <p:sp>
+        <p:nvSpPr>
+          <p:cNvPr id="4" name="Text Placeholder 3"/>
+          <p:cNvSpPr>
+            <a:spLocks noGrp="1"/>
+          </p:cNvSpPr>
+          <p:nvPr>
+            <p:ph type="body" sz="half" idx="2"/>
           </p:nvPr>
         </p:nvSpPr>
         <p:spPr>
           <a:xfrm>
-            <a:off x="5183188" y="987425"/>
-            <a:ext cx="6172200" cy="4873625"/>
+            <a:off x="1115568" y="3549918"/>
+            <a:ext cx="3794760" cy="2194036"/>
           </a:xfrm>
         </p:spPr>
         <p:txBody>
-          <a:bodyPr/>
+          <a:bodyPr anchor="t" anchorCtr="1">
+            <a:normAutofit/>
+          </a:bodyPr>
           <a:lstStyle>
-            <a:lvl1pPr>
-              <a:defRPr sz="3200"/>
-            </a:lvl1pPr>
-            <a:lvl2pPr>
-              <a:defRPr sz="2800"/>
-            </a:lvl2pPr>
-            <a:lvl3pPr>
-              <a:defRPr sz="2400"/>
-            </a:lvl3pPr>
-            <a:lvl4pPr>
-              <a:defRPr sz="2000"/>
-            </a:lvl4pPr>
-            <a:lvl5pPr>
-              <a:defRPr sz="2000"/>
-            </a:lvl5pPr>
-            <a:lvl6pPr>
-              <a:defRPr sz="2000"/>
-            </a:lvl6pPr>
-            <a:lvl7pPr>
-              <a:defRPr sz="2000"/>
-            </a:lvl7pPr>
-            <a:lvl8pPr>
-              <a:defRPr sz="2000"/>
-            </a:lvl8pPr>
-            <a:lvl9pPr>
-              <a:defRPr sz="2000"/>
-            </a:lvl9pPr>
-          </a:lstStyle>
-          <a:p>
-            <a:pPr lvl="0"/>
-            <a:r>
-              <a:rPr lang="es-ES"/>
-              <a:t>Haga clic para modificar los estilos de texto del patrón</a:t>
-            </a:r>
-          </a:p>
-          <a:p>
-            <a:pPr lvl="1"/>
-            <a:r>
-              <a:rPr lang="es-ES"/>
-              <a:t>Segundo nivel</a:t>
-            </a:r>
-          </a:p>
-          <a:p>
-            <a:pPr lvl="2"/>
-            <a:r>
-              <a:rPr lang="es-ES"/>
-              <a:t>Tercer nivel</a:t>
-            </a:r>
-          </a:p>
-          <a:p>
-            <a:pPr lvl="3"/>
-            <a:r>
-              <a:rPr lang="es-ES"/>
-              <a:t>Cuarto nivel</a:t>
-            </a:r>
-          </a:p>
-          <a:p>
-            <a:pPr lvl="4"/>
-            <a:r>
-              <a:rPr lang="es-ES"/>
-              <a:t>Quinto nivel</a:t>
-            </a:r>
-            <a:endParaRPr lang="es-CO"/>
-          </a:p>
-        </p:txBody>
-      </p:sp>
-      <p:sp>
-        <p:nvSpPr>
-          <p:cNvPr id="4" name="Marcador de texto 3">
-            <a:extLst>
-              <a:ext uri="{FF2B5EF4-FFF2-40B4-BE49-F238E27FC236}">
-                <a16:creationId xmlns:a16="http://schemas.microsoft.com/office/drawing/2014/main" id="{50B2076C-93AE-4A80-984C-973E68D05FDA}"/>
-              </a:ext>
-            </a:extLst>
-          </p:cNvPr>
-          <p:cNvSpPr>
-            <a:spLocks noGrp="1"/>
-          </p:cNvSpPr>
-          <p:nvPr>
-            <p:ph type="body" sz="half" idx="2"/>
-          </p:nvPr>
-        </p:nvSpPr>
-        <p:spPr>
-          <a:xfrm>
-            <a:off x="839788" y="2057400"/>
-            <a:ext cx="3932237" cy="3811588"/>
-          </a:xfrm>
-        </p:spPr>
-        <p:txBody>
-          <a:bodyPr/>
-          <a:lstStyle>
-            <a:lvl1pPr marL="0" indent="0">
-              <a:buNone/>
-              <a:defRPr sz="1600"/>
+            <a:lvl1pPr marL="0" indent="0" algn="ctr">
+              <a:buNone/>
+              <a:defRPr sz="1500">
+                <a:solidFill>
+                  <a:srgbClr val="FFFFFF"/>
+                </a:solidFill>
+              </a:defRPr>
             </a:lvl1pPr>
             <a:lvl2pPr marL="457200" indent="0">
               <a:buNone/>
@@ -2372,13 +2238,7 @@
       </p:sp>
       <p:sp>
         <p:nvSpPr>
-          <p:cNvPr id="5" name="Marcador de fecha 4">
-            <a:extLst>
-              <a:ext uri="{FF2B5EF4-FFF2-40B4-BE49-F238E27FC236}">
-                <a16:creationId xmlns:a16="http://schemas.microsoft.com/office/drawing/2014/main" id="{90D3D9A2-1918-4397-8531-F13533D7BBF3}"/>
-              </a:ext>
-            </a:extLst>
-          </p:cNvPr>
+          <p:cNvPr id="9" name="Date Placeholder 8"/>
           <p:cNvSpPr>
             <a:spLocks noGrp="1"/>
           </p:cNvSpPr>
@@ -2393,7 +2253,7 @@
           <a:p>
             <a:fld id="{3E530A29-EDEA-4C59-80FD-EF4091401625}" type="datetimeFigureOut">
               <a:rPr lang="es-CO" smtClean="0"/>
-              <a:t>11/04/2021</a:t>
+              <a:t>25/04/2021</a:t>
             </a:fld>
             <a:endParaRPr lang="es-CO"/>
           </a:p>
@@ -2401,13 +2261,7 @@
       </p:sp>
       <p:sp>
         <p:nvSpPr>
-          <p:cNvPr id="6" name="Marcador de pie de página 5">
-            <a:extLst>
-              <a:ext uri="{FF2B5EF4-FFF2-40B4-BE49-F238E27FC236}">
-                <a16:creationId xmlns:a16="http://schemas.microsoft.com/office/drawing/2014/main" id="{5FBD5F5B-2456-4EC3-A43E-4DCBFF3CAC2D}"/>
-              </a:ext>
-            </a:extLst>
-          </p:cNvPr>
+          <p:cNvPr id="10" name="Footer Placeholder 9"/>
           <p:cNvSpPr>
             <a:spLocks noGrp="1"/>
           </p:cNvSpPr>
@@ -2415,10 +2269,25 @@
             <p:ph type="ftr" sz="quarter" idx="11"/>
           </p:nvPr>
         </p:nvSpPr>
-        <p:spPr/>
-        <p:txBody>
-          <a:bodyPr/>
-          <a:lstStyle/>
+        <p:spPr>
+          <a:xfrm>
+            <a:off x="804672" y="6236208"/>
+            <a:ext cx="5124797" cy="320040"/>
+          </a:xfrm>
+        </p:spPr>
+        <p:txBody>
+          <a:bodyPr/>
+          <a:lstStyle>
+            <a:lvl1pPr>
+              <a:defRPr>
+                <a:solidFill>
+                  <a:srgbClr val="FFFFFF">
+                    <a:alpha val="70000"/>
+                  </a:srgbClr>
+                </a:solidFill>
+              </a:defRPr>
+            </a:lvl1pPr>
+          </a:lstStyle>
           <a:p>
             <a:endParaRPr lang="es-CO"/>
           </a:p>
@@ -2426,13 +2295,7 @@
       </p:sp>
       <p:sp>
         <p:nvSpPr>
-          <p:cNvPr id="7" name="Marcador de número de diapositiva 6">
-            <a:extLst>
-              <a:ext uri="{FF2B5EF4-FFF2-40B4-BE49-F238E27FC236}">
-                <a16:creationId xmlns:a16="http://schemas.microsoft.com/office/drawing/2014/main" id="{E58FE4B6-F5D6-45CD-BFB8-04030576449C}"/>
-              </a:ext>
-            </a:extLst>
-          </p:cNvPr>
+          <p:cNvPr id="11" name="Slide Number Placeholder 10"/>
           <p:cNvSpPr>
             <a:spLocks noGrp="1"/>
           </p:cNvSpPr>
@@ -2456,7 +2319,7 @@
     </p:spTree>
     <p:extLst>
       <p:ext uri="{BB962C8B-B14F-4D97-AF65-F5344CB8AC3E}">
-        <p14:creationId xmlns:p14="http://schemas.microsoft.com/office/powerpoint/2010/main" val="2744957303"/>
+        <p14:creationId xmlns:p14="http://schemas.microsoft.com/office/powerpoint/2010/main" val="346795018"/>
       </p:ext>
     </p:extLst>
   </p:cSld>
@@ -2485,31 +2348,77 @@
       </p:grpSpPr>
       <p:sp>
         <p:nvSpPr>
-          <p:cNvPr id="2" name="Título 1">
-            <a:extLst>
-              <a:ext uri="{FF2B5EF4-FFF2-40B4-BE49-F238E27FC236}">
-                <a16:creationId xmlns:a16="http://schemas.microsoft.com/office/drawing/2014/main" id="{DA7F27D3-31B8-45C7-8AF5-64791AC456D4}"/>
-              </a:ext>
-            </a:extLst>
-          </p:cNvPr>
-          <p:cNvSpPr>
-            <a:spLocks noGrp="1"/>
-          </p:cNvSpPr>
-          <p:nvPr>
-            <p:ph type="title"/>
-          </p:nvPr>
+          <p:cNvPr id="18" name="Rectangle 17"/>
+          <p:cNvSpPr/>
+          <p:nvPr/>
         </p:nvSpPr>
         <p:spPr>
           <a:xfrm>
-            <a:off x="839788" y="457200"/>
-            <a:ext cx="3932237" cy="1600200"/>
+            <a:off x="0" y="0"/>
+            <a:ext cx="6095999" cy="6858000"/>
           </a:xfrm>
+          <a:prstGeom prst="rect">
+            <a:avLst/>
+          </a:prstGeom>
+          <a:solidFill>
+            <a:schemeClr val="accent2"/>
+          </a:solidFill>
+          <a:ln>
+            <a:noFill/>
+          </a:ln>
         </p:spPr>
-        <p:txBody>
-          <a:bodyPr anchor="b"/>
+        <p:style>
+          <a:lnRef idx="2">
+            <a:schemeClr val="accent1">
+              <a:shade val="50000"/>
+            </a:schemeClr>
+          </a:lnRef>
+          <a:fillRef idx="1">
+            <a:schemeClr val="accent1"/>
+          </a:fillRef>
+          <a:effectRef idx="0">
+            <a:schemeClr val="accent1"/>
+          </a:effectRef>
+          <a:fontRef idx="minor">
+            <a:schemeClr val="lt1"/>
+          </a:fontRef>
+        </p:style>
+      </p:sp>
+      <p:sp>
+        <p:nvSpPr>
+          <p:cNvPr id="2" name="Title 1"/>
+          <p:cNvSpPr>
+            <a:spLocks noGrp="1"/>
+          </p:cNvSpPr>
+          <p:nvPr>
+            <p:ph type="title"/>
+          </p:nvPr>
+        </p:nvSpPr>
+        <p:spPr bwMode="blackWhite">
+          <a:xfrm>
+            <a:off x="808523" y="2243828"/>
+            <a:ext cx="4494998" cy="1134640"/>
+          </a:xfrm>
+          <a:solidFill>
+            <a:srgbClr val="FFFFFF"/>
+          </a:solidFill>
+          <a:ln>
+            <a:solidFill>
+              <a:srgbClr val="404040"/>
+            </a:solidFill>
+          </a:ln>
+        </p:spPr>
+        <p:txBody>
+          <a:bodyPr anchor="ctr" anchorCtr="1">
+            <a:noAutofit/>
+          </a:bodyPr>
           <a:lstStyle>
             <a:lvl1pPr>
-              <a:defRPr sz="3200"/>
+              <a:defRPr sz="2200">
+                <a:solidFill>
+                  <a:srgbClr val="262626"/>
+                </a:solidFill>
+              </a:defRPr>
             </a:lvl1pPr>
           </a:lstStyle>
           <a:p>
@@ -2517,21 +2426,15 @@
               <a:rPr lang="es-ES"/>
               <a:t>Haga clic para modificar el estilo de título del patrón</a:t>
             </a:r>
-            <a:endParaRPr lang="es-CO"/>
-          </a:p>
-        </p:txBody>
-      </p:sp>
-      <p:sp>
-        <p:nvSpPr>
-          <p:cNvPr id="3" name="Marcador de posición de imagen 2">
-            <a:extLst>
-              <a:ext uri="{FF2B5EF4-FFF2-40B4-BE49-F238E27FC236}">
-                <a16:creationId xmlns:a16="http://schemas.microsoft.com/office/drawing/2014/main" id="{6A5B9BFA-A027-4AF5-91F5-A79F75866DEA}"/>
-              </a:ext>
-            </a:extLst>
-          </p:cNvPr>
-          <p:cNvSpPr>
-            <a:spLocks noGrp="1"/>
+            <a:endParaRPr lang="en-US" dirty="0"/>
+          </a:p>
+        </p:txBody>
+      </p:sp>
+      <p:sp>
+        <p:nvSpPr>
+          <p:cNvPr id="3" name="Picture Placeholder 2"/>
+          <p:cNvSpPr>
+            <a:spLocks noGrp="1" noChangeAspect="1"/>
           </p:cNvSpPr>
           <p:nvPr>
             <p:ph type="pic" idx="1"/>
@@ -2539,16 +2442,28 @@
         </p:nvSpPr>
         <p:spPr>
           <a:xfrm>
-            <a:off x="5183188" y="987425"/>
-            <a:ext cx="6172200" cy="4873625"/>
+            <a:off x="6095999" y="0"/>
+            <a:ext cx="6102097" cy="6858000"/>
           </a:xfrm>
+          <a:solidFill>
+            <a:schemeClr val="bg1">
+              <a:lumMod val="75000"/>
+            </a:schemeClr>
+          </a:solidFill>
         </p:spPr>
         <p:txBody>
-          <a:bodyPr/>
+          <a:bodyPr anchor="t"/>
           <a:lstStyle>
             <a:lvl1pPr marL="0" indent="0">
               <a:buNone/>
-              <a:defRPr sz="3200"/>
+              <a:defRPr sz="3200">
+                <a:solidFill>
+                  <a:schemeClr val="bg1">
+                    <a:lumMod val="85000"/>
+                    <a:lumOff val="15000"/>
+                  </a:schemeClr>
+                </a:solidFill>
+              </a:defRPr>
             </a:lvl1pPr>
             <a:lvl2pPr marL="457200" indent="0">
               <a:buNone/>
@@ -2584,19 +2499,17 @@
             </a:lvl9pPr>
           </a:lstStyle>
           <a:p>
-            <a:endParaRPr lang="es-CO"/>
-          </a:p>
-        </p:txBody>
-      </p:sp>
-      <p:sp>
-        <p:nvSpPr>
-          <p:cNvPr id="4" name="Marcador de texto 3">
-            <a:extLst>
-              <a:ext uri="{FF2B5EF4-FFF2-40B4-BE49-F238E27FC236}">
-                <a16:creationId xmlns:a16="http://schemas.microsoft.com/office/drawing/2014/main" id="{0634C58B-8D43-4665-8A46-FC0DB5FC8161}"/>
-              </a:ext>
-            </a:extLst>
-          </p:cNvPr>
+            <a:r>
+              <a:rPr lang="es-ES"/>
+              <a:t>Haga clic en el icono para agregar una imagen</a:t>
+            </a:r>
+            <a:endParaRPr lang="en-US" dirty="0"/>
+          </a:p>
+        </p:txBody>
+      </p:sp>
+      <p:sp>
+        <p:nvSpPr>
+          <p:cNvPr id="4" name="Text Placeholder 3"/>
           <p:cNvSpPr>
             <a:spLocks noGrp="1"/>
           </p:cNvSpPr>
@@ -2606,16 +2519,22 @@
         </p:nvSpPr>
         <p:spPr>
           <a:xfrm>
-            <a:off x="839788" y="2057400"/>
-            <a:ext cx="3932237" cy="3811588"/>
+            <a:off x="1115568" y="3549918"/>
+            <a:ext cx="3794760" cy="2194037"/>
           </a:xfrm>
         </p:spPr>
         <p:txBody>
-          <a:bodyPr/>
+          <a:bodyPr anchor="t" anchorCtr="1">
+            <a:normAutofit/>
+          </a:bodyPr>
           <a:lstStyle>
-            <a:lvl1pPr marL="0" indent="0">
-              <a:buNone/>
-              <a:defRPr sz="1600"/>
+            <a:lvl1pPr marL="0" indent="0" algn="ctr">
+              <a:buNone/>
+              <a:defRPr sz="1500">
+                <a:solidFill>
+                  <a:srgbClr val="FFFFFF"/>
+                </a:solidFill>
+              </a:defRPr>
             </a:lvl1pPr>
             <a:lvl2pPr marL="457200" indent="0">
               <a:buNone/>
@@ -2661,13 +2580,7 @@
       </p:sp>
       <p:sp>
         <p:nvSpPr>
-          <p:cNvPr id="5" name="Marcador de fecha 4">
-            <a:extLst>
-              <a:ext uri="{FF2B5EF4-FFF2-40B4-BE49-F238E27FC236}">
-                <a16:creationId xmlns:a16="http://schemas.microsoft.com/office/drawing/2014/main" id="{5D96C664-1FE9-476D-B249-C636D33F8A2B}"/>
-              </a:ext>
-            </a:extLst>
-          </p:cNvPr>
+          <p:cNvPr id="8" name="Date Placeholder 7"/>
           <p:cNvSpPr>
             <a:spLocks noGrp="1"/>
           </p:cNvSpPr>
@@ -2678,11 +2591,26 @@
         <p:spPr/>
         <p:txBody>
           <a:bodyPr/>
-          <a:lstStyle/>
+          <a:lstStyle>
+            <a:lvl1pPr>
+              <a:defRPr>
+                <a:solidFill>
+                  <a:srgbClr val="FFFFFF"/>
+                </a:solidFill>
+                <a:effectLst>
+                  <a:outerShdw blurRad="50800" dist="38100" dir="2700000" algn="tl" rotWithShape="0">
+                    <a:prstClr val="black">
+                      <a:alpha val="43000"/>
+                    </a:prstClr>
+                  </a:outerShdw>
+                </a:effectLst>
+              </a:defRPr>
+            </a:lvl1pPr>
+          </a:lstStyle>
           <a:p>
             <a:fld id="{3E530A29-EDEA-4C59-80FD-EF4091401625}" type="datetimeFigureOut">
               <a:rPr lang="es-CO" smtClean="0"/>
-              <a:t>11/04/2021</a:t>
+              <a:t>25/04/2021</a:t>
             </a:fld>
             <a:endParaRPr lang="es-CO"/>
           </a:p>
@@ -2690,13 +2618,7 @@
       </p:sp>
       <p:sp>
         <p:nvSpPr>
-          <p:cNvPr id="6" name="Marcador de pie de página 5">
-            <a:extLst>
-              <a:ext uri="{FF2B5EF4-FFF2-40B4-BE49-F238E27FC236}">
-                <a16:creationId xmlns:a16="http://schemas.microsoft.com/office/drawing/2014/main" id="{A0EF9CAC-D3AB-4BA6-B18E-BC9AE783440F}"/>
-              </a:ext>
-            </a:extLst>
-          </p:cNvPr>
+          <p:cNvPr id="9" name="Footer Placeholder 8"/>
           <p:cNvSpPr>
             <a:spLocks noGrp="1"/>
           </p:cNvSpPr>
@@ -2704,10 +2626,25 @@
             <p:ph type="ftr" sz="quarter" idx="11"/>
           </p:nvPr>
         </p:nvSpPr>
-        <p:spPr/>
-        <p:txBody>
-          <a:bodyPr/>
-          <a:lstStyle/>
+        <p:spPr>
+          <a:xfrm>
+            <a:off x="804672" y="6236208"/>
+            <a:ext cx="5124797" cy="320040"/>
+          </a:xfrm>
+        </p:spPr>
+        <p:txBody>
+          <a:bodyPr/>
+          <a:lstStyle>
+            <a:lvl1pPr>
+              <a:defRPr>
+                <a:solidFill>
+                  <a:srgbClr val="FFFFFF">
+                    <a:alpha val="70000"/>
+                  </a:srgbClr>
+                </a:solidFill>
+              </a:defRPr>
+            </a:lvl1pPr>
+          </a:lstStyle>
           <a:p>
             <a:endParaRPr lang="es-CO"/>
           </a:p>
@@ -2715,13 +2652,7 @@
       </p:sp>
       <p:sp>
         <p:nvSpPr>
-          <p:cNvPr id="7" name="Marcador de número de diapositiva 6">
-            <a:extLst>
-              <a:ext uri="{FF2B5EF4-FFF2-40B4-BE49-F238E27FC236}">
-                <a16:creationId xmlns:a16="http://schemas.microsoft.com/office/drawing/2014/main" id="{8A7F959F-4423-4ADB-8728-09308163C520}"/>
-              </a:ext>
-            </a:extLst>
-          </p:cNvPr>
+          <p:cNvPr id="10" name="Slide Number Placeholder 9"/>
           <p:cNvSpPr>
             <a:spLocks noGrp="1"/>
           </p:cNvSpPr>
@@ -2745,7 +2676,7 @@
     </p:spTree>
     <p:extLst>
       <p:ext uri="{BB962C8B-B14F-4D97-AF65-F5344CB8AC3E}">
-        <p14:creationId xmlns:p14="http://schemas.microsoft.com/office/powerpoint/2010/main" val="3808053573"/>
+        <p14:creationId xmlns:p14="http://schemas.microsoft.com/office/powerpoint/2010/main" val="384622978"/>
       </p:ext>
     </p:extLst>
   </p:cSld>
@@ -2759,9 +2690,14 @@
 <p:sldMaster xmlns:a="http://schemas.openxmlformats.org/drawingml/2006/main" xmlns:r="http://schemas.openxmlformats.org/officeDocument/2006/relationships" xmlns:p="http://schemas.openxmlformats.org/presentationml/2006/main">
   <p:cSld>
     <p:bg>
-      <p:bgRef idx="1001">
-        <a:schemeClr val="bg1"/>
-      </p:bgRef>
+      <p:bgPr>
+        <a:solidFill>
+          <a:schemeClr val="bg1">
+            <a:lumMod val="95000"/>
+          </a:schemeClr>
+        </a:solidFill>
+        <a:effectLst/>
+      </p:bgPr>
     </p:bg>
     <p:spTree>
       <p:nvGrpSpPr>
@@ -2779,131 +2715,163 @@
       </p:grpSpPr>
       <p:sp>
         <p:nvSpPr>
-          <p:cNvPr id="2" name="Marcador de título 1">
-            <a:extLst>
-              <a:ext uri="{FF2B5EF4-FFF2-40B4-BE49-F238E27FC236}">
-                <a16:creationId xmlns:a16="http://schemas.microsoft.com/office/drawing/2014/main" id="{B61314D0-0C2F-4ED2-AFD1-467D8D104B74}"/>
-              </a:ext>
-            </a:extLst>
-          </p:cNvPr>
+          <p:cNvPr id="2" name="Title Placeholder 1"/>
           <p:cNvSpPr>
             <a:spLocks noGrp="1"/>
           </p:cNvSpPr>
           <p:nvPr>
             <p:ph type="title"/>
+          </p:nvPr>
+        </p:nvSpPr>
+        <p:spPr bwMode="black">
+          <a:xfrm>
+            <a:off x="2231136" y="964692"/>
+            <a:ext cx="7729728" cy="1188720"/>
+          </a:xfrm>
+          <a:prstGeom prst="rect">
+            <a:avLst/>
+          </a:prstGeom>
+          <a:solidFill>
+            <a:srgbClr val="FFFFFF"/>
+          </a:solidFill>
+          <a:ln w="31750" cap="sq">
+            <a:solidFill>
+              <a:srgbClr val="404040"/>
+            </a:solidFill>
+            <a:miter lim="800000"/>
+          </a:ln>
+        </p:spPr>
+        <p:txBody>
+          <a:bodyPr vert="horz" lIns="182880" tIns="182880" rIns="182880" bIns="182880" rtlCol="0" anchor="ctr">
+            <a:normAutofit/>
+          </a:bodyPr>
+          <a:lstStyle/>
+          <a:p>
+            <a:r>
+              <a:rPr lang="es-ES"/>
+              <a:t>Haga clic para modificar el estilo de título del patrón</a:t>
+            </a:r>
+            <a:endParaRPr lang="en-US" dirty="0"/>
+          </a:p>
+        </p:txBody>
+      </p:sp>
+      <p:sp>
+        <p:nvSpPr>
+          <p:cNvPr id="3" name="Text Placeholder 2"/>
+          <p:cNvSpPr>
+            <a:spLocks noGrp="1"/>
+          </p:cNvSpPr>
+          <p:nvPr>
+            <p:ph type="body" idx="1"/>
           </p:nvPr>
         </p:nvSpPr>
         <p:spPr>
           <a:xfrm>
-            <a:off x="838200" y="365125"/>
-            <a:ext cx="10515600" cy="1325563"/>
+            <a:off x="2231136" y="2638044"/>
+            <a:ext cx="7729728" cy="3101983"/>
           </a:xfrm>
           <a:prstGeom prst="rect">
             <a:avLst/>
           </a:prstGeom>
         </p:spPr>
         <p:txBody>
-          <a:bodyPr vert="horz" lIns="91440" tIns="45720" rIns="91440" bIns="45720" rtlCol="0" anchor="ctr">
+          <a:bodyPr vert="horz" lIns="91440" tIns="45720" rIns="91440" bIns="45720" rtlCol="0">
             <a:normAutofit/>
           </a:bodyPr>
           <a:lstStyle/>
           <a:p>
-            <a:r>
-              <a:rPr lang="es-ES"/>
-              <a:t>Haga clic para modificar el estilo de título del patrón</a:t>
-            </a:r>
-            <a:endParaRPr lang="es-CO"/>
-          </a:p>
-        </p:txBody>
-      </p:sp>
-      <p:sp>
-        <p:nvSpPr>
-          <p:cNvPr id="3" name="Marcador de texto 2">
-            <a:extLst>
-              <a:ext uri="{FF2B5EF4-FFF2-40B4-BE49-F238E27FC236}">
-                <a16:creationId xmlns:a16="http://schemas.microsoft.com/office/drawing/2014/main" id="{B9E1144F-BBE5-4FCF-AFBA-53DC22ECCA0B}"/>
-              </a:ext>
-            </a:extLst>
-          </p:cNvPr>
-          <p:cNvSpPr>
-            <a:spLocks noGrp="1"/>
-          </p:cNvSpPr>
-          <p:nvPr>
-            <p:ph type="body" idx="1"/>
+            <a:pPr lvl="0"/>
+            <a:r>
+              <a:rPr lang="es-ES"/>
+              <a:t>Haga clic para modificar los estilos de texto del patrón</a:t>
+            </a:r>
+          </a:p>
+          <a:p>
+            <a:pPr lvl="1"/>
+            <a:r>
+              <a:rPr lang="es-ES"/>
+              <a:t>Segundo nivel</a:t>
+            </a:r>
+          </a:p>
+          <a:p>
+            <a:pPr lvl="2"/>
+            <a:r>
+              <a:rPr lang="es-ES"/>
+              <a:t>Tercer nivel</a:t>
+            </a:r>
+          </a:p>
+          <a:p>
+            <a:pPr lvl="3"/>
+            <a:r>
+              <a:rPr lang="es-ES"/>
+              <a:t>Cuarto nivel</a:t>
+            </a:r>
+          </a:p>
+          <a:p>
+            <a:pPr lvl="4"/>
+            <a:r>
+              <a:rPr lang="es-ES"/>
+              <a:t>Quinto nivel</a:t>
+            </a:r>
+            <a:endParaRPr lang="en-US" dirty="0"/>
+          </a:p>
+        </p:txBody>
+      </p:sp>
+      <p:sp>
+        <p:nvSpPr>
+          <p:cNvPr id="4" name="Date Placeholder 3"/>
+          <p:cNvSpPr>
+            <a:spLocks noGrp="1"/>
+          </p:cNvSpPr>
+          <p:nvPr>
+            <p:ph type="dt" sz="half" idx="2"/>
           </p:nvPr>
         </p:nvSpPr>
         <p:spPr>
           <a:xfrm>
-            <a:off x="838200" y="1825625"/>
-            <a:ext cx="10515600" cy="4351338"/>
+            <a:off x="7821429" y="6238816"/>
+            <a:ext cx="2753746" cy="323968"/>
           </a:xfrm>
           <a:prstGeom prst="rect">
             <a:avLst/>
           </a:prstGeom>
         </p:spPr>
         <p:txBody>
-          <a:bodyPr vert="horz" lIns="91440" tIns="45720" rIns="91440" bIns="45720" rtlCol="0">
-            <a:normAutofit/>
-          </a:bodyPr>
-          <a:lstStyle/>
-          <a:p>
-            <a:pPr lvl="0"/>
-            <a:r>
-              <a:rPr lang="es-ES"/>
-              <a:t>Haga clic para modificar los estilos de texto del patrón</a:t>
-            </a:r>
-          </a:p>
-          <a:p>
-            <a:pPr lvl="1"/>
-            <a:r>
-              <a:rPr lang="es-ES"/>
-              <a:t>Segundo nivel</a:t>
-            </a:r>
-          </a:p>
-          <a:p>
-            <a:pPr lvl="2"/>
-            <a:r>
-              <a:rPr lang="es-ES"/>
-              <a:t>Tercer nivel</a:t>
-            </a:r>
-          </a:p>
-          <a:p>
-            <a:pPr lvl="3"/>
-            <a:r>
-              <a:rPr lang="es-ES"/>
-              <a:t>Cuarto nivel</a:t>
-            </a:r>
-          </a:p>
-          <a:p>
-            <a:pPr lvl="4"/>
-            <a:r>
-              <a:rPr lang="es-ES"/>
-              <a:t>Quinto nivel</a:t>
-            </a:r>
+          <a:bodyPr vert="horz" lIns="91440" tIns="45720" rIns="91440" bIns="45720" rtlCol="0" anchor="ctr"/>
+          <a:lstStyle>
+            <a:lvl1pPr algn="r">
+              <a:defRPr sz="1050">
+                <a:solidFill>
+                  <a:schemeClr val="tx1">
+                    <a:alpha val="70000"/>
+                  </a:schemeClr>
+                </a:solidFill>
+              </a:defRPr>
+            </a:lvl1pPr>
+          </a:lstStyle>
+          <a:p>
+            <a:fld id="{3E530A29-EDEA-4C59-80FD-EF4091401625}" type="datetimeFigureOut">
+              <a:rPr lang="es-CO" smtClean="0"/>
+              <a:t>25/04/2021</a:t>
+            </a:fld>
             <a:endParaRPr lang="es-CO"/>
           </a:p>
         </p:txBody>
       </p:sp>
       <p:sp>
         <p:nvSpPr>
-          <p:cNvPr id="4" name="Marcador de fecha 3">
-            <a:extLst>
-              <a:ext uri="{FF2B5EF4-FFF2-40B4-BE49-F238E27FC236}">
-                <a16:creationId xmlns:a16="http://schemas.microsoft.com/office/drawing/2014/main" id="{17B907B3-E81A-4546-865D-7580507B26BA}"/>
-              </a:ext>
-            </a:extLst>
-          </p:cNvPr>
-          <p:cNvSpPr>
-            <a:spLocks noGrp="1"/>
-          </p:cNvSpPr>
-          <p:nvPr>
-            <p:ph type="dt" sz="half" idx="2"/>
+          <p:cNvPr id="5" name="Footer Placeholder 4"/>
+          <p:cNvSpPr>
+            <a:spLocks noGrp="1"/>
+          </p:cNvSpPr>
+          <p:nvPr>
+            <p:ph type="ftr" sz="quarter" idx="3"/>
           </p:nvPr>
         </p:nvSpPr>
         <p:spPr>
           <a:xfrm>
-            <a:off x="838200" y="6356350"/>
-            <a:ext cx="2743200" cy="365125"/>
+            <a:off x="1600200" y="6236208"/>
+            <a:ext cx="5901189" cy="320040"/>
           </a:xfrm>
           <a:prstGeom prst="rect">
             <a:avLst/>
@@ -2913,101 +2881,53 @@
           <a:bodyPr vert="horz" lIns="91440" tIns="45720" rIns="91440" bIns="45720" rtlCol="0" anchor="ctr"/>
           <a:lstStyle>
             <a:lvl1pPr algn="l">
-              <a:defRPr sz="1200">
+              <a:defRPr sz="1050">
                 <a:solidFill>
                   <a:schemeClr val="tx1">
-                    <a:tint val="75000"/>
+                    <a:alpha val="70000"/>
                   </a:schemeClr>
                 </a:solidFill>
               </a:defRPr>
             </a:lvl1pPr>
           </a:lstStyle>
           <a:p>
-            <a:fld id="{3E530A29-EDEA-4C59-80FD-EF4091401625}" type="datetimeFigureOut">
-              <a:rPr lang="es-CO" smtClean="0"/>
-              <a:t>11/04/2021</a:t>
-            </a:fld>
             <a:endParaRPr lang="es-CO"/>
           </a:p>
         </p:txBody>
       </p:sp>
       <p:sp>
         <p:nvSpPr>
-          <p:cNvPr id="5" name="Marcador de pie de página 4">
-            <a:extLst>
-              <a:ext uri="{FF2B5EF4-FFF2-40B4-BE49-F238E27FC236}">
-                <a16:creationId xmlns:a16="http://schemas.microsoft.com/office/drawing/2014/main" id="{F6B780B9-A841-45D9-B4D4-F7F4E761D15B}"/>
-              </a:ext>
-            </a:extLst>
-          </p:cNvPr>
-          <p:cNvSpPr>
-            <a:spLocks noGrp="1"/>
-          </p:cNvSpPr>
-          <p:nvPr>
-            <p:ph type="ftr" sz="quarter" idx="3"/>
+          <p:cNvPr id="6" name="Slide Number Placeholder 5"/>
+          <p:cNvSpPr>
+            <a:spLocks noGrp="1"/>
+          </p:cNvSpPr>
+          <p:nvPr>
+            <p:ph type="sldNum" sz="quarter" idx="4"/>
           </p:nvPr>
         </p:nvSpPr>
         <p:spPr>
           <a:xfrm>
-            <a:off x="4038600" y="6356350"/>
-            <a:ext cx="4114800" cy="365125"/>
+            <a:off x="10758922" y="6217920"/>
+            <a:ext cx="365760" cy="365760"/>
           </a:xfrm>
-          <a:prstGeom prst="rect">
+          <a:prstGeom prst="ellipse">
             <a:avLst/>
           </a:prstGeom>
+          <a:solidFill>
+            <a:srgbClr val="1D1D1D">
+              <a:alpha val="70000"/>
+            </a:srgbClr>
+          </a:solidFill>
         </p:spPr>
         <p:txBody>
-          <a:bodyPr vert="horz" lIns="91440" tIns="45720" rIns="91440" bIns="45720" rtlCol="0" anchor="ctr"/>
+          <a:bodyPr vert="horz" lIns="18288" tIns="45720" rIns="18288" bIns="45720" rtlCol="0" anchor="ctr">
+            <a:noAutofit/>
+          </a:bodyPr>
           <a:lstStyle>
             <a:lvl1pPr algn="ctr">
-              <a:defRPr sz="1200">
+              <a:defRPr sz="1100" spc="0" baseline="0">
                 <a:solidFill>
-                  <a:schemeClr val="tx1">
-                    <a:tint val="75000"/>
-                  </a:schemeClr>
-                </a:solidFill>
-              </a:defRPr>
-            </a:lvl1pPr>
-          </a:lstStyle>
-          <a:p>
-            <a:endParaRPr lang="es-CO"/>
-          </a:p>
-        </p:txBody>
-      </p:sp>
-      <p:sp>
-        <p:nvSpPr>
-          <p:cNvPr id="6" name="Marcador de número de diapositiva 5">
-            <a:extLst>
-              <a:ext uri="{FF2B5EF4-FFF2-40B4-BE49-F238E27FC236}">
-                <a16:creationId xmlns:a16="http://schemas.microsoft.com/office/drawing/2014/main" id="{9F29E46B-2BA3-4D48-B8B1-694AF339DB0E}"/>
-              </a:ext>
-            </a:extLst>
-          </p:cNvPr>
-          <p:cNvSpPr>
-            <a:spLocks noGrp="1"/>
-          </p:cNvSpPr>
-          <p:nvPr>
-            <p:ph type="sldNum" sz="quarter" idx="4"/>
-          </p:nvPr>
-        </p:nvSpPr>
-        <p:spPr>
-          <a:xfrm>
-            <a:off x="8610600" y="6356350"/>
-            <a:ext cx="2743200" cy="365125"/>
-          </a:xfrm>
-          <a:prstGeom prst="rect">
-            <a:avLst/>
-          </a:prstGeom>
-        </p:spPr>
-        <p:txBody>
-          <a:bodyPr vert="horz" lIns="91440" tIns="45720" rIns="91440" bIns="45720" rtlCol="0" anchor="ctr"/>
-          <a:lstStyle>
-            <a:lvl1pPr algn="r">
-              <a:defRPr sz="1200">
-                <a:solidFill>
-                  <a:schemeClr val="tx1">
-                    <a:tint val="75000"/>
-                  </a:schemeClr>
+                  <a:srgbClr val="FFFFFF"/>
                 </a:solidFill>
               </a:defRPr>
             </a:lvl1pPr>
@@ -3024,27 +2944,27 @@
     </p:spTree>
     <p:extLst>
       <p:ext uri="{BB962C8B-B14F-4D97-AF65-F5344CB8AC3E}">
-        <p14:creationId xmlns:p14="http://schemas.microsoft.com/office/powerpoint/2010/main" val="3761043009"/>
+        <p14:creationId xmlns:p14="http://schemas.microsoft.com/office/powerpoint/2010/main" val="2754008170"/>
       </p:ext>
     </p:extLst>
   </p:cSld>
   <p:clrMap bg1="lt1" tx1="dk1" bg2="lt2" tx2="dk2" accent1="accent1" accent2="accent2" accent3="accent3" accent4="accent4" accent5="accent5" accent6="accent6" hlink="hlink" folHlink="folHlink"/>
   <p:sldLayoutIdLst>
-    <p:sldLayoutId id="2147483649" r:id="rId1"/>
-    <p:sldLayoutId id="2147483650" r:id="rId2"/>
-    <p:sldLayoutId id="2147483651" r:id="rId3"/>
-    <p:sldLayoutId id="2147483652" r:id="rId4"/>
-    <p:sldLayoutId id="2147483653" r:id="rId5"/>
-    <p:sldLayoutId id="2147483654" r:id="rId6"/>
-    <p:sldLayoutId id="2147483655" r:id="rId7"/>
-    <p:sldLayoutId id="2147483656" r:id="rId8"/>
-    <p:sldLayoutId id="2147483657" r:id="rId9"/>
-    <p:sldLayoutId id="2147483658" r:id="rId10"/>
-    <p:sldLayoutId id="2147483659" r:id="rId11"/>
+    <p:sldLayoutId id="2147483673" r:id="rId1"/>
+    <p:sldLayoutId id="2147483674" r:id="rId2"/>
+    <p:sldLayoutId id="2147483675" r:id="rId3"/>
+    <p:sldLayoutId id="2147483676" r:id="rId4"/>
+    <p:sldLayoutId id="2147483677" r:id="rId5"/>
+    <p:sldLayoutId id="2147483678" r:id="rId6"/>
+    <p:sldLayoutId id="2147483679" r:id="rId7"/>
+    <p:sldLayoutId id="2147483680" r:id="rId8"/>
+    <p:sldLayoutId id="2147483681" r:id="rId9"/>
+    <p:sldLayoutId id="2147483682" r:id="rId10"/>
+    <p:sldLayoutId id="2147483683" r:id="rId11"/>
   </p:sldLayoutIdLst>
   <p:txStyles>
     <p:titleStyle>
-      <a:lvl1pPr algn="l" defTabSz="914400" rtl="0" eaLnBrk="1" latinLnBrk="0" hangingPunct="1">
+      <a:lvl1pPr algn="ctr" defTabSz="914400" rtl="0" eaLnBrk="1" latinLnBrk="0" hangingPunct="1">
         <a:lnSpc>
           <a:spcPct val="90000"/>
         </a:lnSpc>
@@ -3052,9 +2972,9 @@
           <a:spcPct val="0"/>
         </a:spcBef>
         <a:buNone/>
-        <a:defRPr sz="4400" kern="1200">
+        <a:defRPr sz="2800" kern="1200" cap="all" spc="200" baseline="0">
           <a:solidFill>
-            <a:schemeClr val="tx1"/>
+            <a:srgbClr val="262626"/>
           </a:solidFill>
           <a:latin typeface="+mj-lt"/>
           <a:ea typeface="+mj-ea"/>
@@ -3065,104 +2985,137 @@
     <p:bodyStyle>
       <a:lvl1pPr marL="228600" indent="-228600" algn="l" defTabSz="914400" rtl="0" eaLnBrk="1" latinLnBrk="0" hangingPunct="1">
         <a:lnSpc>
-          <a:spcPct val="90000"/>
+          <a:spcPct val="100000"/>
         </a:lnSpc>
         <a:spcBef>
           <a:spcPts val="1000"/>
         </a:spcBef>
+        <a:buClr>
+          <a:schemeClr val="accent2"/>
+        </a:buClr>
         <a:buFont typeface="Arial" panose="020B0604020202020204" pitchFamily="34" charset="0"/>
         <a:buChar char="•"/>
-        <a:defRPr sz="2800" kern="1200">
+        <a:defRPr sz="1800" kern="1200">
           <a:solidFill>
-            <a:schemeClr val="tx1"/>
+            <a:schemeClr val="tx1">
+              <a:lumMod val="85000"/>
+              <a:lumOff val="15000"/>
+            </a:schemeClr>
           </a:solidFill>
           <a:latin typeface="+mn-lt"/>
           <a:ea typeface="+mn-ea"/>
           <a:cs typeface="+mn-cs"/>
         </a:defRPr>
       </a:lvl1pPr>
-      <a:lvl2pPr marL="685800" indent="-228600" algn="l" defTabSz="914400" rtl="0" eaLnBrk="1" latinLnBrk="0" hangingPunct="1">
+      <a:lvl2pPr marL="457200" indent="-228600" algn="l" defTabSz="914400" rtl="0" eaLnBrk="1" latinLnBrk="0" hangingPunct="1">
         <a:lnSpc>
-          <a:spcPct val="90000"/>
+          <a:spcPct val="100000"/>
         </a:lnSpc>
         <a:spcBef>
-          <a:spcPts val="500"/>
+          <a:spcPts val="1000"/>
         </a:spcBef>
+        <a:buClr>
+          <a:schemeClr val="accent2"/>
+        </a:buClr>
         <a:buFont typeface="Arial" panose="020B0604020202020204" pitchFamily="34" charset="0"/>
         <a:buChar char="•"/>
-        <a:defRPr sz="2400" kern="1200">
+        <a:defRPr sz="1600" kern="1200">
           <a:solidFill>
-            <a:schemeClr val="tx1"/>
+            <a:schemeClr val="tx1">
+              <a:lumMod val="85000"/>
+              <a:lumOff val="15000"/>
+            </a:schemeClr>
           </a:solidFill>
           <a:latin typeface="+mn-lt"/>
           <a:ea typeface="+mn-ea"/>
           <a:cs typeface="+mn-cs"/>
         </a:defRPr>
       </a:lvl2pPr>
-      <a:lvl3pPr marL="1143000" indent="-228600" algn="l" defTabSz="914400" rtl="0" eaLnBrk="1" latinLnBrk="0" hangingPunct="1">
+      <a:lvl3pPr marL="685800" indent="-228600" algn="l" defTabSz="914400" rtl="0" eaLnBrk="1" latinLnBrk="0" hangingPunct="1">
         <a:lnSpc>
-          <a:spcPct val="90000"/>
+          <a:spcPct val="100000"/>
         </a:lnSpc>
         <a:spcBef>
-          <a:spcPts val="500"/>
+          <a:spcPts val="1000"/>
         </a:spcBef>
+        <a:buClr>
+          <a:schemeClr val="accent2"/>
+        </a:buClr>
         <a:buFont typeface="Arial" panose="020B0604020202020204" pitchFamily="34" charset="0"/>
         <a:buChar char="•"/>
-        <a:defRPr sz="2000" kern="1200">
+        <a:defRPr sz="1600" kern="1200">
           <a:solidFill>
-            <a:schemeClr val="tx1"/>
+            <a:schemeClr val="tx1">
+              <a:lumMod val="85000"/>
+              <a:lumOff val="15000"/>
+            </a:schemeClr>
           </a:solidFill>
           <a:latin typeface="+mn-lt"/>
           <a:ea typeface="+mn-ea"/>
           <a:cs typeface="+mn-cs"/>
         </a:defRPr>
       </a:lvl3pPr>
-      <a:lvl4pPr marL="1600200" indent="-228600" algn="l" defTabSz="914400" rtl="0" eaLnBrk="1" latinLnBrk="0" hangingPunct="1">
+      <a:lvl4pPr marL="914400" indent="-228600" algn="l" defTabSz="914400" rtl="0" eaLnBrk="1" latinLnBrk="0" hangingPunct="1">
         <a:lnSpc>
-          <a:spcPct val="90000"/>
+          <a:spcPct val="100000"/>
         </a:lnSpc>
         <a:spcBef>
-          <a:spcPts val="500"/>
+          <a:spcPts val="1000"/>
         </a:spcBef>
+        <a:buClr>
+          <a:schemeClr val="accent2"/>
+        </a:buClr>
         <a:buFont typeface="Arial" panose="020B0604020202020204" pitchFamily="34" charset="0"/>
         <a:buChar char="•"/>
-        <a:defRPr sz="1800" kern="1200">
+        <a:defRPr sz="1600" kern="1200">
           <a:solidFill>
-            <a:schemeClr val="tx1"/>
+            <a:schemeClr val="tx1">
+              <a:lumMod val="85000"/>
+              <a:lumOff val="15000"/>
+            </a:schemeClr>
           </a:solidFill>
           <a:latin typeface="+mn-lt"/>
           <a:ea typeface="+mn-ea"/>
           <a:cs typeface="+mn-cs"/>
         </a:defRPr>
       </a:lvl4pPr>
-      <a:lvl5pPr marL="2057400" indent="-228600" algn="l" defTabSz="914400" rtl="0" eaLnBrk="1" latinLnBrk="0" hangingPunct="1">
+      <a:lvl5pPr marL="1143000" indent="-228600" algn="l" defTabSz="914400" rtl="0" eaLnBrk="1" latinLnBrk="0" hangingPunct="1">
         <a:lnSpc>
-          <a:spcPct val="90000"/>
+          <a:spcPct val="100000"/>
         </a:lnSpc>
         <a:spcBef>
-          <a:spcPts val="500"/>
+          <a:spcPts val="1000"/>
         </a:spcBef>
+        <a:buClr>
+          <a:schemeClr val="accent2"/>
+        </a:buClr>
         <a:buFont typeface="Arial" panose="020B0604020202020204" pitchFamily="34" charset="0"/>
         <a:buChar char="•"/>
-        <a:defRPr sz="1800" kern="1200">
+        <a:defRPr sz="1600" kern="1200">
           <a:solidFill>
-            <a:schemeClr val="tx1"/>
+            <a:schemeClr val="tx1">
+              <a:lumMod val="85000"/>
+              <a:lumOff val="15000"/>
+            </a:schemeClr>
           </a:solidFill>
           <a:latin typeface="+mn-lt"/>
           <a:ea typeface="+mn-ea"/>
           <a:cs typeface="+mn-cs"/>
         </a:defRPr>
       </a:lvl5pPr>
-      <a:lvl6pPr marL="2514600" indent="-228600" algn="l" defTabSz="914400" rtl="0" eaLnBrk="1" latinLnBrk="0" hangingPunct="1">
+      <a:lvl6pPr marL="1312863" indent="-228600" algn="l" defTabSz="914400" rtl="0" eaLnBrk="1" latinLnBrk="0" hangingPunct="1">
         <a:lnSpc>
-          <a:spcPct val="90000"/>
+          <a:spcPct val="100000"/>
         </a:lnSpc>
         <a:spcBef>
-          <a:spcPts val="500"/>
+          <a:spcPts val="1000"/>
         </a:spcBef>
+        <a:buClr>
+          <a:schemeClr val="accent2"/>
+        </a:buClr>
         <a:buFont typeface="Arial" panose="020B0604020202020204" pitchFamily="34" charset="0"/>
         <a:buChar char="•"/>
-        <a:defRPr sz="1800" kern="1200">
+        <a:defRPr sz="1600" kern="1200">
           <a:solidFill>
             <a:schemeClr val="tx1"/>
           </a:solidFill>
@@ -3171,16 +3124,19 @@
           <a:cs typeface="+mn-cs"/>
         </a:defRPr>
       </a:lvl6pPr>
-      <a:lvl7pPr marL="2971800" indent="-228600" algn="l" defTabSz="914400" rtl="0" eaLnBrk="1" latinLnBrk="0" hangingPunct="1">
+      <a:lvl7pPr marL="1484313" indent="-228600" algn="l" defTabSz="914400" rtl="0" eaLnBrk="1" latinLnBrk="0" hangingPunct="1">
         <a:lnSpc>
-          <a:spcPct val="90000"/>
+          <a:spcPct val="100000"/>
         </a:lnSpc>
         <a:spcBef>
-          <a:spcPts val="500"/>
+          <a:spcPts val="1000"/>
         </a:spcBef>
+        <a:buClr>
+          <a:schemeClr val="accent2"/>
+        </a:buClr>
         <a:buFont typeface="Arial" panose="020B0604020202020204" pitchFamily="34" charset="0"/>
         <a:buChar char="•"/>
-        <a:defRPr sz="1800" kern="1200">
+        <a:defRPr sz="1600" kern="1200">
           <a:solidFill>
             <a:schemeClr val="tx1"/>
           </a:solidFill>
@@ -3189,16 +3145,19 @@
           <a:cs typeface="+mn-cs"/>
         </a:defRPr>
       </a:lvl7pPr>
-      <a:lvl8pPr marL="3429000" indent="-228600" algn="l" defTabSz="914400" rtl="0" eaLnBrk="1" latinLnBrk="0" hangingPunct="1">
+      <a:lvl8pPr marL="1657350" indent="-228600" algn="l" defTabSz="914400" rtl="0" eaLnBrk="1" latinLnBrk="0" hangingPunct="1">
         <a:lnSpc>
-          <a:spcPct val="90000"/>
+          <a:spcPct val="100000"/>
         </a:lnSpc>
         <a:spcBef>
-          <a:spcPts val="500"/>
+          <a:spcPts val="1000"/>
         </a:spcBef>
+        <a:buClr>
+          <a:schemeClr val="accent2"/>
+        </a:buClr>
         <a:buFont typeface="Arial" panose="020B0604020202020204" pitchFamily="34" charset="0"/>
         <a:buChar char="•"/>
-        <a:defRPr sz="1800" kern="1200">
+        <a:defRPr sz="1600" kern="1200" baseline="0">
           <a:solidFill>
             <a:schemeClr val="tx1"/>
           </a:solidFill>
@@ -3207,16 +3166,19 @@
           <a:cs typeface="+mn-cs"/>
         </a:defRPr>
       </a:lvl8pPr>
-      <a:lvl9pPr marL="3886200" indent="-228600" algn="l" defTabSz="914400" rtl="0" eaLnBrk="1" latinLnBrk="0" hangingPunct="1">
+      <a:lvl9pPr marL="1882775" indent="-228600" algn="l" defTabSz="914400" rtl="0" eaLnBrk="1" latinLnBrk="0" hangingPunct="1">
         <a:lnSpc>
-          <a:spcPct val="90000"/>
+          <a:spcPct val="100000"/>
         </a:lnSpc>
         <a:spcBef>
-          <a:spcPts val="500"/>
+          <a:spcPts val="1000"/>
         </a:spcBef>
+        <a:buClr>
+          <a:schemeClr val="accent2"/>
+        </a:buClr>
         <a:buFont typeface="Arial" panose="020B0604020202020204" pitchFamily="34" charset="0"/>
         <a:buChar char="•"/>
-        <a:defRPr sz="1800" kern="1200">
+        <a:defRPr sz="1600" kern="1200" baseline="0">
           <a:solidFill>
             <a:schemeClr val="tx1"/>
           </a:solidFill>
@@ -3228,7 +3190,7 @@
     </p:bodyStyle>
     <p:otherStyle>
       <a:defPPr>
-        <a:defRPr lang="es-CO"/>
+        <a:defRPr lang="en-US"/>
       </a:defPPr>
       <a:lvl1pPr marL="0" algn="l" defTabSz="914400" rtl="0" eaLnBrk="1" latinLnBrk="0" hangingPunct="1">
         <a:defRPr sz="1800" kern="1200">
@@ -3347,7 +3309,7 @@
           <p:cNvPr id="2" name="Título 1">
             <a:extLst>
               <a:ext uri="{FF2B5EF4-FFF2-40B4-BE49-F238E27FC236}">
-                <a16:creationId xmlns:a16="http://schemas.microsoft.com/office/drawing/2014/main" id="{4F26831B-6690-4BD3-BDAD-DCD3F16D1A74}"/>
+                <a16:creationId xmlns:a16="http://schemas.microsoft.com/office/drawing/2014/main" id="{0FD3C55C-65AC-4DCC-A526-733EABB20819}"/>
               </a:ext>
             </a:extLst>
           </p:cNvPr>
@@ -3355,7 +3317,7 @@
             <a:spLocks noGrp="1"/>
           </p:cNvSpPr>
           <p:nvPr>
-            <p:ph type="ctrTitle"/>
+            <p:ph type="title"/>
           </p:nvPr>
         </p:nvSpPr>
         <p:spPr/>
@@ -3363,16 +3325,24 @@
           <a:bodyPr/>
           <a:lstStyle/>
           <a:p>
-            <a:endParaRPr lang="es-CO"/>
-          </a:p>
-        </p:txBody>
-      </p:sp>
-      <p:sp>
-        <p:nvSpPr>
-          <p:cNvPr id="3" name="Subtítulo 2">
+            <a:r>
+              <a:rPr lang="es-MX" dirty="0"/>
+              <a:t>Asistente gestor </a:t>
+            </a:r>
+            <a:r>
+              <a:rPr lang="es-MX" dirty="0" err="1"/>
+              <a:t>vac</a:t>
+            </a:r>
+            <a:endParaRPr lang="es-CO" dirty="0"/>
+          </a:p>
+        </p:txBody>
+      </p:sp>
+      <p:sp>
+        <p:nvSpPr>
+          <p:cNvPr id="3" name="Marcador de texto 2">
             <a:extLst>
               <a:ext uri="{FF2B5EF4-FFF2-40B4-BE49-F238E27FC236}">
-                <a16:creationId xmlns:a16="http://schemas.microsoft.com/office/drawing/2014/main" id="{F8031CD4-4EDF-4501-878C-03D72236930E}"/>
+                <a16:creationId xmlns:a16="http://schemas.microsoft.com/office/drawing/2014/main" id="{39C5F67D-6CE2-43A5-8B74-B75E1EEDF9F2}"/>
               </a:ext>
             </a:extLst>
           </p:cNvPr>
@@ -3380,22 +3350,1305 @@
             <a:spLocks noGrp="1"/>
           </p:cNvSpPr>
           <p:nvPr>
-            <p:ph type="subTitle" idx="1"/>
-          </p:nvPr>
-        </p:nvSpPr>
-        <p:spPr/>
-        <p:txBody>
-          <a:bodyPr/>
-          <a:lstStyle/>
-          <a:p>
-            <a:endParaRPr lang="es-CO"/>
+            <p:ph type="body" idx="1"/>
+          </p:nvPr>
+        </p:nvSpPr>
+        <p:spPr>
+          <a:xfrm>
+            <a:off x="4233920" y="4280904"/>
+            <a:ext cx="3724159" cy="1265082"/>
+          </a:xfrm>
+        </p:spPr>
+        <p:txBody>
+          <a:bodyPr/>
+          <a:lstStyle/>
+          <a:p>
+            <a:pPr algn="ctr"/>
+            <a:r>
+              <a:rPr lang="es-MX" dirty="0"/>
+              <a:t>Carlos Andres Rios Rojas</a:t>
+            </a:r>
+          </a:p>
+          <a:p>
+            <a:pPr algn="ctr"/>
+            <a:r>
+              <a:rPr lang="es-MX" dirty="0"/>
+              <a:t>Edgar Giovanny Obregón Espitia</a:t>
+            </a:r>
+            <a:endParaRPr lang="es-CO" dirty="0"/>
+          </a:p>
+          <a:p>
+            <a:endParaRPr lang="es-CO" dirty="0"/>
           </a:p>
         </p:txBody>
       </p:sp>
     </p:spTree>
     <p:extLst>
       <p:ext uri="{BB962C8B-B14F-4D97-AF65-F5344CB8AC3E}">
-        <p14:creationId xmlns:p14="http://schemas.microsoft.com/office/powerpoint/2010/main" val="1985484820"/>
+        <p14:creationId xmlns:p14="http://schemas.microsoft.com/office/powerpoint/2010/main" val="4142087969"/>
+      </p:ext>
+    </p:extLst>
+  </p:cSld>
+  <p:clrMapOvr>
+    <a:masterClrMapping/>
+  </p:clrMapOvr>
+</p:sld>
+</file>
+
+<file path=ppt/slides/slide2.xml><?xml version="1.0" encoding="utf-8"?>
+<p:sld xmlns:a="http://schemas.openxmlformats.org/drawingml/2006/main" xmlns:r="http://schemas.openxmlformats.org/officeDocument/2006/relationships" xmlns:p="http://schemas.openxmlformats.org/presentationml/2006/main">
+  <p:cSld>
+    <p:spTree>
+      <p:nvGrpSpPr>
+        <p:cNvPr id="1" name=""/>
+        <p:cNvGrpSpPr/>
+        <p:nvPr/>
+      </p:nvGrpSpPr>
+      <p:grpSpPr>
+        <a:xfrm>
+          <a:off x="0" y="0"/>
+          <a:ext cx="0" cy="0"/>
+          <a:chOff x="0" y="0"/>
+          <a:chExt cx="0" cy="0"/>
+        </a:xfrm>
+      </p:grpSpPr>
+      <p:sp>
+        <p:nvSpPr>
+          <p:cNvPr id="2" name="Título 1">
+            <a:extLst>
+              <a:ext uri="{FF2B5EF4-FFF2-40B4-BE49-F238E27FC236}">
+                <a16:creationId xmlns:a16="http://schemas.microsoft.com/office/drawing/2014/main" id="{D59BF9C3-E5B9-4EA9-AC19-127E881B439E}"/>
+              </a:ext>
+            </a:extLst>
+          </p:cNvPr>
+          <p:cNvSpPr>
+            <a:spLocks noGrp="1"/>
+          </p:cNvSpPr>
+          <p:nvPr>
+            <p:ph type="title"/>
+          </p:nvPr>
+        </p:nvSpPr>
+        <p:spPr/>
+        <p:txBody>
+          <a:bodyPr/>
+          <a:lstStyle/>
+          <a:p>
+            <a:r>
+              <a:rPr lang="es-MX" dirty="0"/>
+              <a:t>Problema a resolver</a:t>
+            </a:r>
+            <a:endParaRPr lang="es-CO" dirty="0"/>
+          </a:p>
+        </p:txBody>
+      </p:sp>
+      <p:sp>
+        <p:nvSpPr>
+          <p:cNvPr id="3" name="Marcador de contenido 2">
+            <a:extLst>
+              <a:ext uri="{FF2B5EF4-FFF2-40B4-BE49-F238E27FC236}">
+                <a16:creationId xmlns:a16="http://schemas.microsoft.com/office/drawing/2014/main" id="{CDAAEA4A-7923-4AEA-93B7-D26493B4EF78}"/>
+              </a:ext>
+            </a:extLst>
+          </p:cNvPr>
+          <p:cNvSpPr>
+            <a:spLocks noGrp="1"/>
+          </p:cNvSpPr>
+          <p:nvPr>
+            <p:ph idx="1"/>
+          </p:nvPr>
+        </p:nvSpPr>
+        <p:spPr/>
+        <p:txBody>
+          <a:bodyPr/>
+          <a:lstStyle/>
+          <a:p>
+            <a:r>
+              <a:rPr lang="es-MX" dirty="0"/>
+              <a:t>Un software como aporte a la lucha contra el Covid-19 en Colombia.</a:t>
+            </a:r>
+          </a:p>
+          <a:p>
+            <a:r>
+              <a:rPr lang="es-MX" dirty="0"/>
+              <a:t>Gestión y administración insuficiente en el proceso de vacunación llevado en el país.</a:t>
+            </a:r>
+          </a:p>
+          <a:p>
+            <a:r>
+              <a:rPr lang="es-MX" dirty="0"/>
+              <a:t>Prevención de problemas y retrasos.</a:t>
+            </a:r>
+            <a:endParaRPr lang="es-CO" dirty="0"/>
+          </a:p>
+        </p:txBody>
+      </p:sp>
+      <p:sp>
+        <p:nvSpPr>
+          <p:cNvPr id="8" name="CuadroTexto 7">
+            <a:extLst>
+              <a:ext uri="{FF2B5EF4-FFF2-40B4-BE49-F238E27FC236}">
+                <a16:creationId xmlns:a16="http://schemas.microsoft.com/office/drawing/2014/main" id="{518378F2-5D0B-4162-BB2C-A24C07330E0A}"/>
+              </a:ext>
+            </a:extLst>
+          </p:cNvPr>
+          <p:cNvSpPr txBox="1"/>
+          <p:nvPr/>
+        </p:nvSpPr>
+        <p:spPr>
+          <a:xfrm>
+            <a:off x="6523714" y="5822496"/>
+            <a:ext cx="4874150" cy="230832"/>
+          </a:xfrm>
+          <a:prstGeom prst="rect">
+            <a:avLst/>
+          </a:prstGeom>
+          <a:noFill/>
+        </p:spPr>
+        <p:txBody>
+          <a:bodyPr wrap="square" rtlCol="0">
+            <a:spAutoFit/>
+          </a:bodyPr>
+          <a:lstStyle/>
+          <a:p>
+            <a:r>
+              <a:rPr lang="es-MX" sz="900" i="1" dirty="0">
+                <a:latin typeface="Times New Roman" panose="02020603050405020304" pitchFamily="18" charset="0"/>
+                <a:cs typeface="Times New Roman" panose="02020603050405020304" pitchFamily="18" charset="0"/>
+              </a:rPr>
+              <a:t>Imagen tomada de: https://consultorsalud.com/2-2-millones-vacunas-pfizer-llegaran-abril/</a:t>
+            </a:r>
+            <a:endParaRPr lang="es-CO" sz="900" i="1" dirty="0">
+              <a:latin typeface="Times New Roman" panose="02020603050405020304" pitchFamily="18" charset="0"/>
+              <a:cs typeface="Times New Roman" panose="02020603050405020304" pitchFamily="18" charset="0"/>
+            </a:endParaRPr>
+          </a:p>
+        </p:txBody>
+      </p:sp>
+      <p:pic>
+        <p:nvPicPr>
+          <p:cNvPr id="9" name="Imagen 8">
+            <a:extLst>
+              <a:ext uri="{FF2B5EF4-FFF2-40B4-BE49-F238E27FC236}">
+                <a16:creationId xmlns:a16="http://schemas.microsoft.com/office/drawing/2014/main" id="{F16C46C3-3ABE-45A4-B354-105F693C5D51}"/>
+              </a:ext>
+            </a:extLst>
+          </p:cNvPr>
+          <p:cNvPicPr>
+            <a:picLocks noChangeAspect="1"/>
+          </p:cNvPicPr>
+          <p:nvPr/>
+        </p:nvPicPr>
+        <p:blipFill>
+          <a:blip r:embed="rId2"/>
+          <a:stretch>
+            <a:fillRect/>
+          </a:stretch>
+        </p:blipFill>
+        <p:spPr>
+          <a:xfrm>
+            <a:off x="6523714" y="2814576"/>
+            <a:ext cx="5240571" cy="2947821"/>
+          </a:xfrm>
+          <a:prstGeom prst="rect">
+            <a:avLst/>
+          </a:prstGeom>
+        </p:spPr>
+      </p:pic>
+      <p:sp>
+        <p:nvSpPr>
+          <p:cNvPr id="13" name="Marcador de texto 3">
+            <a:extLst>
+              <a:ext uri="{FF2B5EF4-FFF2-40B4-BE49-F238E27FC236}">
+                <a16:creationId xmlns:a16="http://schemas.microsoft.com/office/drawing/2014/main" id="{893F2127-654B-48E6-9A85-82AE25060C88}"/>
+              </a:ext>
+            </a:extLst>
+          </p:cNvPr>
+          <p:cNvSpPr>
+            <a:spLocks noGrp="1"/>
+          </p:cNvSpPr>
+          <p:nvPr>
+            <p:ph type="body" sz="half" idx="2"/>
+          </p:nvPr>
+        </p:nvSpPr>
+        <p:spPr>
+          <a:xfrm>
+            <a:off x="1115568" y="3549918"/>
+            <a:ext cx="3794760" cy="2194037"/>
+          </a:xfrm>
+        </p:spPr>
+        <p:txBody>
+          <a:bodyPr/>
+          <a:lstStyle/>
+          <a:p>
+            <a:r>
+              <a:rPr lang="es-MX" dirty="0"/>
+              <a:t>Gestión del proceso de vacunación contra el COVID-19 en el país.</a:t>
+            </a:r>
+            <a:endParaRPr lang="es-CO" dirty="0"/>
+          </a:p>
+        </p:txBody>
+      </p:sp>
+    </p:spTree>
+    <p:extLst>
+      <p:ext uri="{BB962C8B-B14F-4D97-AF65-F5344CB8AC3E}">
+        <p14:creationId xmlns:p14="http://schemas.microsoft.com/office/powerpoint/2010/main" val="377270786"/>
+      </p:ext>
+    </p:extLst>
+  </p:cSld>
+  <p:clrMapOvr>
+    <a:masterClrMapping/>
+  </p:clrMapOvr>
+</p:sld>
+</file>
+
+<file path=ppt/slides/slide3.xml><?xml version="1.0" encoding="utf-8"?>
+<p:sld xmlns:a="http://schemas.openxmlformats.org/drawingml/2006/main" xmlns:r="http://schemas.openxmlformats.org/officeDocument/2006/relationships" xmlns:p="http://schemas.openxmlformats.org/presentationml/2006/main">
+  <p:cSld>
+    <p:spTree>
+      <p:nvGrpSpPr>
+        <p:cNvPr id="1" name=""/>
+        <p:cNvGrpSpPr/>
+        <p:nvPr/>
+      </p:nvGrpSpPr>
+      <p:grpSpPr>
+        <a:xfrm>
+          <a:off x="0" y="0"/>
+          <a:ext cx="0" cy="0"/>
+          <a:chOff x="0" y="0"/>
+          <a:chExt cx="0" cy="0"/>
+        </a:xfrm>
+      </p:grpSpPr>
+      <p:sp>
+        <p:nvSpPr>
+          <p:cNvPr id="2" name="Título 1">
+            <a:extLst>
+              <a:ext uri="{FF2B5EF4-FFF2-40B4-BE49-F238E27FC236}">
+                <a16:creationId xmlns:a16="http://schemas.microsoft.com/office/drawing/2014/main" id="{65E5F15A-9D72-4D39-87B9-315BF5470E2A}"/>
+              </a:ext>
+            </a:extLst>
+          </p:cNvPr>
+          <p:cNvSpPr>
+            <a:spLocks noGrp="1"/>
+          </p:cNvSpPr>
+          <p:nvPr>
+            <p:ph type="title"/>
+          </p:nvPr>
+        </p:nvSpPr>
+        <p:spPr/>
+        <p:txBody>
+          <a:bodyPr/>
+          <a:lstStyle/>
+          <a:p>
+            <a:r>
+              <a:rPr lang="es-MX" dirty="0"/>
+              <a:t>Descripción del sistema propuesto</a:t>
+            </a:r>
+            <a:endParaRPr lang="es-CO" dirty="0"/>
+          </a:p>
+        </p:txBody>
+      </p:sp>
+      <p:sp>
+        <p:nvSpPr>
+          <p:cNvPr id="3" name="Marcador de contenido 2">
+            <a:extLst>
+              <a:ext uri="{FF2B5EF4-FFF2-40B4-BE49-F238E27FC236}">
+                <a16:creationId xmlns:a16="http://schemas.microsoft.com/office/drawing/2014/main" id="{1B51713D-D5B5-4056-81F6-23886B270660}"/>
+              </a:ext>
+            </a:extLst>
+          </p:cNvPr>
+          <p:cNvSpPr>
+            <a:spLocks noGrp="1"/>
+          </p:cNvSpPr>
+          <p:nvPr>
+            <p:ph idx="1"/>
+          </p:nvPr>
+        </p:nvSpPr>
+        <p:spPr>
+          <a:xfrm>
+            <a:off x="155845" y="2908388"/>
+            <a:ext cx="3748245" cy="3101983"/>
+          </a:xfrm>
+        </p:spPr>
+        <p:txBody>
+          <a:bodyPr/>
+          <a:lstStyle/>
+          <a:p>
+            <a:r>
+              <a:rPr lang="es-MX" dirty="0"/>
+              <a:t>Dos usuarios:  Administrador  y aplicador.</a:t>
+            </a:r>
+          </a:p>
+          <a:p>
+            <a:r>
+              <a:rPr lang="es-MX" dirty="0"/>
+              <a:t>Pensado para ser desplegado en ordenadores individuales.</a:t>
+            </a:r>
+          </a:p>
+          <a:p>
+            <a:r>
+              <a:rPr lang="es-MX" dirty="0"/>
+              <a:t>Interacción con un servidor de bases de datos central.</a:t>
+            </a:r>
+          </a:p>
+          <a:p>
+            <a:r>
+              <a:rPr lang="es-MX" dirty="0"/>
+              <a:t> Sistema pensado para ser aplicado en sedes hospitalarias individuales.</a:t>
+            </a:r>
+            <a:endParaRPr lang="es-CO" dirty="0"/>
+          </a:p>
+        </p:txBody>
+      </p:sp>
+      <p:sp>
+        <p:nvSpPr>
+          <p:cNvPr id="5" name="Cilindro 4">
+            <a:extLst>
+              <a:ext uri="{FF2B5EF4-FFF2-40B4-BE49-F238E27FC236}">
+                <a16:creationId xmlns:a16="http://schemas.microsoft.com/office/drawing/2014/main" id="{46E6D131-3C28-4BCF-AB7E-9E6EE6920971}"/>
+              </a:ext>
+            </a:extLst>
+          </p:cNvPr>
+          <p:cNvSpPr/>
+          <p:nvPr/>
+        </p:nvSpPr>
+        <p:spPr>
+          <a:xfrm>
+            <a:off x="8120935" y="2678595"/>
+            <a:ext cx="667909" cy="1500809"/>
+          </a:xfrm>
+          <a:prstGeom prst="can">
+            <a:avLst/>
+          </a:prstGeom>
+        </p:spPr>
+        <p:style>
+          <a:lnRef idx="2">
+            <a:schemeClr val="accent1">
+              <a:shade val="50000"/>
+            </a:schemeClr>
+          </a:lnRef>
+          <a:fillRef idx="1">
+            <a:schemeClr val="accent1"/>
+          </a:fillRef>
+          <a:effectRef idx="0">
+            <a:schemeClr val="accent1"/>
+          </a:effectRef>
+          <a:fontRef idx="minor">
+            <a:schemeClr val="lt1"/>
+          </a:fontRef>
+        </p:style>
+        <p:txBody>
+          <a:bodyPr rtlCol="0" anchor="ctr"/>
+          <a:lstStyle/>
+          <a:p>
+            <a:pPr algn="ctr"/>
+            <a:r>
+              <a:rPr lang="es-MX" dirty="0"/>
+              <a:t>BD</a:t>
+            </a:r>
+            <a:endParaRPr lang="es-CO" dirty="0"/>
+          </a:p>
+        </p:txBody>
+      </p:sp>
+      <p:sp>
+        <p:nvSpPr>
+          <p:cNvPr id="6" name="Rectángulo: esquinas redondeadas 5">
+            <a:extLst>
+              <a:ext uri="{FF2B5EF4-FFF2-40B4-BE49-F238E27FC236}">
+                <a16:creationId xmlns:a16="http://schemas.microsoft.com/office/drawing/2014/main" id="{D46F8245-A454-4D82-8778-3F377E6D6D20}"/>
+              </a:ext>
+            </a:extLst>
+          </p:cNvPr>
+          <p:cNvSpPr/>
+          <p:nvPr/>
+        </p:nvSpPr>
+        <p:spPr>
+          <a:xfrm>
+            <a:off x="5580494" y="2905561"/>
+            <a:ext cx="1470991" cy="636104"/>
+          </a:xfrm>
+          <a:prstGeom prst="roundRect">
+            <a:avLst/>
+          </a:prstGeom>
+        </p:spPr>
+        <p:style>
+          <a:lnRef idx="2">
+            <a:schemeClr val="accent6">
+              <a:shade val="50000"/>
+            </a:schemeClr>
+          </a:lnRef>
+          <a:fillRef idx="1">
+            <a:schemeClr val="accent6"/>
+          </a:fillRef>
+          <a:effectRef idx="0">
+            <a:schemeClr val="accent6"/>
+          </a:effectRef>
+          <a:fontRef idx="minor">
+            <a:schemeClr val="lt1"/>
+          </a:fontRef>
+        </p:style>
+        <p:txBody>
+          <a:bodyPr rtlCol="0" anchor="ctr"/>
+          <a:lstStyle/>
+          <a:p>
+            <a:pPr algn="ctr"/>
+            <a:r>
+              <a:rPr lang="es-MX" dirty="0"/>
+              <a:t>Aplicador</a:t>
+            </a:r>
+            <a:endParaRPr lang="es-CO" dirty="0"/>
+          </a:p>
+        </p:txBody>
+      </p:sp>
+      <p:sp>
+        <p:nvSpPr>
+          <p:cNvPr id="7" name="Rectángulo: esquinas redondeadas 6">
+            <a:extLst>
+              <a:ext uri="{FF2B5EF4-FFF2-40B4-BE49-F238E27FC236}">
+                <a16:creationId xmlns:a16="http://schemas.microsoft.com/office/drawing/2014/main" id="{857A1FDD-80A3-4D38-A3BB-F01CFD101000}"/>
+              </a:ext>
+            </a:extLst>
+          </p:cNvPr>
+          <p:cNvSpPr/>
+          <p:nvPr/>
+        </p:nvSpPr>
+        <p:spPr>
+          <a:xfrm>
+            <a:off x="9788056" y="2905561"/>
+            <a:ext cx="1643799" cy="636104"/>
+          </a:xfrm>
+          <a:prstGeom prst="roundRect">
+            <a:avLst/>
+          </a:prstGeom>
+        </p:spPr>
+        <p:style>
+          <a:lnRef idx="2">
+            <a:schemeClr val="accent3">
+              <a:shade val="50000"/>
+            </a:schemeClr>
+          </a:lnRef>
+          <a:fillRef idx="1">
+            <a:schemeClr val="accent3"/>
+          </a:fillRef>
+          <a:effectRef idx="0">
+            <a:schemeClr val="accent3"/>
+          </a:effectRef>
+          <a:fontRef idx="minor">
+            <a:schemeClr val="lt1"/>
+          </a:fontRef>
+        </p:style>
+        <p:txBody>
+          <a:bodyPr rtlCol="0" anchor="ctr"/>
+          <a:lstStyle/>
+          <a:p>
+            <a:pPr algn="ctr"/>
+            <a:r>
+              <a:rPr lang="es-MX" dirty="0"/>
+              <a:t>Administrador</a:t>
+            </a:r>
+            <a:endParaRPr lang="es-CO" dirty="0"/>
+          </a:p>
+        </p:txBody>
+      </p:sp>
+      <p:cxnSp>
+        <p:nvCxnSpPr>
+          <p:cNvPr id="9" name="Conector recto de flecha 8">
+            <a:extLst>
+              <a:ext uri="{FF2B5EF4-FFF2-40B4-BE49-F238E27FC236}">
+                <a16:creationId xmlns:a16="http://schemas.microsoft.com/office/drawing/2014/main" id="{BE768E83-5072-4FB1-A309-C00E8D2F6E92}"/>
+              </a:ext>
+            </a:extLst>
+          </p:cNvPr>
+          <p:cNvCxnSpPr>
+            <a:stCxn id="5" idx="4"/>
+            <a:endCxn id="7" idx="1"/>
+          </p:cNvCxnSpPr>
+          <p:nvPr/>
+        </p:nvCxnSpPr>
+        <p:spPr>
+          <a:xfrm flipV="1">
+            <a:off x="8788844" y="3223613"/>
+            <a:ext cx="999212" cy="205387"/>
+          </a:xfrm>
+          <a:prstGeom prst="straightConnector1">
+            <a:avLst/>
+          </a:prstGeom>
+          <a:ln>
+            <a:headEnd type="arrow" w="med" len="med"/>
+            <a:tailEnd type="arrow" w="med" len="med"/>
+          </a:ln>
+        </p:spPr>
+        <p:style>
+          <a:lnRef idx="3">
+            <a:schemeClr val="dk1"/>
+          </a:lnRef>
+          <a:fillRef idx="0">
+            <a:schemeClr val="dk1"/>
+          </a:fillRef>
+          <a:effectRef idx="2">
+            <a:schemeClr val="dk1"/>
+          </a:effectRef>
+          <a:fontRef idx="minor">
+            <a:schemeClr val="tx1"/>
+          </a:fontRef>
+        </p:style>
+      </p:cxnSp>
+      <p:cxnSp>
+        <p:nvCxnSpPr>
+          <p:cNvPr id="15" name="Conector recto de flecha 14">
+            <a:extLst>
+              <a:ext uri="{FF2B5EF4-FFF2-40B4-BE49-F238E27FC236}">
+                <a16:creationId xmlns:a16="http://schemas.microsoft.com/office/drawing/2014/main" id="{17DCB73D-CFEF-4020-ADD3-A963037698DE}"/>
+              </a:ext>
+            </a:extLst>
+          </p:cNvPr>
+          <p:cNvCxnSpPr>
+            <a:stCxn id="6" idx="3"/>
+            <a:endCxn id="5" idx="2"/>
+          </p:cNvCxnSpPr>
+          <p:nvPr/>
+        </p:nvCxnSpPr>
+        <p:spPr>
+          <a:xfrm>
+            <a:off x="7051485" y="3223613"/>
+            <a:ext cx="1069450" cy="205387"/>
+          </a:xfrm>
+          <a:prstGeom prst="straightConnector1">
+            <a:avLst/>
+          </a:prstGeom>
+          <a:ln>
+            <a:headEnd type="triangle"/>
+            <a:tailEnd type="triangle"/>
+          </a:ln>
+        </p:spPr>
+        <p:style>
+          <a:lnRef idx="3">
+            <a:schemeClr val="dk1"/>
+          </a:lnRef>
+          <a:fillRef idx="0">
+            <a:schemeClr val="dk1"/>
+          </a:fillRef>
+          <a:effectRef idx="2">
+            <a:schemeClr val="dk1"/>
+          </a:effectRef>
+          <a:fontRef idx="minor">
+            <a:schemeClr val="tx1"/>
+          </a:fontRef>
+        </p:style>
+      </p:cxnSp>
+      <p:sp>
+        <p:nvSpPr>
+          <p:cNvPr id="16" name="Rectángulo 15">
+            <a:extLst>
+              <a:ext uri="{FF2B5EF4-FFF2-40B4-BE49-F238E27FC236}">
+                <a16:creationId xmlns:a16="http://schemas.microsoft.com/office/drawing/2014/main" id="{A1592A35-1D41-40EA-AB55-A13B276DD228}"/>
+              </a:ext>
+            </a:extLst>
+          </p:cNvPr>
+          <p:cNvSpPr/>
+          <p:nvPr/>
+        </p:nvSpPr>
+        <p:spPr>
+          <a:xfrm>
+            <a:off x="8287912" y="4934380"/>
+            <a:ext cx="2080588" cy="636104"/>
+          </a:xfrm>
+          <a:prstGeom prst="rect">
+            <a:avLst/>
+          </a:prstGeom>
+        </p:spPr>
+        <p:style>
+          <a:lnRef idx="2">
+            <a:schemeClr val="accent4">
+              <a:shade val="50000"/>
+            </a:schemeClr>
+          </a:lnRef>
+          <a:fillRef idx="1">
+            <a:schemeClr val="accent4"/>
+          </a:fillRef>
+          <a:effectRef idx="0">
+            <a:schemeClr val="accent4"/>
+          </a:effectRef>
+          <a:fontRef idx="minor">
+            <a:schemeClr val="lt1"/>
+          </a:fontRef>
+        </p:style>
+        <p:txBody>
+          <a:bodyPr rtlCol="0" anchor="ctr"/>
+          <a:lstStyle/>
+          <a:p>
+            <a:pPr algn="ctr"/>
+            <a:r>
+              <a:rPr lang="es-MX" dirty="0"/>
+              <a:t>Administración de Datos</a:t>
+            </a:r>
+            <a:endParaRPr lang="es-CO" dirty="0"/>
+          </a:p>
+        </p:txBody>
+      </p:sp>
+      <p:sp>
+        <p:nvSpPr>
+          <p:cNvPr id="17" name="Rectángulo 16">
+            <a:extLst>
+              <a:ext uri="{FF2B5EF4-FFF2-40B4-BE49-F238E27FC236}">
+                <a16:creationId xmlns:a16="http://schemas.microsoft.com/office/drawing/2014/main" id="{B6A9F611-77D1-4311-A8C9-0E851B3B8467}"/>
+              </a:ext>
+            </a:extLst>
+          </p:cNvPr>
+          <p:cNvSpPr/>
+          <p:nvPr/>
+        </p:nvSpPr>
+        <p:spPr>
+          <a:xfrm>
+            <a:off x="10708287" y="4456552"/>
+            <a:ext cx="1327868" cy="636104"/>
+          </a:xfrm>
+          <a:prstGeom prst="rect">
+            <a:avLst/>
+          </a:prstGeom>
+        </p:spPr>
+        <p:style>
+          <a:lnRef idx="3">
+            <a:schemeClr val="lt1"/>
+          </a:lnRef>
+          <a:fillRef idx="1">
+            <a:schemeClr val="dk1"/>
+          </a:fillRef>
+          <a:effectRef idx="1">
+            <a:schemeClr val="dk1"/>
+          </a:effectRef>
+          <a:fontRef idx="minor">
+            <a:schemeClr val="lt1"/>
+          </a:fontRef>
+        </p:style>
+        <p:txBody>
+          <a:bodyPr rtlCol="0" anchor="ctr"/>
+          <a:lstStyle/>
+          <a:p>
+            <a:pPr algn="ctr"/>
+            <a:r>
+              <a:rPr lang="es-MX" dirty="0"/>
+              <a:t>Generación de Graficas</a:t>
+            </a:r>
+            <a:endParaRPr lang="es-CO" dirty="0"/>
+          </a:p>
+        </p:txBody>
+      </p:sp>
+      <p:cxnSp>
+        <p:nvCxnSpPr>
+          <p:cNvPr id="19" name="Conector recto de flecha 18">
+            <a:extLst>
+              <a:ext uri="{FF2B5EF4-FFF2-40B4-BE49-F238E27FC236}">
+                <a16:creationId xmlns:a16="http://schemas.microsoft.com/office/drawing/2014/main" id="{02B362BA-29EE-4FCA-A969-C89E98EC5ED5}"/>
+              </a:ext>
+            </a:extLst>
+          </p:cNvPr>
+          <p:cNvCxnSpPr>
+            <a:stCxn id="7" idx="2"/>
+            <a:endCxn id="16" idx="0"/>
+          </p:cNvCxnSpPr>
+          <p:nvPr/>
+        </p:nvCxnSpPr>
+        <p:spPr>
+          <a:xfrm flipH="1">
+            <a:off x="9328206" y="3541665"/>
+            <a:ext cx="1281750" cy="1392715"/>
+          </a:xfrm>
+          <a:prstGeom prst="straightConnector1">
+            <a:avLst/>
+          </a:prstGeom>
+          <a:ln>
+            <a:tailEnd type="triangle"/>
+          </a:ln>
+        </p:spPr>
+        <p:style>
+          <a:lnRef idx="3">
+            <a:schemeClr val="dk1"/>
+          </a:lnRef>
+          <a:fillRef idx="0">
+            <a:schemeClr val="dk1"/>
+          </a:fillRef>
+          <a:effectRef idx="2">
+            <a:schemeClr val="dk1"/>
+          </a:effectRef>
+          <a:fontRef idx="minor">
+            <a:schemeClr val="tx1"/>
+          </a:fontRef>
+        </p:style>
+      </p:cxnSp>
+      <p:cxnSp>
+        <p:nvCxnSpPr>
+          <p:cNvPr id="21" name="Conector recto de flecha 20">
+            <a:extLst>
+              <a:ext uri="{FF2B5EF4-FFF2-40B4-BE49-F238E27FC236}">
+                <a16:creationId xmlns:a16="http://schemas.microsoft.com/office/drawing/2014/main" id="{ABDBC7A3-5DA3-42A9-A636-D345555EF60E}"/>
+              </a:ext>
+            </a:extLst>
+          </p:cNvPr>
+          <p:cNvCxnSpPr>
+            <a:stCxn id="7" idx="2"/>
+            <a:endCxn id="17" idx="0"/>
+          </p:cNvCxnSpPr>
+          <p:nvPr/>
+        </p:nvCxnSpPr>
+        <p:spPr>
+          <a:xfrm>
+            <a:off x="10609956" y="3541665"/>
+            <a:ext cx="762265" cy="914887"/>
+          </a:xfrm>
+          <a:prstGeom prst="straightConnector1">
+            <a:avLst/>
+          </a:prstGeom>
+          <a:ln>
+            <a:tailEnd type="triangle"/>
+          </a:ln>
+        </p:spPr>
+        <p:style>
+          <a:lnRef idx="3">
+            <a:schemeClr val="dk1"/>
+          </a:lnRef>
+          <a:fillRef idx="0">
+            <a:schemeClr val="dk1"/>
+          </a:fillRef>
+          <a:effectRef idx="2">
+            <a:schemeClr val="dk1"/>
+          </a:effectRef>
+          <a:fontRef idx="minor">
+            <a:schemeClr val="tx1"/>
+          </a:fontRef>
+        </p:style>
+      </p:cxnSp>
+      <p:sp>
+        <p:nvSpPr>
+          <p:cNvPr id="22" name="Rectángulo 21">
+            <a:extLst>
+              <a:ext uri="{FF2B5EF4-FFF2-40B4-BE49-F238E27FC236}">
+                <a16:creationId xmlns:a16="http://schemas.microsoft.com/office/drawing/2014/main" id="{178D7717-95FB-4BF8-BF79-610713109EA0}"/>
+              </a:ext>
+            </a:extLst>
+          </p:cNvPr>
+          <p:cNvSpPr/>
+          <p:nvPr/>
+        </p:nvSpPr>
+        <p:spPr>
+          <a:xfrm>
+            <a:off x="5275695" y="4456552"/>
+            <a:ext cx="2080588" cy="636104"/>
+          </a:xfrm>
+          <a:prstGeom prst="rect">
+            <a:avLst/>
+          </a:prstGeom>
+        </p:spPr>
+        <p:style>
+          <a:lnRef idx="2">
+            <a:schemeClr val="accent2">
+              <a:shade val="50000"/>
+            </a:schemeClr>
+          </a:lnRef>
+          <a:fillRef idx="1">
+            <a:schemeClr val="accent2"/>
+          </a:fillRef>
+          <a:effectRef idx="0">
+            <a:schemeClr val="accent2"/>
+          </a:effectRef>
+          <a:fontRef idx="minor">
+            <a:schemeClr val="lt1"/>
+          </a:fontRef>
+        </p:style>
+        <p:txBody>
+          <a:bodyPr rtlCol="0" anchor="ctr"/>
+          <a:lstStyle/>
+          <a:p>
+            <a:pPr algn="ctr"/>
+            <a:r>
+              <a:rPr lang="es-MX" dirty="0"/>
+              <a:t>Gestión Aplicación de Vacunas</a:t>
+            </a:r>
+            <a:endParaRPr lang="es-CO" dirty="0"/>
+          </a:p>
+        </p:txBody>
+      </p:sp>
+      <p:cxnSp>
+        <p:nvCxnSpPr>
+          <p:cNvPr id="24" name="Conector recto de flecha 23">
+            <a:extLst>
+              <a:ext uri="{FF2B5EF4-FFF2-40B4-BE49-F238E27FC236}">
+                <a16:creationId xmlns:a16="http://schemas.microsoft.com/office/drawing/2014/main" id="{B9AC916C-5040-47D7-9F0B-A3E0F7727B7A}"/>
+              </a:ext>
+            </a:extLst>
+          </p:cNvPr>
+          <p:cNvCxnSpPr>
+            <a:stCxn id="6" idx="2"/>
+            <a:endCxn id="22" idx="0"/>
+          </p:cNvCxnSpPr>
+          <p:nvPr/>
+        </p:nvCxnSpPr>
+        <p:spPr>
+          <a:xfrm flipH="1">
+            <a:off x="6315989" y="3541665"/>
+            <a:ext cx="1" cy="914887"/>
+          </a:xfrm>
+          <a:prstGeom prst="straightConnector1">
+            <a:avLst/>
+          </a:prstGeom>
+          <a:ln>
+            <a:tailEnd type="triangle"/>
+          </a:ln>
+        </p:spPr>
+        <p:style>
+          <a:lnRef idx="3">
+            <a:schemeClr val="dk1"/>
+          </a:lnRef>
+          <a:fillRef idx="0">
+            <a:schemeClr val="dk1"/>
+          </a:fillRef>
+          <a:effectRef idx="2">
+            <a:schemeClr val="dk1"/>
+          </a:effectRef>
+          <a:fontRef idx="minor">
+            <a:schemeClr val="tx1"/>
+          </a:fontRef>
+        </p:style>
+      </p:cxnSp>
+    </p:spTree>
+    <p:extLst>
+      <p:ext uri="{BB962C8B-B14F-4D97-AF65-F5344CB8AC3E}">
+        <p14:creationId xmlns:p14="http://schemas.microsoft.com/office/powerpoint/2010/main" val="3524050949"/>
+      </p:ext>
+    </p:extLst>
+  </p:cSld>
+  <p:clrMapOvr>
+    <a:masterClrMapping/>
+  </p:clrMapOvr>
+</p:sld>
+</file>
+
+<file path=ppt/slides/slide4.xml><?xml version="1.0" encoding="utf-8"?>
+<p:sld xmlns:a="http://schemas.openxmlformats.org/drawingml/2006/main" xmlns:r="http://schemas.openxmlformats.org/officeDocument/2006/relationships" xmlns:p="http://schemas.openxmlformats.org/presentationml/2006/main">
+  <p:cSld>
+    <p:spTree>
+      <p:nvGrpSpPr>
+        <p:cNvPr id="1" name=""/>
+        <p:cNvGrpSpPr/>
+        <p:nvPr/>
+      </p:nvGrpSpPr>
+      <p:grpSpPr>
+        <a:xfrm>
+          <a:off x="0" y="0"/>
+          <a:ext cx="0" cy="0"/>
+          <a:chOff x="0" y="0"/>
+          <a:chExt cx="0" cy="0"/>
+        </a:xfrm>
+      </p:grpSpPr>
+      <p:sp>
+        <p:nvSpPr>
+          <p:cNvPr id="2" name="Título 1">
+            <a:extLst>
+              <a:ext uri="{FF2B5EF4-FFF2-40B4-BE49-F238E27FC236}">
+                <a16:creationId xmlns:a16="http://schemas.microsoft.com/office/drawing/2014/main" id="{1DAB67F2-D1CC-47C8-8FE4-CF8DDCB217B6}"/>
+              </a:ext>
+            </a:extLst>
+          </p:cNvPr>
+          <p:cNvSpPr>
+            <a:spLocks noGrp="1"/>
+          </p:cNvSpPr>
+          <p:nvPr>
+            <p:ph type="title"/>
+          </p:nvPr>
+        </p:nvSpPr>
+        <p:spPr/>
+        <p:txBody>
+          <a:bodyPr/>
+          <a:lstStyle/>
+          <a:p>
+            <a:r>
+              <a:rPr lang="es-MX" dirty="0"/>
+              <a:t>Funcionalidades principales</a:t>
+            </a:r>
+            <a:endParaRPr lang="es-CO" dirty="0"/>
+          </a:p>
+        </p:txBody>
+      </p:sp>
+      <p:sp>
+        <p:nvSpPr>
+          <p:cNvPr id="3" name="Marcador de contenido 2">
+            <a:extLst>
+              <a:ext uri="{FF2B5EF4-FFF2-40B4-BE49-F238E27FC236}">
+                <a16:creationId xmlns:a16="http://schemas.microsoft.com/office/drawing/2014/main" id="{6A7DE066-A30E-4755-91C6-317443B45483}"/>
+              </a:ext>
+            </a:extLst>
+          </p:cNvPr>
+          <p:cNvSpPr>
+            <a:spLocks noGrp="1"/>
+          </p:cNvSpPr>
+          <p:nvPr>
+            <p:ph idx="1"/>
+          </p:nvPr>
+        </p:nvSpPr>
+        <p:spPr/>
+        <p:txBody>
+          <a:bodyPr/>
+          <a:lstStyle/>
+          <a:p>
+            <a:r>
+              <a:rPr lang="es-MX" dirty="0"/>
+              <a:t>Reconocimiento de perfil de usuario.</a:t>
+            </a:r>
+          </a:p>
+          <a:p>
+            <a:r>
+              <a:rPr lang="es-CO" dirty="0"/>
+              <a:t>Administración de datos de paciente (Administrador).</a:t>
+            </a:r>
+          </a:p>
+          <a:p>
+            <a:r>
+              <a:rPr lang="es-CO" dirty="0"/>
+              <a:t>Administración de datos de funcionarios (Administrador).</a:t>
+            </a:r>
+          </a:p>
+          <a:p>
+            <a:r>
+              <a:rPr lang="es-CO" dirty="0"/>
+              <a:t>Administración de datos de las vacunas (Administrador).</a:t>
+            </a:r>
+          </a:p>
+          <a:p>
+            <a:r>
+              <a:rPr lang="es-CO" dirty="0"/>
+              <a:t>Gestión de aplicación de vacunas por funcionario (Aplicador).</a:t>
+            </a:r>
+          </a:p>
+          <a:p>
+            <a:r>
+              <a:rPr lang="es-CO" dirty="0"/>
+              <a:t>Generación de graficas (Administrador).</a:t>
+            </a:r>
+          </a:p>
+        </p:txBody>
+      </p:sp>
+    </p:spTree>
+    <p:extLst>
+      <p:ext uri="{BB962C8B-B14F-4D97-AF65-F5344CB8AC3E}">
+        <p14:creationId xmlns:p14="http://schemas.microsoft.com/office/powerpoint/2010/main" val="2614461808"/>
+      </p:ext>
+    </p:extLst>
+  </p:cSld>
+  <p:clrMapOvr>
+    <a:masterClrMapping/>
+  </p:clrMapOvr>
+</p:sld>
+</file>
+
+<file path=ppt/slides/slide5.xml><?xml version="1.0" encoding="utf-8"?>
+<p:sld xmlns:a="http://schemas.openxmlformats.org/drawingml/2006/main" xmlns:r="http://schemas.openxmlformats.org/officeDocument/2006/relationships" xmlns:p="http://schemas.openxmlformats.org/presentationml/2006/main">
+  <p:cSld>
+    <p:spTree>
+      <p:nvGrpSpPr>
+        <p:cNvPr id="1" name=""/>
+        <p:cNvGrpSpPr/>
+        <p:nvPr/>
+      </p:nvGrpSpPr>
+      <p:grpSpPr>
+        <a:xfrm>
+          <a:off x="0" y="0"/>
+          <a:ext cx="0" cy="0"/>
+          <a:chOff x="0" y="0"/>
+          <a:chExt cx="0" cy="0"/>
+        </a:xfrm>
+      </p:grpSpPr>
+      <p:sp>
+        <p:nvSpPr>
+          <p:cNvPr id="2" name="Título 1">
+            <a:extLst>
+              <a:ext uri="{FF2B5EF4-FFF2-40B4-BE49-F238E27FC236}">
+                <a16:creationId xmlns:a16="http://schemas.microsoft.com/office/drawing/2014/main" id="{90E0795A-16C2-47E0-9265-1ABB093A2FF3}"/>
+              </a:ext>
+            </a:extLst>
+          </p:cNvPr>
+          <p:cNvSpPr>
+            <a:spLocks noGrp="1"/>
+          </p:cNvSpPr>
+          <p:nvPr>
+            <p:ph type="title"/>
+          </p:nvPr>
+        </p:nvSpPr>
+        <p:spPr/>
+        <p:txBody>
+          <a:bodyPr/>
+          <a:lstStyle/>
+          <a:p>
+            <a:r>
+              <a:rPr lang="es-MX" dirty="0"/>
+              <a:t>Resultados esperados</a:t>
+            </a:r>
+            <a:endParaRPr lang="es-CO" dirty="0"/>
+          </a:p>
+        </p:txBody>
+      </p:sp>
+      <p:pic>
+        <p:nvPicPr>
+          <p:cNvPr id="3" name="Imagen 2">
+            <a:extLst>
+              <a:ext uri="{FF2B5EF4-FFF2-40B4-BE49-F238E27FC236}">
+                <a16:creationId xmlns:a16="http://schemas.microsoft.com/office/drawing/2014/main" id="{67CEBA61-FC83-4015-8D89-CC1538CE23F6}"/>
+              </a:ext>
+            </a:extLst>
+          </p:cNvPr>
+          <p:cNvPicPr/>
+          <p:nvPr/>
+        </p:nvPicPr>
+        <p:blipFill>
+          <a:blip r:embed="rId2" cstate="print">
+            <a:extLst>
+              <a:ext uri="{28A0092B-C50C-407E-A947-70E740481C1C}">
+                <a14:useLocalDpi xmlns:a14="http://schemas.microsoft.com/office/drawing/2010/main" val="0"/>
+              </a:ext>
+            </a:extLst>
+          </a:blip>
+          <a:stretch>
+            <a:fillRect/>
+          </a:stretch>
+        </p:blipFill>
+        <p:spPr>
+          <a:xfrm>
+            <a:off x="1239907" y="2514665"/>
+            <a:ext cx="4028523" cy="4053109"/>
+          </a:xfrm>
+          <a:prstGeom prst="rect">
+            <a:avLst/>
+          </a:prstGeom>
+        </p:spPr>
+      </p:pic>
+      <p:pic>
+        <p:nvPicPr>
+          <p:cNvPr id="4" name="Imagen 3">
+            <a:extLst>
+              <a:ext uri="{FF2B5EF4-FFF2-40B4-BE49-F238E27FC236}">
+                <a16:creationId xmlns:a16="http://schemas.microsoft.com/office/drawing/2014/main" id="{E1C573D3-67ED-4DE0-A0B9-F2843D001DD9}"/>
+              </a:ext>
+            </a:extLst>
+          </p:cNvPr>
+          <p:cNvPicPr/>
+          <p:nvPr/>
+        </p:nvPicPr>
+        <p:blipFill>
+          <a:blip r:embed="rId3" cstate="print">
+            <a:extLst>
+              <a:ext uri="{28A0092B-C50C-407E-A947-70E740481C1C}">
+                <a14:useLocalDpi xmlns:a14="http://schemas.microsoft.com/office/drawing/2010/main" val="0"/>
+              </a:ext>
+            </a:extLst>
+          </a:blip>
+          <a:stretch>
+            <a:fillRect/>
+          </a:stretch>
+        </p:blipFill>
+        <p:spPr>
+          <a:xfrm>
+            <a:off x="6923571" y="2514666"/>
+            <a:ext cx="4028523" cy="4053109"/>
+          </a:xfrm>
+          <a:prstGeom prst="rect">
+            <a:avLst/>
+          </a:prstGeom>
+        </p:spPr>
+      </p:pic>
+    </p:spTree>
+    <p:extLst>
+      <p:ext uri="{BB962C8B-B14F-4D97-AF65-F5344CB8AC3E}">
+        <p14:creationId xmlns:p14="http://schemas.microsoft.com/office/powerpoint/2010/main" val="3943303038"/>
+      </p:ext>
+    </p:extLst>
+  </p:cSld>
+  <p:clrMapOvr>
+    <a:masterClrMapping/>
+  </p:clrMapOvr>
+</p:sld>
+</file>
+
+<file path=ppt/slides/slide6.xml><?xml version="1.0" encoding="utf-8"?>
+<p:sld xmlns:a="http://schemas.openxmlformats.org/drawingml/2006/main" xmlns:r="http://schemas.openxmlformats.org/officeDocument/2006/relationships" xmlns:p="http://schemas.openxmlformats.org/presentationml/2006/main">
+  <p:cSld>
+    <p:spTree>
+      <p:nvGrpSpPr>
+        <p:cNvPr id="1" name=""/>
+        <p:cNvGrpSpPr/>
+        <p:nvPr/>
+      </p:nvGrpSpPr>
+      <p:grpSpPr>
+        <a:xfrm>
+          <a:off x="0" y="0"/>
+          <a:ext cx="0" cy="0"/>
+          <a:chOff x="0" y="0"/>
+          <a:chExt cx="0" cy="0"/>
+        </a:xfrm>
+      </p:grpSpPr>
+      <p:pic>
+        <p:nvPicPr>
+          <p:cNvPr id="2" name="Imagen 1">
+            <a:extLst>
+              <a:ext uri="{FF2B5EF4-FFF2-40B4-BE49-F238E27FC236}">
+                <a16:creationId xmlns:a16="http://schemas.microsoft.com/office/drawing/2014/main" id="{AE7A3354-3FAD-490D-8A0D-5F46B31305A8}"/>
+              </a:ext>
+            </a:extLst>
+          </p:cNvPr>
+          <p:cNvPicPr/>
+          <p:nvPr/>
+        </p:nvPicPr>
+        <p:blipFill>
+          <a:blip r:embed="rId2" cstate="print">
+            <a:extLst>
+              <a:ext uri="{28A0092B-C50C-407E-A947-70E740481C1C}">
+                <a14:useLocalDpi xmlns:a14="http://schemas.microsoft.com/office/drawing/2010/main" val="0"/>
+              </a:ext>
+            </a:extLst>
+          </a:blip>
+          <a:stretch>
+            <a:fillRect/>
+          </a:stretch>
+        </p:blipFill>
+        <p:spPr>
+          <a:xfrm>
+            <a:off x="543961" y="1101973"/>
+            <a:ext cx="4791365" cy="4654053"/>
+          </a:xfrm>
+          <a:prstGeom prst="rect">
+            <a:avLst/>
+          </a:prstGeom>
+        </p:spPr>
+      </p:pic>
+      <p:pic>
+        <p:nvPicPr>
+          <p:cNvPr id="3" name="Imagen 2">
+            <a:extLst>
+              <a:ext uri="{FF2B5EF4-FFF2-40B4-BE49-F238E27FC236}">
+                <a16:creationId xmlns:a16="http://schemas.microsoft.com/office/drawing/2014/main" id="{7B86650F-2D4E-4634-89BA-B4ACC41E4962}"/>
+              </a:ext>
+            </a:extLst>
+          </p:cNvPr>
+          <p:cNvPicPr/>
+          <p:nvPr/>
+        </p:nvPicPr>
+        <p:blipFill>
+          <a:blip r:embed="rId3" cstate="print">
+            <a:extLst>
+              <a:ext uri="{28A0092B-C50C-407E-A947-70E740481C1C}">
+                <a14:useLocalDpi xmlns:a14="http://schemas.microsoft.com/office/drawing/2010/main" val="0"/>
+              </a:ext>
+            </a:extLst>
+          </a:blip>
+          <a:stretch>
+            <a:fillRect/>
+          </a:stretch>
+        </p:blipFill>
+        <p:spPr>
+          <a:xfrm>
+            <a:off x="6856674" y="1101973"/>
+            <a:ext cx="4791365" cy="4654053"/>
+          </a:xfrm>
+          <a:prstGeom prst="rect">
+            <a:avLst/>
+          </a:prstGeom>
+        </p:spPr>
+      </p:pic>
+    </p:spTree>
+    <p:extLst>
+      <p:ext uri="{BB962C8B-B14F-4D97-AF65-F5344CB8AC3E}">
+        <p14:creationId xmlns:p14="http://schemas.microsoft.com/office/powerpoint/2010/main" val="743654756"/>
+      </p:ext>
+    </p:extLst>
+  </p:cSld>
+  <p:clrMapOvr>
+    <a:masterClrMapping/>
+  </p:clrMapOvr>
+</p:sld>
+</file>
+
+<file path=ppt/slides/slide7.xml><?xml version="1.0" encoding="utf-8"?>
+<p:sld xmlns:a="http://schemas.openxmlformats.org/drawingml/2006/main" xmlns:r="http://schemas.openxmlformats.org/officeDocument/2006/relationships" xmlns:p="http://schemas.openxmlformats.org/presentationml/2006/main">
+  <p:cSld>
+    <p:spTree>
+      <p:nvGrpSpPr>
+        <p:cNvPr id="1" name=""/>
+        <p:cNvGrpSpPr/>
+        <p:nvPr/>
+      </p:nvGrpSpPr>
+      <p:grpSpPr>
+        <a:xfrm>
+          <a:off x="0" y="0"/>
+          <a:ext cx="0" cy="0"/>
+          <a:chOff x="0" y="0"/>
+          <a:chExt cx="0" cy="0"/>
+        </a:xfrm>
+      </p:grpSpPr>
+      <p:sp>
+        <p:nvSpPr>
+          <p:cNvPr id="2" name="Título 1">
+            <a:extLst>
+              <a:ext uri="{FF2B5EF4-FFF2-40B4-BE49-F238E27FC236}">
+                <a16:creationId xmlns:a16="http://schemas.microsoft.com/office/drawing/2014/main" id="{887C697F-B294-4291-B1DE-E484F1F14FF2}"/>
+              </a:ext>
+            </a:extLst>
+          </p:cNvPr>
+          <p:cNvSpPr>
+            <a:spLocks noGrp="1"/>
+          </p:cNvSpPr>
+          <p:nvPr>
+            <p:ph type="title"/>
+          </p:nvPr>
+        </p:nvSpPr>
+        <p:spPr/>
+        <p:txBody>
+          <a:bodyPr/>
+          <a:lstStyle/>
+          <a:p>
+            <a:r>
+              <a:rPr lang="es-MX" dirty="0"/>
+              <a:t>Entrega actual</a:t>
+            </a:r>
+            <a:endParaRPr lang="es-CO" dirty="0"/>
+          </a:p>
+        </p:txBody>
+      </p:sp>
+      <p:sp>
+        <p:nvSpPr>
+          <p:cNvPr id="3" name="Marcador de contenido 2">
+            <a:extLst>
+              <a:ext uri="{FF2B5EF4-FFF2-40B4-BE49-F238E27FC236}">
+                <a16:creationId xmlns:a16="http://schemas.microsoft.com/office/drawing/2014/main" id="{57CB6C8F-E2A6-462B-AE58-A2042239565E}"/>
+              </a:ext>
+            </a:extLst>
+          </p:cNvPr>
+          <p:cNvSpPr>
+            <a:spLocks noGrp="1"/>
+          </p:cNvSpPr>
+          <p:nvPr>
+            <p:ph idx="1"/>
+          </p:nvPr>
+        </p:nvSpPr>
+        <p:spPr/>
+        <p:txBody>
+          <a:bodyPr/>
+          <a:lstStyle/>
+          <a:p>
+            <a:r>
+              <a:rPr lang="es-MX" dirty="0"/>
+              <a:t>Implementación base de las funcionalidades de gestión de datos.</a:t>
+            </a:r>
+          </a:p>
+          <a:p>
+            <a:r>
+              <a:rPr lang="es-MX" dirty="0"/>
+              <a:t>Implementación base de la funcionalidad de reconocimiento de perfil de usuario.</a:t>
+            </a:r>
+            <a:endParaRPr lang="es-CO" dirty="0"/>
+          </a:p>
+        </p:txBody>
+      </p:sp>
+    </p:spTree>
+    <p:extLst>
+      <p:ext uri="{BB962C8B-B14F-4D97-AF65-F5344CB8AC3E}">
+        <p14:creationId xmlns:p14="http://schemas.microsoft.com/office/powerpoint/2010/main" val="1481305164"/>
       </p:ext>
     </p:extLst>
   </p:cSld>
@@ -3406,108 +4659,58 @@
 </file>
 
 <file path=ppt/theme/theme1.xml><?xml version="1.0" encoding="utf-8"?>
-<a:theme xmlns:a="http://schemas.openxmlformats.org/drawingml/2006/main" name="Tema de Office">
+<a:theme xmlns:a="http://schemas.openxmlformats.org/drawingml/2006/main" name="Paquete">
   <a:themeElements>
-    <a:clrScheme name="Office">
+    <a:clrScheme name="Paquete">
       <a:dk1>
-        <a:sysClr val="windowText" lastClr="000000"/>
+        <a:srgbClr val="000000"/>
       </a:dk1>
       <a:lt1>
-        <a:sysClr val="window" lastClr="FFFFFF"/>
+        <a:srgbClr val="FFFFFF"/>
       </a:lt1>
       <a:dk2>
-        <a:srgbClr val="44546A"/>
+        <a:srgbClr val="4A5356"/>
       </a:dk2>
       <a:lt2>
-        <a:srgbClr val="E7E6E6"/>
+        <a:srgbClr val="E8E3CE"/>
       </a:lt2>
       <a:accent1>
-        <a:srgbClr val="4472C4"/>
+        <a:srgbClr val="F6A21D"/>
       </a:accent1>
       <a:accent2>
-        <a:srgbClr val="ED7D31"/>
+        <a:srgbClr val="9BAFB5"/>
       </a:accent2>
       <a:accent3>
-        <a:srgbClr val="A5A5A5"/>
+        <a:srgbClr val="C96731"/>
       </a:accent3>
       <a:accent4>
-        <a:srgbClr val="FFC000"/>
+        <a:srgbClr val="9CA383"/>
       </a:accent4>
       <a:accent5>
-        <a:srgbClr val="5B9BD5"/>
+        <a:srgbClr val="87795D"/>
       </a:accent5>
       <a:accent6>
-        <a:srgbClr val="70AD47"/>
+        <a:srgbClr val="A0988C"/>
       </a:accent6>
       <a:hlink>
-        <a:srgbClr val="0563C1"/>
+        <a:srgbClr val="00B0F0"/>
       </a:hlink>
       <a:folHlink>
-        <a:srgbClr val="954F72"/>
+        <a:srgbClr val="738F97"/>
       </a:folHlink>
     </a:clrScheme>
-    <a:fontScheme name="Office">
+    <a:fontScheme name="Paquete">
       <a:majorFont>
-        <a:latin typeface="Calibri Light" panose="020F0302020204030204"/>
+        <a:latin typeface="Gill Sans MT" panose="020B0502020104020203"/>
         <a:ea typeface=""/>
         <a:cs typeface=""/>
-        <a:font script="Jpan" typeface="游ゴシック Light"/>
-        <a:font script="Hang" typeface="맑은 고딕"/>
-        <a:font script="Hans" typeface="等线 Light"/>
-        <a:font script="Hant" typeface="新細明體"/>
-        <a:font script="Arab" typeface="Times New Roman"/>
-        <a:font script="Hebr" typeface="Times New Roman"/>
-        <a:font script="Thai" typeface="Angsana New"/>
-        <a:font script="Ethi" typeface="Nyala"/>
-        <a:font script="Beng" typeface="Vrinda"/>
-        <a:font script="Gujr" typeface="Shruti"/>
-        <a:font script="Khmr" typeface="MoolBoran"/>
-        <a:font script="Knda" typeface="Tunga"/>
-        <a:font script="Guru" typeface="Raavi"/>
-        <a:font script="Cans" typeface="Euphemia"/>
-        <a:font script="Cher" typeface="Plantagenet Cherokee"/>
-        <a:font script="Yiii" typeface="Microsoft Yi Baiti"/>
-        <a:font script="Tibt" typeface="Microsoft Himalaya"/>
-        <a:font script="Thaa" typeface="MV Boli"/>
-        <a:font script="Deva" typeface="Mangal"/>
-        <a:font script="Telu" typeface="Gautami"/>
-        <a:font script="Taml" typeface="Latha"/>
-        <a:font script="Syrc" typeface="Estrangelo Edessa"/>
-        <a:font script="Orya" typeface="Kalinga"/>
-        <a:font script="Mlym" typeface="Kartika"/>
-        <a:font script="Laoo" typeface="DokChampa"/>
-        <a:font script="Sinh" typeface="Iskoola Pota"/>
-        <a:font script="Mong" typeface="Mongolian Baiti"/>
-        <a:font script="Viet" typeface="Times New Roman"/>
-        <a:font script="Uigh" typeface="Microsoft Uighur"/>
-        <a:font script="Geor" typeface="Sylfaen"/>
-        <a:font script="Armn" typeface="Arial"/>
-        <a:font script="Bugi" typeface="Leelawadee UI"/>
-        <a:font script="Bopo" typeface="Microsoft JhengHei"/>
-        <a:font script="Java" typeface="Javanese Text"/>
-        <a:font script="Lisu" typeface="Segoe UI"/>
-        <a:font script="Mymr" typeface="Myanmar Text"/>
-        <a:font script="Nkoo" typeface="Ebrima"/>
-        <a:font script="Olck" typeface="Nirmala UI"/>
-        <a:font script="Osma" typeface="Ebrima"/>
-        <a:font script="Phag" typeface="Phagspa"/>
-        <a:font script="Syrn" typeface="Estrangelo Edessa"/>
-        <a:font script="Syrj" typeface="Estrangelo Edessa"/>
-        <a:font script="Syre" typeface="Estrangelo Edessa"/>
-        <a:font script="Sora" typeface="Nirmala UI"/>
-        <a:font script="Tale" typeface="Microsoft Tai Le"/>
-        <a:font script="Talu" typeface="Microsoft New Tai Lue"/>
-        <a:font script="Tfng" typeface="Ebrima"/>
-      </a:majorFont>
-      <a:minorFont>
-        <a:latin typeface="Calibri" panose="020F0502020204030204"/>
-        <a:ea typeface=""/>
-        <a:cs typeface=""/>
-        <a:font script="Jpan" typeface="游ゴシック"/>
-        <a:font script="Hang" typeface="맑은 고딕"/>
-        <a:font script="Hans" typeface="等线"/>
-        <a:font script="Hant" typeface="新細明體"/>
-        <a:font script="Arab" typeface="Arial"/>
+        <a:font script="Grek" typeface="Corbel"/>
+        <a:font script="Cyrl" typeface="Corbel"/>
+        <a:font script="Jpan" typeface="HGｺﾞｼｯｸE"/>
+        <a:font script="Hang" typeface="휴먼매직체"/>
+        <a:font script="Hans" typeface="华文中宋"/>
+        <a:font script="Hant" typeface="微軟正黑體"/>
+        <a:font script="Arab" typeface="Majalla UI"/>
         <a:font script="Hebr" typeface="Arial"/>
         <a:font script="Thai" typeface="Cordia New"/>
         <a:font script="Ethi" typeface="Nyala"/>
@@ -3530,29 +4733,49 @@
         <a:font script="Laoo" typeface="DokChampa"/>
         <a:font script="Sinh" typeface="Iskoola Pota"/>
         <a:font script="Mong" typeface="Mongolian Baiti"/>
-        <a:font script="Viet" typeface="Arial"/>
+        <a:font script="Viet" typeface="Tahoma"/>
         <a:font script="Uigh" typeface="Microsoft Uighur"/>
         <a:font script="Geor" typeface="Sylfaen"/>
-        <a:font script="Armn" typeface="Arial"/>
-        <a:font script="Bugi" typeface="Leelawadee UI"/>
-        <a:font script="Bopo" typeface="Microsoft JhengHei"/>
-        <a:font script="Java" typeface="Javanese Text"/>
-        <a:font script="Lisu" typeface="Segoe UI"/>
-        <a:font script="Mymr" typeface="Myanmar Text"/>
-        <a:font script="Nkoo" typeface="Ebrima"/>
-        <a:font script="Olck" typeface="Nirmala UI"/>
-        <a:font script="Osma" typeface="Ebrima"/>
-        <a:font script="Phag" typeface="Phagspa"/>
-        <a:font script="Syrn" typeface="Estrangelo Edessa"/>
-        <a:font script="Syrj" typeface="Estrangelo Edessa"/>
-        <a:font script="Syre" typeface="Estrangelo Edessa"/>
-        <a:font script="Sora" typeface="Nirmala UI"/>
-        <a:font script="Tale" typeface="Microsoft Tai Le"/>
-        <a:font script="Talu" typeface="Microsoft New Tai Lue"/>
-        <a:font script="Tfng" typeface="Ebrima"/>
+      </a:majorFont>
+      <a:minorFont>
+        <a:latin typeface="Gill Sans MT" panose="020B0502020104020203"/>
+        <a:ea typeface=""/>
+        <a:cs typeface=""/>
+        <a:font script="Grek" typeface="Corbel"/>
+        <a:font script="Cyrl" typeface="Corbel"/>
+        <a:font script="Jpan" typeface="HGｺﾞｼｯｸE"/>
+        <a:font script="Hang" typeface="휴먼매직체"/>
+        <a:font script="Hans" typeface="华文中宋"/>
+        <a:font script="Hant" typeface="微軟正黑體"/>
+        <a:font script="Arab" typeface="Majalla UI"/>
+        <a:font script="Hebr" typeface="Arial"/>
+        <a:font script="Thai" typeface="Cordia New"/>
+        <a:font script="Ethi" typeface="Nyala"/>
+        <a:font script="Beng" typeface="Vrinda"/>
+        <a:font script="Gujr" typeface="Shruti"/>
+        <a:font script="Khmr" typeface="DaunPenh"/>
+        <a:font script="Knda" typeface="Tunga"/>
+        <a:font script="Guru" typeface="Raavi"/>
+        <a:font script="Cans" typeface="Euphemia"/>
+        <a:font script="Cher" typeface="Plantagenet Cherokee"/>
+        <a:font script="Yiii" typeface="Microsoft Yi Baiti"/>
+        <a:font script="Tibt" typeface="Microsoft Himalaya"/>
+        <a:font script="Thaa" typeface="MV Boli"/>
+        <a:font script="Deva" typeface="Mangal"/>
+        <a:font script="Telu" typeface="Gautami"/>
+        <a:font script="Taml" typeface="Latha"/>
+        <a:font script="Syrc" typeface="Estrangelo Edessa"/>
+        <a:font script="Orya" typeface="Kalinga"/>
+        <a:font script="Mlym" typeface="Kartika"/>
+        <a:font script="Laoo" typeface="DokChampa"/>
+        <a:font script="Sinh" typeface="Iskoola Pota"/>
+        <a:font script="Mong" typeface="Mongolian Baiti"/>
+        <a:font script="Viet" typeface="Tahoma"/>
+        <a:font script="Uigh" typeface="Microsoft Uighur"/>
+        <a:font script="Geor" typeface="Sylfaen"/>
       </a:minorFont>
     </a:fontScheme>
-    <a:fmtScheme name="Office">
+    <a:fmtScheme name="Paquete">
       <a:fillStyleLst>
         <a:solidFill>
           <a:schemeClr val="phClr"/>
@@ -3561,23 +4784,16 @@
           <a:gsLst>
             <a:gs pos="0">
               <a:schemeClr val="phClr">
-                <a:lumMod val="110000"/>
-                <a:satMod val="105000"/>
-                <a:tint val="67000"/>
-              </a:schemeClr>
-            </a:gs>
-            <a:gs pos="50000">
-              <a:schemeClr val="phClr">
-                <a:lumMod val="105000"/>
-                <a:satMod val="103000"/>
-                <a:tint val="73000"/>
+                <a:tint val="80000"/>
+                <a:satMod val="107000"/>
+                <a:lumMod val="103000"/>
               </a:schemeClr>
             </a:gs>
             <a:gs pos="100000">
               <a:schemeClr val="phClr">
-                <a:lumMod val="105000"/>
+                <a:tint val="82000"/>
                 <a:satMod val="109000"/>
-                <a:tint val="81000"/>
+                <a:lumMod val="103000"/>
               </a:schemeClr>
             </a:gs>
           </a:gsLst>
@@ -3587,23 +4803,23 @@
           <a:gsLst>
             <a:gs pos="0">
               <a:schemeClr val="phClr">
-                <a:satMod val="103000"/>
+                <a:tint val="97000"/>
+                <a:satMod val="100000"/>
                 <a:lumMod val="102000"/>
-                <a:tint val="94000"/>
               </a:schemeClr>
             </a:gs>
             <a:gs pos="50000">
               <a:schemeClr val="phClr">
-                <a:satMod val="110000"/>
+                <a:shade val="100000"/>
+                <a:satMod val="103000"/>
                 <a:lumMod val="100000"/>
-                <a:shade val="100000"/>
               </a:schemeClr>
             </a:gs>
             <a:gs pos="100000">
               <a:schemeClr val="phClr">
+                <a:shade val="93000"/>
+                <a:satMod val="110000"/>
                 <a:lumMod val="99000"/>
-                <a:satMod val="120000"/>
-                <a:shade val="78000"/>
               </a:schemeClr>
             </a:gs>
           </a:gsLst>
@@ -3616,21 +4832,18 @@
             <a:schemeClr val="phClr"/>
           </a:solidFill>
           <a:prstDash val="solid"/>
-          <a:miter lim="800000"/>
         </a:ln>
         <a:ln w="12700" cap="flat" cmpd="sng" algn="ctr">
           <a:solidFill>
             <a:schemeClr val="phClr"/>
           </a:solidFill>
           <a:prstDash val="solid"/>
-          <a:miter lim="800000"/>
         </a:ln>
-        <a:ln w="19050" cap="flat" cmpd="sng" algn="ctr">
+        <a:ln w="31750" cap="flat" cmpd="sng" algn="ctr">
           <a:solidFill>
             <a:schemeClr val="phClr"/>
           </a:solidFill>
           <a:prstDash val="solid"/>
-          <a:miter lim="800000"/>
         </a:ln>
       </a:lnStyleLst>
       <a:effectStyleLst>
@@ -3642,12 +4855,21 @@
         </a:effectStyle>
         <a:effectStyle>
           <a:effectLst>
-            <a:outerShdw blurRad="57150" dist="19050" dir="5400000" algn="ctr" rotWithShape="0">
+            <a:outerShdw blurRad="55880" dist="15240" dir="5400000" algn="ctr" rotWithShape="0">
               <a:srgbClr val="000000">
-                <a:alpha val="63000"/>
+                <a:alpha val="45000"/>
               </a:srgbClr>
             </a:outerShdw>
           </a:effectLst>
+          <a:scene3d>
+            <a:camera prst="orthographicFront">
+              <a:rot lat="0" lon="0" rev="0"/>
+            </a:camera>
+            <a:lightRig rig="brightRoom" dir="tl"/>
+          </a:scene3d>
+          <a:sp3d prstMaterial="dkEdge">
+            <a:bevelT w="0" h="0"/>
+          </a:sp3d>
         </a:effectStyle>
       </a:effectStyleLst>
       <a:bgFillStyleLst>
@@ -3664,28 +4886,24 @@
           <a:gsLst>
             <a:gs pos="0">
               <a:schemeClr val="phClr">
-                <a:tint val="93000"/>
-                <a:satMod val="150000"/>
-                <a:shade val="98000"/>
-                <a:lumMod val="102000"/>
-              </a:schemeClr>
-            </a:gs>
-            <a:gs pos="50000">
-              <a:schemeClr val="phClr">
-                <a:tint val="98000"/>
-                <a:satMod val="130000"/>
-                <a:shade val="90000"/>
-                <a:lumMod val="103000"/>
+                <a:tint val="97000"/>
+                <a:shade val="100000"/>
+                <a:satMod val="185000"/>
+                <a:lumMod val="120000"/>
               </a:schemeClr>
             </a:gs>
             <a:gs pos="100000">
               <a:schemeClr val="phClr">
-                <a:shade val="63000"/>
-                <a:satMod val="120000"/>
+                <a:tint val="96000"/>
+                <a:shade val="95000"/>
+                <a:satMod val="215000"/>
+                <a:lumMod val="80000"/>
               </a:schemeClr>
             </a:gs>
           </a:gsLst>
-          <a:lin ang="5400000" scaled="0"/>
+          <a:path path="circle">
+            <a:fillToRect l="50000" t="55000" r="125000" b="100000"/>
+          </a:path>
         </a:gradFill>
       </a:bgFillStyleLst>
     </a:fmtScheme>
@@ -3694,7 +4912,7 @@
   <a:extraClrSchemeLst/>
   <a:extLst>
     <a:ext uri="{05A4C25C-085E-4340-85A3-A5531E510DB2}">
-      <thm15:themeFamily xmlns:thm15="http://schemas.microsoft.com/office/thememl/2012/main" name="Office Theme" id="{62F939B6-93AF-4DB8-9C6B-D6C7DFDC589F}" vid="{4A3C46E8-61CC-4603-A589-7422A47A8E4A}"/>
+      <thm15:themeFamily xmlns:thm15="http://schemas.microsoft.com/office/thememl/2012/main" name="Parcel" id="{8BEC4385-4EB9-4D53-BFB5-0EA123736B6D}" vid="{4DB32801-28C0-48B0-8C1D-A9A58613615A}"/>
     </a:ext>
   </a:extLst>
 </a:theme>

</xml_diff>